<commit_message>
powerpoint- self studying schedule
</commit_message>
<xml_diff>
--- a/src/assets/img/Presentation1.pptx
+++ b/src/assets/img/Presentation1.pptx
@@ -2,18 +2,26 @@
 <file path=ppt/presentation.xml><?xml version="1.0" encoding="utf-8"?>
 <p:presentation xmlns:a="http://schemas.openxmlformats.org/drawingml/2006/main" xmlns:r="http://schemas.openxmlformats.org/officeDocument/2006/relationships" xmlns:p="http://schemas.openxmlformats.org/presentationml/2006/main" saveSubsetFonts="1">
   <p:sldMasterIdLst>
-    <p:sldMasterId id="2147483648" r:id="rId1"/>
+    <p:sldMasterId id="2147483679" r:id="rId1"/>
   </p:sldMasterIdLst>
   <p:sldIdLst>
     <p:sldId id="256" r:id="rId2"/>
-    <p:sldId id="257" r:id="rId3"/>
-    <p:sldId id="259" r:id="rId4"/>
+    <p:sldId id="266" r:id="rId3"/>
+    <p:sldId id="262" r:id="rId4"/>
+    <p:sldId id="264" r:id="rId5"/>
+    <p:sldId id="267" r:id="rId6"/>
+    <p:sldId id="265" r:id="rId7"/>
+    <p:sldId id="261" r:id="rId8"/>
+    <p:sldId id="260" r:id="rId9"/>
+    <p:sldId id="263" r:id="rId10"/>
+    <p:sldId id="257" r:id="rId11"/>
+    <p:sldId id="259" r:id="rId12"/>
   </p:sldIdLst>
   <p:sldSz cx="12192000" cy="6858000"/>
   <p:notesSz cx="6858000" cy="9144000"/>
   <p:defaultTextStyle>
     <a:defPPr>
-      <a:defRPr lang="en-IL"/>
+      <a:defRPr lang="LID4096"/>
     </a:defPPr>
     <a:lvl1pPr marL="0" algn="l" defTabSz="914400" rtl="0" eaLnBrk="1" latinLnBrk="0" hangingPunct="1">
       <a:defRPr sz="1800" kern="1200">
@@ -106,6 +114,11 @@
       </a:defRPr>
     </a:lvl9pPr>
   </p:defaultTextStyle>
+  <p:extLst>
+    <p:ext uri="{EFAFB233-063F-42B5-8137-9DF3F51BA10A}">
+      <p15:sldGuideLst xmlns:p15="http://schemas.microsoft.com/office/powerpoint/2012/main"/>
+    </p:ext>
+  </p:extLst>
 </p:presentation>
 </file>
 
@@ -149,7 +162,7 @@
               <a:cs typeface="+mn-cs"/>
             </a:defRPr>
           </a:pPr>
-          <a:endParaRPr lang="en-IL"/>
+          <a:endParaRPr lang="LID4096"/>
         </a:p>
       </c:txPr>
     </c:title>
@@ -186,6 +199,11 @@
               </a:ln>
               <a:effectLst/>
             </c:spPr>
+            <c:extLst>
+              <c:ext xmlns:c16="http://schemas.microsoft.com/office/drawing/2014/chart" uri="{C3380CC4-5D6E-409C-BE32-E72D297353CC}">
+                <c16:uniqueId val="{00000001-FF30-453F-AF51-A1D170EDC0E5}"/>
+              </c:ext>
+            </c:extLst>
           </c:dPt>
           <c:dPt>
             <c:idx val="1"/>
@@ -201,6 +219,11 @@
               </a:ln>
               <a:effectLst/>
             </c:spPr>
+            <c:extLst>
+              <c:ext xmlns:c16="http://schemas.microsoft.com/office/drawing/2014/chart" uri="{C3380CC4-5D6E-409C-BE32-E72D297353CC}">
+                <c16:uniqueId val="{00000003-FF30-453F-AF51-A1D170EDC0E5}"/>
+              </c:ext>
+            </c:extLst>
           </c:dPt>
           <c:dPt>
             <c:idx val="2"/>
@@ -216,6 +239,11 @@
               </a:ln>
               <a:effectLst/>
             </c:spPr>
+            <c:extLst>
+              <c:ext xmlns:c16="http://schemas.microsoft.com/office/drawing/2014/chart" uri="{C3380CC4-5D6E-409C-BE32-E72D297353CC}">
+                <c16:uniqueId val="{00000005-FF30-453F-AF51-A1D170EDC0E5}"/>
+              </c:ext>
+            </c:extLst>
           </c:dPt>
           <c:dPt>
             <c:idx val="3"/>
@@ -231,6 +259,11 @@
               </a:ln>
               <a:effectLst/>
             </c:spPr>
+            <c:extLst>
+              <c:ext xmlns:c16="http://schemas.microsoft.com/office/drawing/2014/chart" uri="{C3380CC4-5D6E-409C-BE32-E72D297353CC}">
+                <c16:uniqueId val="{00000007-FF30-453F-AF51-A1D170EDC0E5}"/>
+              </c:ext>
+            </c:extLst>
           </c:dPt>
           <c:cat>
             <c:strRef>
@@ -325,7 +358,7 @@
               <a:cs typeface="+mn-cs"/>
             </a:defRPr>
           </a:pPr>
-          <a:endParaRPr lang="en-IL"/>
+          <a:endParaRPr lang="LID4096"/>
         </a:p>
       </c:txPr>
     </c:legend>
@@ -354,7 +387,7 @@
       <a:pPr>
         <a:defRPr/>
       </a:pPr>
-      <a:endParaRPr lang="en-IL"/>
+      <a:endParaRPr lang="LID4096"/>
     </a:p>
   </c:txPr>
   <c:externalData r:id="rId3">
@@ -944,7 +977,7 @@
           <p:cNvPr id="2" name="Title 1">
             <a:extLst>
               <a:ext uri="{FF2B5EF4-FFF2-40B4-BE49-F238E27FC236}">
-                <a16:creationId xmlns:a16="http://schemas.microsoft.com/office/drawing/2014/main" id="{86ACF97A-E79A-4312-96C4-B8F8DD34F3AC}"/>
+                <a16:creationId xmlns:a16="http://schemas.microsoft.com/office/drawing/2014/main" id="{918EC3DF-D630-4B73-8602-871D5B58076E}"/>
               </a:ext>
             </a:extLst>
           </p:cNvPr>
@@ -973,7 +1006,7 @@
               <a:rPr lang="en-US"/>
               <a:t>Click to edit Master title style</a:t>
             </a:r>
-            <a:endParaRPr lang="en-IL"/>
+            <a:endParaRPr lang="LID4096"/>
           </a:p>
         </p:txBody>
       </p:sp>
@@ -982,7 +1015,7 @@
           <p:cNvPr id="3" name="Subtitle 2">
             <a:extLst>
               <a:ext uri="{FF2B5EF4-FFF2-40B4-BE49-F238E27FC236}">
-                <a16:creationId xmlns:a16="http://schemas.microsoft.com/office/drawing/2014/main" id="{4C3C183A-8300-4849-AEFE-F6582D724477}"/>
+                <a16:creationId xmlns:a16="http://schemas.microsoft.com/office/drawing/2014/main" id="{C4D1E2D3-8ADB-48B1-8B3A-8C6FADC7F7D5}"/>
               </a:ext>
             </a:extLst>
           </p:cNvPr>
@@ -1044,7 +1077,7 @@
               <a:rPr lang="en-US"/>
               <a:t>Click to edit Master subtitle style</a:t>
             </a:r>
-            <a:endParaRPr lang="en-IL"/>
+            <a:endParaRPr lang="LID4096"/>
           </a:p>
         </p:txBody>
       </p:sp>
@@ -1053,7 +1086,7 @@
           <p:cNvPr id="4" name="Date Placeholder 3">
             <a:extLst>
               <a:ext uri="{FF2B5EF4-FFF2-40B4-BE49-F238E27FC236}">
-                <a16:creationId xmlns:a16="http://schemas.microsoft.com/office/drawing/2014/main" id="{5A13D557-6E04-4F38-9BA8-34FE77441AC9}"/>
+                <a16:creationId xmlns:a16="http://schemas.microsoft.com/office/drawing/2014/main" id="{19F3C24C-0F11-4A51-8782-6DD6114B89E7}"/>
               </a:ext>
             </a:extLst>
           </p:cNvPr>
@@ -1071,7 +1104,7 @@
           <a:p>
             <a:fld id="{30976E16-775E-4B4F-9FA1-C4EE629F34C1}" type="datetimeFigureOut">
               <a:rPr lang="en-IL" smtClean="0"/>
-              <a:t>07/09/2020</a:t>
+              <a:t>09/08/2020</a:t>
             </a:fld>
             <a:endParaRPr lang="en-IL"/>
           </a:p>
@@ -1082,7 +1115,7 @@
           <p:cNvPr id="5" name="Footer Placeholder 4">
             <a:extLst>
               <a:ext uri="{FF2B5EF4-FFF2-40B4-BE49-F238E27FC236}">
-                <a16:creationId xmlns:a16="http://schemas.microsoft.com/office/drawing/2014/main" id="{26424E05-6966-451F-9701-A3349B6E9861}"/>
+                <a16:creationId xmlns:a16="http://schemas.microsoft.com/office/drawing/2014/main" id="{D0C466EA-CD01-428B-8C3F-7089A0DDEA4E}"/>
               </a:ext>
             </a:extLst>
           </p:cNvPr>
@@ -1107,7 +1140,7 @@
           <p:cNvPr id="6" name="Slide Number Placeholder 5">
             <a:extLst>
               <a:ext uri="{FF2B5EF4-FFF2-40B4-BE49-F238E27FC236}">
-                <a16:creationId xmlns:a16="http://schemas.microsoft.com/office/drawing/2014/main" id="{0C2636E7-DA7F-4290-A245-985A0C3359F4}"/>
+                <a16:creationId xmlns:a16="http://schemas.microsoft.com/office/drawing/2014/main" id="{036D672B-C3C3-4841-B812-57EC979467D7}"/>
               </a:ext>
             </a:extLst>
           </p:cNvPr>
@@ -1134,7 +1167,7 @@
     </p:spTree>
     <p:extLst>
       <p:ext uri="{BB962C8B-B14F-4D97-AF65-F5344CB8AC3E}">
-        <p14:creationId xmlns:p14="http://schemas.microsoft.com/office/powerpoint/2010/main" val="2493775482"/>
+        <p14:creationId xmlns:p14="http://schemas.microsoft.com/office/powerpoint/2010/main" val="3032050190"/>
       </p:ext>
     </p:extLst>
   </p:cSld>
@@ -1166,7 +1199,7 @@
           <p:cNvPr id="2" name="Title 1">
             <a:extLst>
               <a:ext uri="{FF2B5EF4-FFF2-40B4-BE49-F238E27FC236}">
-                <a16:creationId xmlns:a16="http://schemas.microsoft.com/office/drawing/2014/main" id="{06FEA1A4-3C22-4216-95CE-82536B293818}"/>
+                <a16:creationId xmlns:a16="http://schemas.microsoft.com/office/drawing/2014/main" id="{3E33C301-C04A-4309-80DC-C5C1A6B5F9E7}"/>
               </a:ext>
             </a:extLst>
           </p:cNvPr>
@@ -1186,7 +1219,7 @@
               <a:rPr lang="en-US"/>
               <a:t>Click to edit Master title style</a:t>
             </a:r>
-            <a:endParaRPr lang="en-IL"/>
+            <a:endParaRPr lang="LID4096"/>
           </a:p>
         </p:txBody>
       </p:sp>
@@ -1195,7 +1228,7 @@
           <p:cNvPr id="3" name="Vertical Text Placeholder 2">
             <a:extLst>
               <a:ext uri="{FF2B5EF4-FFF2-40B4-BE49-F238E27FC236}">
-                <a16:creationId xmlns:a16="http://schemas.microsoft.com/office/drawing/2014/main" id="{29853638-92F0-4D6C-8267-1078B254D9B0}"/>
+                <a16:creationId xmlns:a16="http://schemas.microsoft.com/office/drawing/2014/main" id="{0A0DE8F3-2654-490E-A5A7-9970321ECD36}"/>
               </a:ext>
             </a:extLst>
           </p:cNvPr>
@@ -1244,7 +1277,7 @@
               <a:rPr lang="en-US"/>
               <a:t>Fifth level</a:t>
             </a:r>
-            <a:endParaRPr lang="en-IL"/>
+            <a:endParaRPr lang="LID4096"/>
           </a:p>
         </p:txBody>
       </p:sp>
@@ -1253,7 +1286,7 @@
           <p:cNvPr id="4" name="Date Placeholder 3">
             <a:extLst>
               <a:ext uri="{FF2B5EF4-FFF2-40B4-BE49-F238E27FC236}">
-                <a16:creationId xmlns:a16="http://schemas.microsoft.com/office/drawing/2014/main" id="{68798448-A932-498D-8F0D-63B101DDA96B}"/>
+                <a16:creationId xmlns:a16="http://schemas.microsoft.com/office/drawing/2014/main" id="{5DD1CC06-17D0-4218-940A-8F3304A6A249}"/>
               </a:ext>
             </a:extLst>
           </p:cNvPr>
@@ -1271,7 +1304,7 @@
           <a:p>
             <a:fld id="{30976E16-775E-4B4F-9FA1-C4EE629F34C1}" type="datetimeFigureOut">
               <a:rPr lang="en-IL" smtClean="0"/>
-              <a:t>07/09/2020</a:t>
+              <a:t>09/08/2020</a:t>
             </a:fld>
             <a:endParaRPr lang="en-IL"/>
           </a:p>
@@ -1282,7 +1315,7 @@
           <p:cNvPr id="5" name="Footer Placeholder 4">
             <a:extLst>
               <a:ext uri="{FF2B5EF4-FFF2-40B4-BE49-F238E27FC236}">
-                <a16:creationId xmlns:a16="http://schemas.microsoft.com/office/drawing/2014/main" id="{57A37E31-0D15-4020-843A-A4C83A3FC9E2}"/>
+                <a16:creationId xmlns:a16="http://schemas.microsoft.com/office/drawing/2014/main" id="{9EEBDB2D-5A2B-4A4C-8CD3-B2DE15CD3973}"/>
               </a:ext>
             </a:extLst>
           </p:cNvPr>
@@ -1298,7 +1331,7 @@
           <a:bodyPr/>
           <a:lstStyle/>
           <a:p>
-            <a:endParaRPr lang="en-IL"/>
+            <a:endParaRPr lang="en-IL" dirty="0"/>
           </a:p>
         </p:txBody>
       </p:sp>
@@ -1307,7 +1340,7 @@
           <p:cNvPr id="6" name="Slide Number Placeholder 5">
             <a:extLst>
               <a:ext uri="{FF2B5EF4-FFF2-40B4-BE49-F238E27FC236}">
-                <a16:creationId xmlns:a16="http://schemas.microsoft.com/office/drawing/2014/main" id="{B7778B84-6C6C-4B87-9CEF-712A0CED2953}"/>
+                <a16:creationId xmlns:a16="http://schemas.microsoft.com/office/drawing/2014/main" id="{479237FF-B9CD-459C-A6F7-8E04D455B227}"/>
               </a:ext>
             </a:extLst>
           </p:cNvPr>
@@ -1334,7 +1367,7 @@
     </p:spTree>
     <p:extLst>
       <p:ext uri="{BB962C8B-B14F-4D97-AF65-F5344CB8AC3E}">
-        <p14:creationId xmlns:p14="http://schemas.microsoft.com/office/powerpoint/2010/main" val="277487844"/>
+        <p14:creationId xmlns:p14="http://schemas.microsoft.com/office/powerpoint/2010/main" val="2994867477"/>
       </p:ext>
     </p:extLst>
   </p:cSld>
@@ -1366,7 +1399,7 @@
           <p:cNvPr id="2" name="Vertical Title 1">
             <a:extLst>
               <a:ext uri="{FF2B5EF4-FFF2-40B4-BE49-F238E27FC236}">
-                <a16:creationId xmlns:a16="http://schemas.microsoft.com/office/drawing/2014/main" id="{F39A747C-2FB5-4460-9A11-C206749C198B}"/>
+                <a16:creationId xmlns:a16="http://schemas.microsoft.com/office/drawing/2014/main" id="{6F1EC635-CE8D-4894-814C-0C82A2713C90}"/>
               </a:ext>
             </a:extLst>
           </p:cNvPr>
@@ -1391,7 +1424,7 @@
               <a:rPr lang="en-US"/>
               <a:t>Click to edit Master title style</a:t>
             </a:r>
-            <a:endParaRPr lang="en-IL"/>
+            <a:endParaRPr lang="LID4096"/>
           </a:p>
         </p:txBody>
       </p:sp>
@@ -1400,7 +1433,7 @@
           <p:cNvPr id="3" name="Vertical Text Placeholder 2">
             <a:extLst>
               <a:ext uri="{FF2B5EF4-FFF2-40B4-BE49-F238E27FC236}">
-                <a16:creationId xmlns:a16="http://schemas.microsoft.com/office/drawing/2014/main" id="{BCF2A655-26BC-4BFF-A61E-0B525E1E6FBD}"/>
+                <a16:creationId xmlns:a16="http://schemas.microsoft.com/office/drawing/2014/main" id="{F22AC49A-D2EC-45EB-8CCB-0EC8F20C0B66}"/>
               </a:ext>
             </a:extLst>
           </p:cNvPr>
@@ -1454,7 +1487,7 @@
               <a:rPr lang="en-US"/>
               <a:t>Fifth level</a:t>
             </a:r>
-            <a:endParaRPr lang="en-IL"/>
+            <a:endParaRPr lang="LID4096"/>
           </a:p>
         </p:txBody>
       </p:sp>
@@ -1463,7 +1496,7 @@
           <p:cNvPr id="4" name="Date Placeholder 3">
             <a:extLst>
               <a:ext uri="{FF2B5EF4-FFF2-40B4-BE49-F238E27FC236}">
-                <a16:creationId xmlns:a16="http://schemas.microsoft.com/office/drawing/2014/main" id="{5049D0BB-90BC-403B-81D9-4A4F07959892}"/>
+                <a16:creationId xmlns:a16="http://schemas.microsoft.com/office/drawing/2014/main" id="{A1205788-F004-41A2-BB5B-0C4E587F58FA}"/>
               </a:ext>
             </a:extLst>
           </p:cNvPr>
@@ -1481,7 +1514,7 @@
           <a:p>
             <a:fld id="{30976E16-775E-4B4F-9FA1-C4EE629F34C1}" type="datetimeFigureOut">
               <a:rPr lang="en-IL" smtClean="0"/>
-              <a:t>07/09/2020</a:t>
+              <a:t>09/08/2020</a:t>
             </a:fld>
             <a:endParaRPr lang="en-IL"/>
           </a:p>
@@ -1492,7 +1525,7 @@
           <p:cNvPr id="5" name="Footer Placeholder 4">
             <a:extLst>
               <a:ext uri="{FF2B5EF4-FFF2-40B4-BE49-F238E27FC236}">
-                <a16:creationId xmlns:a16="http://schemas.microsoft.com/office/drawing/2014/main" id="{D71D403C-A72B-4BF7-9A34-75B5B29FE562}"/>
+                <a16:creationId xmlns:a16="http://schemas.microsoft.com/office/drawing/2014/main" id="{089430B8-F13E-49F2-80BA-387ABED7C160}"/>
               </a:ext>
             </a:extLst>
           </p:cNvPr>
@@ -1508,7 +1541,7 @@
           <a:bodyPr/>
           <a:lstStyle/>
           <a:p>
-            <a:endParaRPr lang="en-IL"/>
+            <a:endParaRPr lang="en-IL" dirty="0"/>
           </a:p>
         </p:txBody>
       </p:sp>
@@ -1517,7 +1550,7 @@
           <p:cNvPr id="6" name="Slide Number Placeholder 5">
             <a:extLst>
               <a:ext uri="{FF2B5EF4-FFF2-40B4-BE49-F238E27FC236}">
-                <a16:creationId xmlns:a16="http://schemas.microsoft.com/office/drawing/2014/main" id="{FF3824D5-145D-4BA9-84CB-D0165EE0BB9B}"/>
+                <a16:creationId xmlns:a16="http://schemas.microsoft.com/office/drawing/2014/main" id="{6D6F1BE5-6A1E-4FFC-AE01-7EE3BA0B5B0B}"/>
               </a:ext>
             </a:extLst>
           </p:cNvPr>
@@ -1544,7 +1577,7 @@
     </p:spTree>
     <p:extLst>
       <p:ext uri="{BB962C8B-B14F-4D97-AF65-F5344CB8AC3E}">
-        <p14:creationId xmlns:p14="http://schemas.microsoft.com/office/powerpoint/2010/main" val="698780186"/>
+        <p14:creationId xmlns:p14="http://schemas.microsoft.com/office/powerpoint/2010/main" val="893785382"/>
       </p:ext>
     </p:extLst>
   </p:cSld>
@@ -1576,7 +1609,7 @@
           <p:cNvPr id="2" name="Title 1">
             <a:extLst>
               <a:ext uri="{FF2B5EF4-FFF2-40B4-BE49-F238E27FC236}">
-                <a16:creationId xmlns:a16="http://schemas.microsoft.com/office/drawing/2014/main" id="{15569F06-2170-47B8-928B-DD2071C36B74}"/>
+                <a16:creationId xmlns:a16="http://schemas.microsoft.com/office/drawing/2014/main" id="{A3E287AB-F6D8-4DA8-9C87-360DE6D50C10}"/>
               </a:ext>
             </a:extLst>
           </p:cNvPr>
@@ -1596,7 +1629,7 @@
               <a:rPr lang="en-US"/>
               <a:t>Click to edit Master title style</a:t>
             </a:r>
-            <a:endParaRPr lang="en-IL"/>
+            <a:endParaRPr lang="LID4096"/>
           </a:p>
         </p:txBody>
       </p:sp>
@@ -1605,7 +1638,7 @@
           <p:cNvPr id="3" name="Content Placeholder 2">
             <a:extLst>
               <a:ext uri="{FF2B5EF4-FFF2-40B4-BE49-F238E27FC236}">
-                <a16:creationId xmlns:a16="http://schemas.microsoft.com/office/drawing/2014/main" id="{D2CE40B1-DDDD-43A1-AB42-49AA62E8B03D}"/>
+                <a16:creationId xmlns:a16="http://schemas.microsoft.com/office/drawing/2014/main" id="{D9DB6987-017E-4C39-BDA3-80A5AEA3CEF9}"/>
               </a:ext>
             </a:extLst>
           </p:cNvPr>
@@ -1654,7 +1687,7 @@
               <a:rPr lang="en-US"/>
               <a:t>Fifth level</a:t>
             </a:r>
-            <a:endParaRPr lang="en-IL"/>
+            <a:endParaRPr lang="LID4096"/>
           </a:p>
         </p:txBody>
       </p:sp>
@@ -1663,7 +1696,7 @@
           <p:cNvPr id="4" name="Date Placeholder 3">
             <a:extLst>
               <a:ext uri="{FF2B5EF4-FFF2-40B4-BE49-F238E27FC236}">
-                <a16:creationId xmlns:a16="http://schemas.microsoft.com/office/drawing/2014/main" id="{84E88F3C-6DB0-4C74-B08B-35801C752E54}"/>
+                <a16:creationId xmlns:a16="http://schemas.microsoft.com/office/drawing/2014/main" id="{3B6C3122-7AD6-4444-B8C3-5D0FB2FD8381}"/>
               </a:ext>
             </a:extLst>
           </p:cNvPr>
@@ -1681,7 +1714,7 @@
           <a:p>
             <a:fld id="{30976E16-775E-4B4F-9FA1-C4EE629F34C1}" type="datetimeFigureOut">
               <a:rPr lang="en-IL" smtClean="0"/>
-              <a:t>07/09/2020</a:t>
+              <a:t>09/08/2020</a:t>
             </a:fld>
             <a:endParaRPr lang="en-IL"/>
           </a:p>
@@ -1692,7 +1725,7 @@
           <p:cNvPr id="5" name="Footer Placeholder 4">
             <a:extLst>
               <a:ext uri="{FF2B5EF4-FFF2-40B4-BE49-F238E27FC236}">
-                <a16:creationId xmlns:a16="http://schemas.microsoft.com/office/drawing/2014/main" id="{9B2AA4DA-C0FC-41DD-BECF-F8231677A817}"/>
+                <a16:creationId xmlns:a16="http://schemas.microsoft.com/office/drawing/2014/main" id="{DEF94B14-AD25-4A51-AB46-C575E672B41D}"/>
               </a:ext>
             </a:extLst>
           </p:cNvPr>
@@ -1708,7 +1741,7 @@
           <a:bodyPr/>
           <a:lstStyle/>
           <a:p>
-            <a:endParaRPr lang="en-IL"/>
+            <a:endParaRPr lang="en-IL" dirty="0"/>
           </a:p>
         </p:txBody>
       </p:sp>
@@ -1717,7 +1750,7 @@
           <p:cNvPr id="6" name="Slide Number Placeholder 5">
             <a:extLst>
               <a:ext uri="{FF2B5EF4-FFF2-40B4-BE49-F238E27FC236}">
-                <a16:creationId xmlns:a16="http://schemas.microsoft.com/office/drawing/2014/main" id="{64198AFB-E357-4AA0-B558-5F3691D82B97}"/>
+                <a16:creationId xmlns:a16="http://schemas.microsoft.com/office/drawing/2014/main" id="{3F682511-76CF-4F7A-8066-231FF5116B2E}"/>
               </a:ext>
             </a:extLst>
           </p:cNvPr>
@@ -1744,7 +1777,7 @@
     </p:spTree>
     <p:extLst>
       <p:ext uri="{BB962C8B-B14F-4D97-AF65-F5344CB8AC3E}">
-        <p14:creationId xmlns:p14="http://schemas.microsoft.com/office/powerpoint/2010/main" val="4238176128"/>
+        <p14:creationId xmlns:p14="http://schemas.microsoft.com/office/powerpoint/2010/main" val="2529648191"/>
       </p:ext>
     </p:extLst>
   </p:cSld>
@@ -1776,7 +1809,7 @@
           <p:cNvPr id="2" name="Title 1">
             <a:extLst>
               <a:ext uri="{FF2B5EF4-FFF2-40B4-BE49-F238E27FC236}">
-                <a16:creationId xmlns:a16="http://schemas.microsoft.com/office/drawing/2014/main" id="{6B6A790A-28D3-44D1-8B34-C4990D23A31B}"/>
+                <a16:creationId xmlns:a16="http://schemas.microsoft.com/office/drawing/2014/main" id="{ABAB73B3-51B7-4DC7-82CB-36B04F18396E}"/>
               </a:ext>
             </a:extLst>
           </p:cNvPr>
@@ -1805,7 +1838,7 @@
               <a:rPr lang="en-US"/>
               <a:t>Click to edit Master title style</a:t>
             </a:r>
-            <a:endParaRPr lang="en-IL"/>
+            <a:endParaRPr lang="LID4096"/>
           </a:p>
         </p:txBody>
       </p:sp>
@@ -1814,7 +1847,7 @@
           <p:cNvPr id="3" name="Text Placeholder 2">
             <a:extLst>
               <a:ext uri="{FF2B5EF4-FFF2-40B4-BE49-F238E27FC236}">
-                <a16:creationId xmlns:a16="http://schemas.microsoft.com/office/drawing/2014/main" id="{412972B8-FE5C-437E-874E-3400D7BA6492}"/>
+                <a16:creationId xmlns:a16="http://schemas.microsoft.com/office/drawing/2014/main" id="{5A4CC5AD-8A23-4D3A-AEA5-E0670DB82DCB}"/>
               </a:ext>
             </a:extLst>
           </p:cNvPr>
@@ -1939,7 +1972,7 @@
           <p:cNvPr id="4" name="Date Placeholder 3">
             <a:extLst>
               <a:ext uri="{FF2B5EF4-FFF2-40B4-BE49-F238E27FC236}">
-                <a16:creationId xmlns:a16="http://schemas.microsoft.com/office/drawing/2014/main" id="{5434FE04-B1E5-4A43-AC3A-1A6C4AF14D33}"/>
+                <a16:creationId xmlns:a16="http://schemas.microsoft.com/office/drawing/2014/main" id="{5577BDE4-C86D-49D2-9D37-1F68832437FD}"/>
               </a:ext>
             </a:extLst>
           </p:cNvPr>
@@ -1957,7 +1990,7 @@
           <a:p>
             <a:fld id="{30976E16-775E-4B4F-9FA1-C4EE629F34C1}" type="datetimeFigureOut">
               <a:rPr lang="en-IL" smtClean="0"/>
-              <a:t>07/09/2020</a:t>
+              <a:t>09/08/2020</a:t>
             </a:fld>
             <a:endParaRPr lang="en-IL"/>
           </a:p>
@@ -1968,7 +2001,7 @@
           <p:cNvPr id="5" name="Footer Placeholder 4">
             <a:extLst>
               <a:ext uri="{FF2B5EF4-FFF2-40B4-BE49-F238E27FC236}">
-                <a16:creationId xmlns:a16="http://schemas.microsoft.com/office/drawing/2014/main" id="{A2ED5B47-08FB-46B5-961E-29095590F105}"/>
+                <a16:creationId xmlns:a16="http://schemas.microsoft.com/office/drawing/2014/main" id="{B878C9F0-036E-4D84-9772-F8C09BD03869}"/>
               </a:ext>
             </a:extLst>
           </p:cNvPr>
@@ -1993,7 +2026,7 @@
           <p:cNvPr id="6" name="Slide Number Placeholder 5">
             <a:extLst>
               <a:ext uri="{FF2B5EF4-FFF2-40B4-BE49-F238E27FC236}">
-                <a16:creationId xmlns:a16="http://schemas.microsoft.com/office/drawing/2014/main" id="{F4D6E83D-05DF-4860-BDC6-2975042A59A7}"/>
+                <a16:creationId xmlns:a16="http://schemas.microsoft.com/office/drawing/2014/main" id="{1AED49D0-3764-4746-A282-F6D2F6E866FE}"/>
               </a:ext>
             </a:extLst>
           </p:cNvPr>
@@ -2020,7 +2053,7 @@
     </p:spTree>
     <p:extLst>
       <p:ext uri="{BB962C8B-B14F-4D97-AF65-F5344CB8AC3E}">
-        <p14:creationId xmlns:p14="http://schemas.microsoft.com/office/powerpoint/2010/main" val="237895807"/>
+        <p14:creationId xmlns:p14="http://schemas.microsoft.com/office/powerpoint/2010/main" val="3265272104"/>
       </p:ext>
     </p:extLst>
   </p:cSld>
@@ -2052,7 +2085,7 @@
           <p:cNvPr id="2" name="Title 1">
             <a:extLst>
               <a:ext uri="{FF2B5EF4-FFF2-40B4-BE49-F238E27FC236}">
-                <a16:creationId xmlns:a16="http://schemas.microsoft.com/office/drawing/2014/main" id="{B80E33C7-B705-4570-89B9-8526C42166CD}"/>
+                <a16:creationId xmlns:a16="http://schemas.microsoft.com/office/drawing/2014/main" id="{C5A6BF1B-673D-4DDC-8A24-85E6F7B941EE}"/>
               </a:ext>
             </a:extLst>
           </p:cNvPr>
@@ -2072,7 +2105,7 @@
               <a:rPr lang="en-US"/>
               <a:t>Click to edit Master title style</a:t>
             </a:r>
-            <a:endParaRPr lang="en-IL"/>
+            <a:endParaRPr lang="LID4096"/>
           </a:p>
         </p:txBody>
       </p:sp>
@@ -2081,7 +2114,7 @@
           <p:cNvPr id="3" name="Content Placeholder 2">
             <a:extLst>
               <a:ext uri="{FF2B5EF4-FFF2-40B4-BE49-F238E27FC236}">
-                <a16:creationId xmlns:a16="http://schemas.microsoft.com/office/drawing/2014/main" id="{225E64DF-0D40-4F64-B75E-A918070AF2BB}"/>
+                <a16:creationId xmlns:a16="http://schemas.microsoft.com/office/drawing/2014/main" id="{E243CF82-D9CC-4960-BB30-54139A7B6231}"/>
               </a:ext>
             </a:extLst>
           </p:cNvPr>
@@ -2135,7 +2168,7 @@
               <a:rPr lang="en-US"/>
               <a:t>Fifth level</a:t>
             </a:r>
-            <a:endParaRPr lang="en-IL"/>
+            <a:endParaRPr lang="LID4096"/>
           </a:p>
         </p:txBody>
       </p:sp>
@@ -2144,7 +2177,7 @@
           <p:cNvPr id="4" name="Content Placeholder 3">
             <a:extLst>
               <a:ext uri="{FF2B5EF4-FFF2-40B4-BE49-F238E27FC236}">
-                <a16:creationId xmlns:a16="http://schemas.microsoft.com/office/drawing/2014/main" id="{D65F7B91-9784-4811-AD6A-655DA6C291AF}"/>
+                <a16:creationId xmlns:a16="http://schemas.microsoft.com/office/drawing/2014/main" id="{E6A8A475-5388-45CF-90F0-B93C53D774E4}"/>
               </a:ext>
             </a:extLst>
           </p:cNvPr>
@@ -2198,7 +2231,7 @@
               <a:rPr lang="en-US"/>
               <a:t>Fifth level</a:t>
             </a:r>
-            <a:endParaRPr lang="en-IL"/>
+            <a:endParaRPr lang="LID4096"/>
           </a:p>
         </p:txBody>
       </p:sp>
@@ -2207,7 +2240,7 @@
           <p:cNvPr id="5" name="Date Placeholder 4">
             <a:extLst>
               <a:ext uri="{FF2B5EF4-FFF2-40B4-BE49-F238E27FC236}">
-                <a16:creationId xmlns:a16="http://schemas.microsoft.com/office/drawing/2014/main" id="{B3B5882B-15EA-472A-BAC5-B56CAB5D87B4}"/>
+                <a16:creationId xmlns:a16="http://schemas.microsoft.com/office/drawing/2014/main" id="{CB1F6871-9C91-46B6-8443-55540A057544}"/>
               </a:ext>
             </a:extLst>
           </p:cNvPr>
@@ -2225,7 +2258,7 @@
           <a:p>
             <a:fld id="{30976E16-775E-4B4F-9FA1-C4EE629F34C1}" type="datetimeFigureOut">
               <a:rPr lang="en-IL" smtClean="0"/>
-              <a:t>07/09/2020</a:t>
+              <a:t>09/08/2020</a:t>
             </a:fld>
             <a:endParaRPr lang="en-IL"/>
           </a:p>
@@ -2236,7 +2269,7 @@
           <p:cNvPr id="6" name="Footer Placeholder 5">
             <a:extLst>
               <a:ext uri="{FF2B5EF4-FFF2-40B4-BE49-F238E27FC236}">
-                <a16:creationId xmlns:a16="http://schemas.microsoft.com/office/drawing/2014/main" id="{18AD27B2-F8C6-483E-A2E7-B2D1AE728F48}"/>
+                <a16:creationId xmlns:a16="http://schemas.microsoft.com/office/drawing/2014/main" id="{00BFB8C2-8350-407D-B55A-624EAE1A4319}"/>
               </a:ext>
             </a:extLst>
           </p:cNvPr>
@@ -2252,7 +2285,7 @@
           <a:bodyPr/>
           <a:lstStyle/>
           <a:p>
-            <a:endParaRPr lang="en-IL"/>
+            <a:endParaRPr lang="en-IL" dirty="0"/>
           </a:p>
         </p:txBody>
       </p:sp>
@@ -2261,7 +2294,7 @@
           <p:cNvPr id="7" name="Slide Number Placeholder 6">
             <a:extLst>
               <a:ext uri="{FF2B5EF4-FFF2-40B4-BE49-F238E27FC236}">
-                <a16:creationId xmlns:a16="http://schemas.microsoft.com/office/drawing/2014/main" id="{05F8A7FB-71AB-4088-92D1-CCBEAA54010F}"/>
+                <a16:creationId xmlns:a16="http://schemas.microsoft.com/office/drawing/2014/main" id="{A02DD490-6F37-4927-AEA1-9FB09A285324}"/>
               </a:ext>
             </a:extLst>
           </p:cNvPr>
@@ -2288,7 +2321,7 @@
     </p:spTree>
     <p:extLst>
       <p:ext uri="{BB962C8B-B14F-4D97-AF65-F5344CB8AC3E}">
-        <p14:creationId xmlns:p14="http://schemas.microsoft.com/office/powerpoint/2010/main" val="912412069"/>
+        <p14:creationId xmlns:p14="http://schemas.microsoft.com/office/powerpoint/2010/main" val="2548120684"/>
       </p:ext>
     </p:extLst>
   </p:cSld>
@@ -2320,7 +2353,7 @@
           <p:cNvPr id="2" name="Title 1">
             <a:extLst>
               <a:ext uri="{FF2B5EF4-FFF2-40B4-BE49-F238E27FC236}">
-                <a16:creationId xmlns:a16="http://schemas.microsoft.com/office/drawing/2014/main" id="{74B533EB-4F11-4A42-902C-833770C0D75A}"/>
+                <a16:creationId xmlns:a16="http://schemas.microsoft.com/office/drawing/2014/main" id="{3BB7C3EE-0FFE-4699-B9B9-24E3F043A71D}"/>
               </a:ext>
             </a:extLst>
           </p:cNvPr>
@@ -2345,7 +2378,7 @@
               <a:rPr lang="en-US"/>
               <a:t>Click to edit Master title style</a:t>
             </a:r>
-            <a:endParaRPr lang="en-IL"/>
+            <a:endParaRPr lang="LID4096"/>
           </a:p>
         </p:txBody>
       </p:sp>
@@ -2354,7 +2387,7 @@
           <p:cNvPr id="3" name="Text Placeholder 2">
             <a:extLst>
               <a:ext uri="{FF2B5EF4-FFF2-40B4-BE49-F238E27FC236}">
-                <a16:creationId xmlns:a16="http://schemas.microsoft.com/office/drawing/2014/main" id="{9B0410F8-3B67-4345-8E4D-D040DEA58BF1}"/>
+                <a16:creationId xmlns:a16="http://schemas.microsoft.com/office/drawing/2014/main" id="{F3AB5D1F-F544-4A04-BB13-5C6EBDF7C141}"/>
               </a:ext>
             </a:extLst>
           </p:cNvPr>
@@ -2425,7 +2458,7 @@
           <p:cNvPr id="4" name="Content Placeholder 3">
             <a:extLst>
               <a:ext uri="{FF2B5EF4-FFF2-40B4-BE49-F238E27FC236}">
-                <a16:creationId xmlns:a16="http://schemas.microsoft.com/office/drawing/2014/main" id="{E11A15B9-21C3-4288-8525-5945E357B822}"/>
+                <a16:creationId xmlns:a16="http://schemas.microsoft.com/office/drawing/2014/main" id="{E419767E-4ECA-485C-8250-0138CC626C2C}"/>
               </a:ext>
             </a:extLst>
           </p:cNvPr>
@@ -2479,7 +2512,7 @@
               <a:rPr lang="en-US"/>
               <a:t>Fifth level</a:t>
             </a:r>
-            <a:endParaRPr lang="en-IL"/>
+            <a:endParaRPr lang="LID4096"/>
           </a:p>
         </p:txBody>
       </p:sp>
@@ -2488,7 +2521,7 @@
           <p:cNvPr id="5" name="Text Placeholder 4">
             <a:extLst>
               <a:ext uri="{FF2B5EF4-FFF2-40B4-BE49-F238E27FC236}">
-                <a16:creationId xmlns:a16="http://schemas.microsoft.com/office/drawing/2014/main" id="{B2D94577-1F0B-43B8-AF4D-6CDD11868B02}"/>
+                <a16:creationId xmlns:a16="http://schemas.microsoft.com/office/drawing/2014/main" id="{DADE54C4-676A-4A90-AB6F-DDDA8F71DBD3}"/>
               </a:ext>
             </a:extLst>
           </p:cNvPr>
@@ -2559,7 +2592,7 @@
           <p:cNvPr id="6" name="Content Placeholder 5">
             <a:extLst>
               <a:ext uri="{FF2B5EF4-FFF2-40B4-BE49-F238E27FC236}">
-                <a16:creationId xmlns:a16="http://schemas.microsoft.com/office/drawing/2014/main" id="{549EBE6F-CC77-4EFB-BBFD-06CF7A5D6C07}"/>
+                <a16:creationId xmlns:a16="http://schemas.microsoft.com/office/drawing/2014/main" id="{2C33222F-0F98-4D13-B9DC-AA03C00E8178}"/>
               </a:ext>
             </a:extLst>
           </p:cNvPr>
@@ -2613,7 +2646,7 @@
               <a:rPr lang="en-US"/>
               <a:t>Fifth level</a:t>
             </a:r>
-            <a:endParaRPr lang="en-IL"/>
+            <a:endParaRPr lang="LID4096"/>
           </a:p>
         </p:txBody>
       </p:sp>
@@ -2622,7 +2655,7 @@
           <p:cNvPr id="7" name="Date Placeholder 6">
             <a:extLst>
               <a:ext uri="{FF2B5EF4-FFF2-40B4-BE49-F238E27FC236}">
-                <a16:creationId xmlns:a16="http://schemas.microsoft.com/office/drawing/2014/main" id="{33B24A8E-8066-45F7-8DBE-496DA0412F50}"/>
+                <a16:creationId xmlns:a16="http://schemas.microsoft.com/office/drawing/2014/main" id="{BB094606-2975-429B-A5AE-1D979F38D082}"/>
               </a:ext>
             </a:extLst>
           </p:cNvPr>
@@ -2640,7 +2673,7 @@
           <a:p>
             <a:fld id="{30976E16-775E-4B4F-9FA1-C4EE629F34C1}" type="datetimeFigureOut">
               <a:rPr lang="en-IL" smtClean="0"/>
-              <a:t>07/09/2020</a:t>
+              <a:t>09/08/2020</a:t>
             </a:fld>
             <a:endParaRPr lang="en-IL"/>
           </a:p>
@@ -2651,7 +2684,7 @@
           <p:cNvPr id="8" name="Footer Placeholder 7">
             <a:extLst>
               <a:ext uri="{FF2B5EF4-FFF2-40B4-BE49-F238E27FC236}">
-                <a16:creationId xmlns:a16="http://schemas.microsoft.com/office/drawing/2014/main" id="{4C89A1D4-3AC8-40CB-A1D5-AFF58930D93F}"/>
+                <a16:creationId xmlns:a16="http://schemas.microsoft.com/office/drawing/2014/main" id="{B7753449-91EC-4AAE-A3DA-6DF3B38D4B7A}"/>
               </a:ext>
             </a:extLst>
           </p:cNvPr>
@@ -2667,7 +2700,7 @@
           <a:bodyPr/>
           <a:lstStyle/>
           <a:p>
-            <a:endParaRPr lang="en-IL"/>
+            <a:endParaRPr lang="en-IL" dirty="0"/>
           </a:p>
         </p:txBody>
       </p:sp>
@@ -2676,7 +2709,7 @@
           <p:cNvPr id="9" name="Slide Number Placeholder 8">
             <a:extLst>
               <a:ext uri="{FF2B5EF4-FFF2-40B4-BE49-F238E27FC236}">
-                <a16:creationId xmlns:a16="http://schemas.microsoft.com/office/drawing/2014/main" id="{AD0C1A6E-F91F-45BD-B3EE-9AD0EE118B5E}"/>
+                <a16:creationId xmlns:a16="http://schemas.microsoft.com/office/drawing/2014/main" id="{95937CB8-130F-4435-98CE-E213107FD0E6}"/>
               </a:ext>
             </a:extLst>
           </p:cNvPr>
@@ -2703,7 +2736,7 @@
     </p:spTree>
     <p:extLst>
       <p:ext uri="{BB962C8B-B14F-4D97-AF65-F5344CB8AC3E}">
-        <p14:creationId xmlns:p14="http://schemas.microsoft.com/office/powerpoint/2010/main" val="1716776640"/>
+        <p14:creationId xmlns:p14="http://schemas.microsoft.com/office/powerpoint/2010/main" val="27232042"/>
       </p:ext>
     </p:extLst>
   </p:cSld>
@@ -2735,7 +2768,7 @@
           <p:cNvPr id="2" name="Title 1">
             <a:extLst>
               <a:ext uri="{FF2B5EF4-FFF2-40B4-BE49-F238E27FC236}">
-                <a16:creationId xmlns:a16="http://schemas.microsoft.com/office/drawing/2014/main" id="{F1551D4F-2EDC-4314-880D-E9653B664274}"/>
+                <a16:creationId xmlns:a16="http://schemas.microsoft.com/office/drawing/2014/main" id="{9FCCFD46-3F1B-42A5-8543-0ECE311C3B9B}"/>
               </a:ext>
             </a:extLst>
           </p:cNvPr>
@@ -2755,7 +2788,7 @@
               <a:rPr lang="en-US"/>
               <a:t>Click to edit Master title style</a:t>
             </a:r>
-            <a:endParaRPr lang="en-IL"/>
+            <a:endParaRPr lang="LID4096"/>
           </a:p>
         </p:txBody>
       </p:sp>
@@ -2764,7 +2797,7 @@
           <p:cNvPr id="3" name="Date Placeholder 2">
             <a:extLst>
               <a:ext uri="{FF2B5EF4-FFF2-40B4-BE49-F238E27FC236}">
-                <a16:creationId xmlns:a16="http://schemas.microsoft.com/office/drawing/2014/main" id="{7F735DD3-EAFF-4576-845A-D772B5080429}"/>
+                <a16:creationId xmlns:a16="http://schemas.microsoft.com/office/drawing/2014/main" id="{F684DE43-4574-48E1-AB42-DE81B3C64AED}"/>
               </a:ext>
             </a:extLst>
           </p:cNvPr>
@@ -2782,7 +2815,7 @@
           <a:p>
             <a:fld id="{30976E16-775E-4B4F-9FA1-C4EE629F34C1}" type="datetimeFigureOut">
               <a:rPr lang="en-IL" smtClean="0"/>
-              <a:t>07/09/2020</a:t>
+              <a:t>09/08/2020</a:t>
             </a:fld>
             <a:endParaRPr lang="en-IL"/>
           </a:p>
@@ -2793,7 +2826,7 @@
           <p:cNvPr id="4" name="Footer Placeholder 3">
             <a:extLst>
               <a:ext uri="{FF2B5EF4-FFF2-40B4-BE49-F238E27FC236}">
-                <a16:creationId xmlns:a16="http://schemas.microsoft.com/office/drawing/2014/main" id="{D9CA332C-E6DF-45E0-95BD-2EAE3BF94987}"/>
+                <a16:creationId xmlns:a16="http://schemas.microsoft.com/office/drawing/2014/main" id="{E87490BC-F359-4E16-BD92-E7C18E812B9E}"/>
               </a:ext>
             </a:extLst>
           </p:cNvPr>
@@ -2818,7 +2851,7 @@
           <p:cNvPr id="5" name="Slide Number Placeholder 4">
             <a:extLst>
               <a:ext uri="{FF2B5EF4-FFF2-40B4-BE49-F238E27FC236}">
-                <a16:creationId xmlns:a16="http://schemas.microsoft.com/office/drawing/2014/main" id="{F681B07C-B777-4348-8ED1-0759F0AA96A3}"/>
+                <a16:creationId xmlns:a16="http://schemas.microsoft.com/office/drawing/2014/main" id="{F8F642D2-48F6-41FE-8074-6D4147FBD405}"/>
               </a:ext>
             </a:extLst>
           </p:cNvPr>
@@ -2845,7 +2878,7 @@
     </p:spTree>
     <p:extLst>
       <p:ext uri="{BB962C8B-B14F-4D97-AF65-F5344CB8AC3E}">
-        <p14:creationId xmlns:p14="http://schemas.microsoft.com/office/powerpoint/2010/main" val="1950696716"/>
+        <p14:creationId xmlns:p14="http://schemas.microsoft.com/office/powerpoint/2010/main" val="3372828823"/>
       </p:ext>
     </p:extLst>
   </p:cSld>
@@ -2877,7 +2910,7 @@
           <p:cNvPr id="2" name="Date Placeholder 1">
             <a:extLst>
               <a:ext uri="{FF2B5EF4-FFF2-40B4-BE49-F238E27FC236}">
-                <a16:creationId xmlns:a16="http://schemas.microsoft.com/office/drawing/2014/main" id="{5EBC1A27-6316-499B-90B4-C1C0F71ADCB0}"/>
+                <a16:creationId xmlns:a16="http://schemas.microsoft.com/office/drawing/2014/main" id="{CCBF2102-72B7-429C-B95E-5875290E2822}"/>
               </a:ext>
             </a:extLst>
           </p:cNvPr>
@@ -2895,7 +2928,7 @@
           <a:p>
             <a:fld id="{30976E16-775E-4B4F-9FA1-C4EE629F34C1}" type="datetimeFigureOut">
               <a:rPr lang="en-IL" smtClean="0"/>
-              <a:t>07/09/2020</a:t>
+              <a:t>09/08/2020</a:t>
             </a:fld>
             <a:endParaRPr lang="en-IL"/>
           </a:p>
@@ -2906,7 +2939,7 @@
           <p:cNvPr id="3" name="Footer Placeholder 2">
             <a:extLst>
               <a:ext uri="{FF2B5EF4-FFF2-40B4-BE49-F238E27FC236}">
-                <a16:creationId xmlns:a16="http://schemas.microsoft.com/office/drawing/2014/main" id="{30F8521B-F36D-49E8-9898-CC1E8BFBE72C}"/>
+                <a16:creationId xmlns:a16="http://schemas.microsoft.com/office/drawing/2014/main" id="{2AAD4090-B871-4104-945B-41B5528A4529}"/>
               </a:ext>
             </a:extLst>
           </p:cNvPr>
@@ -2931,7 +2964,7 @@
           <p:cNvPr id="4" name="Slide Number Placeholder 3">
             <a:extLst>
               <a:ext uri="{FF2B5EF4-FFF2-40B4-BE49-F238E27FC236}">
-                <a16:creationId xmlns:a16="http://schemas.microsoft.com/office/drawing/2014/main" id="{C48EE704-B235-400E-B18F-AD735210B414}"/>
+                <a16:creationId xmlns:a16="http://schemas.microsoft.com/office/drawing/2014/main" id="{6A50AE59-F7BD-4DF2-BFFD-84127AA54BA2}"/>
               </a:ext>
             </a:extLst>
           </p:cNvPr>
@@ -2958,7 +2991,7 @@
     </p:spTree>
     <p:extLst>
       <p:ext uri="{BB962C8B-B14F-4D97-AF65-F5344CB8AC3E}">
-        <p14:creationId xmlns:p14="http://schemas.microsoft.com/office/powerpoint/2010/main" val="284808367"/>
+        <p14:creationId xmlns:p14="http://schemas.microsoft.com/office/powerpoint/2010/main" val="87286295"/>
       </p:ext>
     </p:extLst>
   </p:cSld>
@@ -2990,7 +3023,7 @@
           <p:cNvPr id="2" name="Title 1">
             <a:extLst>
               <a:ext uri="{FF2B5EF4-FFF2-40B4-BE49-F238E27FC236}">
-                <a16:creationId xmlns:a16="http://schemas.microsoft.com/office/drawing/2014/main" id="{9A5E22FF-E651-4FEB-9601-962333CEC919}"/>
+                <a16:creationId xmlns:a16="http://schemas.microsoft.com/office/drawing/2014/main" id="{D4CB75CF-1A15-44F8-BD26-97AB708D9EEB}"/>
               </a:ext>
             </a:extLst>
           </p:cNvPr>
@@ -3019,7 +3052,7 @@
               <a:rPr lang="en-US"/>
               <a:t>Click to edit Master title style</a:t>
             </a:r>
-            <a:endParaRPr lang="en-IL"/>
+            <a:endParaRPr lang="LID4096"/>
           </a:p>
         </p:txBody>
       </p:sp>
@@ -3028,7 +3061,7 @@
           <p:cNvPr id="3" name="Content Placeholder 2">
             <a:extLst>
               <a:ext uri="{FF2B5EF4-FFF2-40B4-BE49-F238E27FC236}">
-                <a16:creationId xmlns:a16="http://schemas.microsoft.com/office/drawing/2014/main" id="{462E400E-945D-4659-BA6E-64D7FCFE477E}"/>
+                <a16:creationId xmlns:a16="http://schemas.microsoft.com/office/drawing/2014/main" id="{E5CB0A71-DE89-4F6B-B0E1-B8F9A14D161E}"/>
               </a:ext>
             </a:extLst>
           </p:cNvPr>
@@ -3110,7 +3143,7 @@
               <a:rPr lang="en-US"/>
               <a:t>Fifth level</a:t>
             </a:r>
-            <a:endParaRPr lang="en-IL"/>
+            <a:endParaRPr lang="LID4096"/>
           </a:p>
         </p:txBody>
       </p:sp>
@@ -3119,7 +3152,7 @@
           <p:cNvPr id="4" name="Text Placeholder 3">
             <a:extLst>
               <a:ext uri="{FF2B5EF4-FFF2-40B4-BE49-F238E27FC236}">
-                <a16:creationId xmlns:a16="http://schemas.microsoft.com/office/drawing/2014/main" id="{9B9AF8F0-BE55-4E47-A638-6AE58E13EAEC}"/>
+                <a16:creationId xmlns:a16="http://schemas.microsoft.com/office/drawing/2014/main" id="{3470EBA6-54BC-416A-A308-DDCCAC095232}"/>
               </a:ext>
             </a:extLst>
           </p:cNvPr>
@@ -3190,7 +3223,7 @@
           <p:cNvPr id="5" name="Date Placeholder 4">
             <a:extLst>
               <a:ext uri="{FF2B5EF4-FFF2-40B4-BE49-F238E27FC236}">
-                <a16:creationId xmlns:a16="http://schemas.microsoft.com/office/drawing/2014/main" id="{87430E49-8734-4D33-BDEA-15FE528BA02D}"/>
+                <a16:creationId xmlns:a16="http://schemas.microsoft.com/office/drawing/2014/main" id="{B9FBC40F-D8D4-4202-ADAA-5F35188BF495}"/>
               </a:ext>
             </a:extLst>
           </p:cNvPr>
@@ -3208,7 +3241,7 @@
           <a:p>
             <a:fld id="{30976E16-775E-4B4F-9FA1-C4EE629F34C1}" type="datetimeFigureOut">
               <a:rPr lang="en-IL" smtClean="0"/>
-              <a:t>07/09/2020</a:t>
+              <a:t>09/08/2020</a:t>
             </a:fld>
             <a:endParaRPr lang="en-IL"/>
           </a:p>
@@ -3219,7 +3252,7 @@
           <p:cNvPr id="6" name="Footer Placeholder 5">
             <a:extLst>
               <a:ext uri="{FF2B5EF4-FFF2-40B4-BE49-F238E27FC236}">
-                <a16:creationId xmlns:a16="http://schemas.microsoft.com/office/drawing/2014/main" id="{E5042C6E-4300-4392-B9F1-0F7FE437238F}"/>
+                <a16:creationId xmlns:a16="http://schemas.microsoft.com/office/drawing/2014/main" id="{46BA958E-FDAA-42D6-A33B-16E0EAA87C1E}"/>
               </a:ext>
             </a:extLst>
           </p:cNvPr>
@@ -3235,7 +3268,7 @@
           <a:bodyPr/>
           <a:lstStyle/>
           <a:p>
-            <a:endParaRPr lang="en-IL"/>
+            <a:endParaRPr lang="en-IL" dirty="0"/>
           </a:p>
         </p:txBody>
       </p:sp>
@@ -3244,7 +3277,7 @@
           <p:cNvPr id="7" name="Slide Number Placeholder 6">
             <a:extLst>
               <a:ext uri="{FF2B5EF4-FFF2-40B4-BE49-F238E27FC236}">
-                <a16:creationId xmlns:a16="http://schemas.microsoft.com/office/drawing/2014/main" id="{CFFB4E5C-BA33-42DB-9BCD-310F5AA2CFD3}"/>
+                <a16:creationId xmlns:a16="http://schemas.microsoft.com/office/drawing/2014/main" id="{7291A11A-56B7-4FE1-BD4C-1165706FC9FB}"/>
               </a:ext>
             </a:extLst>
           </p:cNvPr>
@@ -3271,7 +3304,7 @@
     </p:spTree>
     <p:extLst>
       <p:ext uri="{BB962C8B-B14F-4D97-AF65-F5344CB8AC3E}">
-        <p14:creationId xmlns:p14="http://schemas.microsoft.com/office/powerpoint/2010/main" val="4035222423"/>
+        <p14:creationId xmlns:p14="http://schemas.microsoft.com/office/powerpoint/2010/main" val="3650921323"/>
       </p:ext>
     </p:extLst>
   </p:cSld>
@@ -3303,7 +3336,7 @@
           <p:cNvPr id="2" name="Title 1">
             <a:extLst>
               <a:ext uri="{FF2B5EF4-FFF2-40B4-BE49-F238E27FC236}">
-                <a16:creationId xmlns:a16="http://schemas.microsoft.com/office/drawing/2014/main" id="{738BB39E-2ED6-45FC-A489-D1FF8540D6D9}"/>
+                <a16:creationId xmlns:a16="http://schemas.microsoft.com/office/drawing/2014/main" id="{C44D3709-4BA0-46E6-AC25-E33A7D314A6F}"/>
               </a:ext>
             </a:extLst>
           </p:cNvPr>
@@ -3332,7 +3365,7 @@
               <a:rPr lang="en-US"/>
               <a:t>Click to edit Master title style</a:t>
             </a:r>
-            <a:endParaRPr lang="en-IL"/>
+            <a:endParaRPr lang="LID4096"/>
           </a:p>
         </p:txBody>
       </p:sp>
@@ -3341,7 +3374,7 @@
           <p:cNvPr id="3" name="Picture Placeholder 2">
             <a:extLst>
               <a:ext uri="{FF2B5EF4-FFF2-40B4-BE49-F238E27FC236}">
-                <a16:creationId xmlns:a16="http://schemas.microsoft.com/office/drawing/2014/main" id="{F786C48F-510E-44AF-A49B-2773BC925A98}"/>
+                <a16:creationId xmlns:a16="http://schemas.microsoft.com/office/drawing/2014/main" id="{A8638A15-E8CC-45F2-8590-F6E851397A11}"/>
               </a:ext>
             </a:extLst>
           </p:cNvPr>
@@ -3399,7 +3432,7 @@
             </a:lvl9pPr>
           </a:lstStyle>
           <a:p>
-            <a:endParaRPr lang="en-IL"/>
+            <a:endParaRPr lang="LID4096"/>
           </a:p>
         </p:txBody>
       </p:sp>
@@ -3408,7 +3441,7 @@
           <p:cNvPr id="4" name="Text Placeholder 3">
             <a:extLst>
               <a:ext uri="{FF2B5EF4-FFF2-40B4-BE49-F238E27FC236}">
-                <a16:creationId xmlns:a16="http://schemas.microsoft.com/office/drawing/2014/main" id="{D4E87D80-7027-4AB7-AC44-AAE7A9E15208}"/>
+                <a16:creationId xmlns:a16="http://schemas.microsoft.com/office/drawing/2014/main" id="{2651AE06-56CA-4EBA-BA88-CF9B8B1AF8EB}"/>
               </a:ext>
             </a:extLst>
           </p:cNvPr>
@@ -3479,7 +3512,7 @@
           <p:cNvPr id="5" name="Date Placeholder 4">
             <a:extLst>
               <a:ext uri="{FF2B5EF4-FFF2-40B4-BE49-F238E27FC236}">
-                <a16:creationId xmlns:a16="http://schemas.microsoft.com/office/drawing/2014/main" id="{08222329-10C6-4F9C-99EA-645C4C8CCB9B}"/>
+                <a16:creationId xmlns:a16="http://schemas.microsoft.com/office/drawing/2014/main" id="{5AFE829A-49DC-4881-B7A4-8121C863C5F4}"/>
               </a:ext>
             </a:extLst>
           </p:cNvPr>
@@ -3497,7 +3530,7 @@
           <a:p>
             <a:fld id="{30976E16-775E-4B4F-9FA1-C4EE629F34C1}" type="datetimeFigureOut">
               <a:rPr lang="en-IL" smtClean="0"/>
-              <a:t>07/09/2020</a:t>
+              <a:t>09/08/2020</a:t>
             </a:fld>
             <a:endParaRPr lang="en-IL"/>
           </a:p>
@@ -3508,7 +3541,7 @@
           <p:cNvPr id="6" name="Footer Placeholder 5">
             <a:extLst>
               <a:ext uri="{FF2B5EF4-FFF2-40B4-BE49-F238E27FC236}">
-                <a16:creationId xmlns:a16="http://schemas.microsoft.com/office/drawing/2014/main" id="{0018F7D1-0C83-4538-97F3-67795A2CC545}"/>
+                <a16:creationId xmlns:a16="http://schemas.microsoft.com/office/drawing/2014/main" id="{68B805C8-EB73-4363-AB2B-94EB445D72B7}"/>
               </a:ext>
             </a:extLst>
           </p:cNvPr>
@@ -3533,7 +3566,7 @@
           <p:cNvPr id="7" name="Slide Number Placeholder 6">
             <a:extLst>
               <a:ext uri="{FF2B5EF4-FFF2-40B4-BE49-F238E27FC236}">
-                <a16:creationId xmlns:a16="http://schemas.microsoft.com/office/drawing/2014/main" id="{6482FC38-5BAA-42E4-9E74-13B9BDAB5B64}"/>
+                <a16:creationId xmlns:a16="http://schemas.microsoft.com/office/drawing/2014/main" id="{2CBC03D4-975D-4D11-B266-8D0548288A64}"/>
               </a:ext>
             </a:extLst>
           </p:cNvPr>
@@ -3560,7 +3593,7 @@
     </p:spTree>
     <p:extLst>
       <p:ext uri="{BB962C8B-B14F-4D97-AF65-F5344CB8AC3E}">
-        <p14:creationId xmlns:p14="http://schemas.microsoft.com/office/powerpoint/2010/main" val="2287723128"/>
+        <p14:creationId xmlns:p14="http://schemas.microsoft.com/office/powerpoint/2010/main" val="448661355"/>
       </p:ext>
     </p:extLst>
   </p:cSld>
@@ -3597,7 +3630,7 @@
           <p:cNvPr id="2" name="Title Placeholder 1">
             <a:extLst>
               <a:ext uri="{FF2B5EF4-FFF2-40B4-BE49-F238E27FC236}">
-                <a16:creationId xmlns:a16="http://schemas.microsoft.com/office/drawing/2014/main" id="{9D171E6B-1259-4A36-B858-1E167F7EA08C}"/>
+                <a16:creationId xmlns:a16="http://schemas.microsoft.com/office/drawing/2014/main" id="{9B964A40-3A68-425E-B374-AA07EEFA6796}"/>
               </a:ext>
             </a:extLst>
           </p:cNvPr>
@@ -3627,7 +3660,7 @@
               <a:rPr lang="en-US"/>
               <a:t>Click to edit Master title style</a:t>
             </a:r>
-            <a:endParaRPr lang="en-IL"/>
+            <a:endParaRPr lang="LID4096"/>
           </a:p>
         </p:txBody>
       </p:sp>
@@ -3636,7 +3669,7 @@
           <p:cNvPr id="3" name="Text Placeholder 2">
             <a:extLst>
               <a:ext uri="{FF2B5EF4-FFF2-40B4-BE49-F238E27FC236}">
-                <a16:creationId xmlns:a16="http://schemas.microsoft.com/office/drawing/2014/main" id="{D8788DAC-C77C-4AB3-BCB4-6C4A0797E4DF}"/>
+                <a16:creationId xmlns:a16="http://schemas.microsoft.com/office/drawing/2014/main" id="{59859477-3882-453E-A6E5-60A8582F5ADD}"/>
               </a:ext>
             </a:extLst>
           </p:cNvPr>
@@ -3695,7 +3728,7 @@
               <a:rPr lang="en-US"/>
               <a:t>Fifth level</a:t>
             </a:r>
-            <a:endParaRPr lang="en-IL"/>
+            <a:endParaRPr lang="LID4096"/>
           </a:p>
         </p:txBody>
       </p:sp>
@@ -3704,7 +3737,7 @@
           <p:cNvPr id="4" name="Date Placeholder 3">
             <a:extLst>
               <a:ext uri="{FF2B5EF4-FFF2-40B4-BE49-F238E27FC236}">
-                <a16:creationId xmlns:a16="http://schemas.microsoft.com/office/drawing/2014/main" id="{F84B8DB0-D721-4A37-9794-C417825CFA8D}"/>
+                <a16:creationId xmlns:a16="http://schemas.microsoft.com/office/drawing/2014/main" id="{0E648D17-8007-4C7F-AAD3-1B75D44B6DB0}"/>
               </a:ext>
             </a:extLst>
           </p:cNvPr>
@@ -3740,7 +3773,7 @@
           <a:p>
             <a:fld id="{30976E16-775E-4B4F-9FA1-C4EE629F34C1}" type="datetimeFigureOut">
               <a:rPr lang="en-IL" smtClean="0"/>
-              <a:t>07/09/2020</a:t>
+              <a:t>09/08/2020</a:t>
             </a:fld>
             <a:endParaRPr lang="en-IL"/>
           </a:p>
@@ -3751,7 +3784,7 @@
           <p:cNvPr id="5" name="Footer Placeholder 4">
             <a:extLst>
               <a:ext uri="{FF2B5EF4-FFF2-40B4-BE49-F238E27FC236}">
-                <a16:creationId xmlns:a16="http://schemas.microsoft.com/office/drawing/2014/main" id="{3CC23698-4051-4AEA-91F3-4F0CD4D81237}"/>
+                <a16:creationId xmlns:a16="http://schemas.microsoft.com/office/drawing/2014/main" id="{BEA67D0D-F9CB-4736-9EED-89B9AA2FC331}"/>
               </a:ext>
             </a:extLst>
           </p:cNvPr>
@@ -3785,7 +3818,7 @@
             </a:lvl1pPr>
           </a:lstStyle>
           <a:p>
-            <a:endParaRPr lang="en-IL"/>
+            <a:endParaRPr lang="en-IL" dirty="0"/>
           </a:p>
         </p:txBody>
       </p:sp>
@@ -3794,7 +3827,7 @@
           <p:cNvPr id="6" name="Slide Number Placeholder 5">
             <a:extLst>
               <a:ext uri="{FF2B5EF4-FFF2-40B4-BE49-F238E27FC236}">
-                <a16:creationId xmlns:a16="http://schemas.microsoft.com/office/drawing/2014/main" id="{441B6D6C-13DC-474F-8FD7-6A6EC529832A}"/>
+                <a16:creationId xmlns:a16="http://schemas.microsoft.com/office/drawing/2014/main" id="{89E053B2-3F0D-4AD4-8AA5-AE520D2A5037}"/>
               </a:ext>
             </a:extLst>
           </p:cNvPr>
@@ -3836,26 +3869,62 @@
           </a:p>
         </p:txBody>
       </p:sp>
+      <p:pic>
+        <p:nvPicPr>
+          <p:cNvPr id="7" name="Content Placeholder 7" descr="A close up of a sign&#10;&#10;Description automatically generated">
+            <a:extLst>
+              <a:ext uri="{FF2B5EF4-FFF2-40B4-BE49-F238E27FC236}">
+                <a16:creationId xmlns:a16="http://schemas.microsoft.com/office/drawing/2014/main" id="{BBF52B1A-1914-4000-9E3D-AF4ACDCC2240}"/>
+              </a:ext>
+            </a:extLst>
+          </p:cNvPr>
+          <p:cNvPicPr>
+            <a:picLocks noChangeAspect="1"/>
+          </p:cNvPicPr>
+          <p:nvPr userDrawn="1"/>
+        </p:nvPicPr>
+        <p:blipFill>
+          <a:blip r:embed="rId13">
+            <a:extLst>
+              <a:ext uri="{28A0092B-C50C-407E-A947-70E740481C1C}">
+                <a14:useLocalDpi xmlns:a14="http://schemas.microsoft.com/office/drawing/2010/main" val="0"/>
+              </a:ext>
+            </a:extLst>
+          </a:blip>
+          <a:stretch>
+            <a:fillRect/>
+          </a:stretch>
+        </p:blipFill>
+        <p:spPr>
+          <a:xfrm>
+            <a:off x="559793" y="5849994"/>
+            <a:ext cx="1371655" cy="398406"/>
+          </a:xfrm>
+          <a:prstGeom prst="rect">
+            <a:avLst/>
+          </a:prstGeom>
+        </p:spPr>
+      </p:pic>
     </p:spTree>
     <p:extLst>
       <p:ext uri="{BB962C8B-B14F-4D97-AF65-F5344CB8AC3E}">
-        <p14:creationId xmlns:p14="http://schemas.microsoft.com/office/powerpoint/2010/main" val="771618737"/>
+        <p14:creationId xmlns:p14="http://schemas.microsoft.com/office/powerpoint/2010/main" val="1716611254"/>
       </p:ext>
     </p:extLst>
   </p:cSld>
   <p:clrMap bg1="lt1" tx1="dk1" bg2="lt2" tx2="dk2" accent1="accent1" accent2="accent2" accent3="accent3" accent4="accent4" accent5="accent5" accent6="accent6" hlink="hlink" folHlink="folHlink"/>
   <p:sldLayoutIdLst>
-    <p:sldLayoutId id="2147483649" r:id="rId1"/>
-    <p:sldLayoutId id="2147483650" r:id="rId2"/>
-    <p:sldLayoutId id="2147483651" r:id="rId3"/>
-    <p:sldLayoutId id="2147483652" r:id="rId4"/>
-    <p:sldLayoutId id="2147483653" r:id="rId5"/>
-    <p:sldLayoutId id="2147483654" r:id="rId6"/>
-    <p:sldLayoutId id="2147483655" r:id="rId7"/>
-    <p:sldLayoutId id="2147483656" r:id="rId8"/>
-    <p:sldLayoutId id="2147483657" r:id="rId9"/>
-    <p:sldLayoutId id="2147483658" r:id="rId10"/>
-    <p:sldLayoutId id="2147483659" r:id="rId11"/>
+    <p:sldLayoutId id="2147483680" r:id="rId1"/>
+    <p:sldLayoutId id="2147483681" r:id="rId2"/>
+    <p:sldLayoutId id="2147483682" r:id="rId3"/>
+    <p:sldLayoutId id="2147483683" r:id="rId4"/>
+    <p:sldLayoutId id="2147483684" r:id="rId5"/>
+    <p:sldLayoutId id="2147483685" r:id="rId6"/>
+    <p:sldLayoutId id="2147483686" r:id="rId7"/>
+    <p:sldLayoutId id="2147483687" r:id="rId8"/>
+    <p:sldLayoutId id="2147483688" r:id="rId9"/>
+    <p:sldLayoutId id="2147483689" r:id="rId10"/>
+    <p:sldLayoutId id="2147483690" r:id="rId11"/>
   </p:sldLayoutIdLst>
   <p:txStyles>
     <p:titleStyle>
@@ -4043,7 +4112,7 @@
     </p:bodyStyle>
     <p:otherStyle>
       <a:defPPr>
-        <a:defRPr lang="en-IL"/>
+        <a:defRPr lang="LID4096"/>
       </a:defPPr>
       <a:lvl1pPr marL="0" algn="l" defTabSz="914400" rtl="0" eaLnBrk="1" latinLnBrk="0" hangingPunct="1">
         <a:defRPr sz="1800" kern="1200">
@@ -4143,6 +4212,17 @@
 <file path=ppt/slides/slide1.xml><?xml version="1.0" encoding="utf-8"?>
 <p:sld xmlns:a="http://schemas.openxmlformats.org/drawingml/2006/main" xmlns:r="http://schemas.openxmlformats.org/officeDocument/2006/relationships" xmlns:p="http://schemas.openxmlformats.org/presentationml/2006/main">
   <p:cSld>
+    <p:bg>
+      <p:bgPr>
+        <a:solidFill>
+          <a:schemeClr val="bg1">
+            <a:tint val="95000"/>
+            <a:satMod val="170000"/>
+          </a:schemeClr>
+        </a:solidFill>
+        <a:effectLst/>
+      </p:bgPr>
+    </p:bg>
     <p:spTree>
       <p:nvGrpSpPr>
         <p:cNvPr id="1" name=""/>
@@ -4157,6 +4237,66 @@
           <a:chExt cx="0" cy="0"/>
         </a:xfrm>
       </p:grpSpPr>
+      <p:sp useBgFill="1">
+        <p:nvSpPr>
+          <p:cNvPr id="20" name="Rectangle 13">
+            <a:extLst>
+              <a:ext uri="{FF2B5EF4-FFF2-40B4-BE49-F238E27FC236}">
+                <a16:creationId xmlns:a16="http://schemas.microsoft.com/office/drawing/2014/main" id="{ED4D6CE2-C4FB-4B4D-991A-84C9705CD762}"/>
+              </a:ext>
+              <a:ext uri="{C183D7F6-B498-43B3-948B-1728B52AA6E4}">
+                <adec:decorative xmlns:adec="http://schemas.microsoft.com/office/drawing/2017/decorative" val="1"/>
+              </a:ext>
+            </a:extLst>
+          </p:cNvPr>
+          <p:cNvSpPr>
+            <a:spLocks noGrp="1" noRot="1" noChangeAspect="1" noMove="1" noResize="1" noEditPoints="1" noAdjustHandles="1" noChangeArrowheads="1" noChangeShapeType="1" noTextEdit="1"/>
+          </p:cNvSpPr>
+          <p:nvPr>
+            <p:extLst>
+              <p:ext uri="{386F3935-93C4-4BCD-93E2-E3B085C9AB24}">
+                <p16:designElem xmlns:p16="http://schemas.microsoft.com/office/powerpoint/2015/main" val="1"/>
+              </p:ext>
+            </p:extLst>
+          </p:nvPr>
+        </p:nvSpPr>
+        <p:spPr>
+          <a:xfrm>
+            <a:off x="0" y="0"/>
+            <a:ext cx="12188952" cy="6858000"/>
+          </a:xfrm>
+          <a:prstGeom prst="rect">
+            <a:avLst/>
+          </a:prstGeom>
+          <a:ln>
+            <a:noFill/>
+          </a:ln>
+        </p:spPr>
+        <p:style>
+          <a:lnRef idx="2">
+            <a:schemeClr val="accent1">
+              <a:shade val="50000"/>
+            </a:schemeClr>
+          </a:lnRef>
+          <a:fillRef idx="1">
+            <a:schemeClr val="accent1"/>
+          </a:fillRef>
+          <a:effectRef idx="0">
+            <a:schemeClr val="accent1"/>
+          </a:effectRef>
+          <a:fontRef idx="minor">
+            <a:schemeClr val="lt1"/>
+          </a:fontRef>
+        </p:style>
+        <p:txBody>
+          <a:bodyPr rtlCol="0" anchor="ctr"/>
+          <a:lstStyle/>
+          <a:p>
+            <a:pPr algn="ctr"/>
+            <a:endParaRPr lang="en-US" dirty="0"/>
+          </a:p>
+        </p:txBody>
+      </p:sp>
       <p:sp>
         <p:nvSpPr>
           <p:cNvPr id="2" name="Title 1">
@@ -4173,37 +4313,466 @@
             <p:ph type="ctrTitle"/>
           </p:nvPr>
         </p:nvSpPr>
-        <p:spPr/>
+        <p:spPr>
+          <a:xfrm>
+            <a:off x="7888099" y="978408"/>
+            <a:ext cx="3721608" cy="1106424"/>
+          </a:xfrm>
+          <a:ln>
+            <a:noFill/>
+          </a:ln>
+        </p:spPr>
         <p:txBody>
-          <a:bodyPr/>
+          <a:bodyPr vert="horz" lIns="91440" tIns="45720" rIns="91440" bIns="45720" rtlCol="0" anchor="b">
+            <a:normAutofit/>
+          </a:bodyPr>
           <a:lstStyle/>
           <a:p>
-            <a:endParaRPr lang="en-IL" dirty="0"/>
+            <a:pPr algn="l"/>
+            <a:r>
+              <a:rPr lang="en-US" sz="2800" kern="1200">
+                <a:solidFill>
+                  <a:schemeClr val="tx1"/>
+                </a:solidFill>
+                <a:latin typeface="+mj-lt"/>
+                <a:ea typeface="+mj-ea"/>
+                <a:cs typeface="+mj-cs"/>
+              </a:rPr>
+              <a:t>React VS Angular VS vue.js</a:t>
+            </a:r>
           </a:p>
         </p:txBody>
       </p:sp>
+      <p:pic>
+        <p:nvPicPr>
+          <p:cNvPr id="4" name="Picture 3" descr="A picture containing drawing&#10;&#10;Description automatically generated">
+            <a:extLst>
+              <a:ext uri="{FF2B5EF4-FFF2-40B4-BE49-F238E27FC236}">
+                <a16:creationId xmlns:a16="http://schemas.microsoft.com/office/drawing/2014/main" id="{56A7A6FA-96C0-4233-B8D2-F842579FB670}"/>
+              </a:ext>
+            </a:extLst>
+          </p:cNvPr>
+          <p:cNvPicPr>
+            <a:picLocks noChangeAspect="1"/>
+          </p:cNvPicPr>
+          <p:nvPr/>
+        </p:nvPicPr>
+        <p:blipFill rotWithShape="1">
+          <a:blip r:embed="rId2">
+            <a:extLst>
+              <a:ext uri="{28A0092B-C50C-407E-A947-70E740481C1C}">
+                <a14:useLocalDpi xmlns:a14="http://schemas.microsoft.com/office/drawing/2010/main" val="0"/>
+              </a:ext>
+            </a:extLst>
+          </a:blip>
+          <a:srcRect l="24429" r="34240" b="1"/>
+          <a:stretch/>
+        </p:blipFill>
+        <p:spPr>
+          <a:xfrm>
+            <a:off x="400847" y="630936"/>
+            <a:ext cx="3785616" cy="5495544"/>
+          </a:xfrm>
+          <a:prstGeom prst="rect">
+            <a:avLst/>
+          </a:prstGeom>
+        </p:spPr>
+      </p:pic>
+      <p:pic>
+        <p:nvPicPr>
+          <p:cNvPr id="7" name="Picture 6" descr="A close up of a logo&#10;&#10;Description automatically generated">
+            <a:extLst>
+              <a:ext uri="{FF2B5EF4-FFF2-40B4-BE49-F238E27FC236}">
+                <a16:creationId xmlns:a16="http://schemas.microsoft.com/office/drawing/2014/main" id="{9D252433-BFE2-49FB-B61F-0BD19FA923A2}"/>
+              </a:ext>
+            </a:extLst>
+          </p:cNvPr>
+          <p:cNvPicPr>
+            <a:picLocks noChangeAspect="1"/>
+          </p:cNvPicPr>
+          <p:nvPr/>
+        </p:nvPicPr>
+        <p:blipFill rotWithShape="1">
+          <a:blip r:embed="rId3">
+            <a:extLst>
+              <a:ext uri="{28A0092B-C50C-407E-A947-70E740481C1C}">
+                <a14:useLocalDpi xmlns:a14="http://schemas.microsoft.com/office/drawing/2010/main" val="0"/>
+              </a:ext>
+            </a:extLst>
+          </a:blip>
+          <a:srcRect l="571" r="457" b="4"/>
+          <a:stretch/>
+        </p:blipFill>
+        <p:spPr>
+          <a:xfrm>
+            <a:off x="4361688" y="630936"/>
+            <a:ext cx="2651760" cy="2679192"/>
+          </a:xfrm>
+          <a:prstGeom prst="rect">
+            <a:avLst/>
+          </a:prstGeom>
+        </p:spPr>
+      </p:pic>
+      <p:pic>
+        <p:nvPicPr>
+          <p:cNvPr id="9" name="Picture 8" descr="A close up of a logo&#10;&#10;Description automatically generated">
+            <a:extLst>
+              <a:ext uri="{FF2B5EF4-FFF2-40B4-BE49-F238E27FC236}">
+                <a16:creationId xmlns:a16="http://schemas.microsoft.com/office/drawing/2014/main" id="{29B19C37-6B19-4D21-9380-31ECD06E85B2}"/>
+              </a:ext>
+            </a:extLst>
+          </p:cNvPr>
+          <p:cNvPicPr>
+            <a:picLocks noChangeAspect="1"/>
+          </p:cNvPicPr>
+          <p:nvPr/>
+        </p:nvPicPr>
+        <p:blipFill rotWithShape="1">
+          <a:blip r:embed="rId4">
+            <a:extLst>
+              <a:ext uri="{28A0092B-C50C-407E-A947-70E740481C1C}">
+                <a14:useLocalDpi xmlns:a14="http://schemas.microsoft.com/office/drawing/2010/main" val="0"/>
+              </a:ext>
+            </a:extLst>
+          </a:blip>
+          <a:srcRect l="17007" r="17004" b="-7"/>
+          <a:stretch/>
+        </p:blipFill>
+        <p:spPr>
+          <a:xfrm>
+            <a:off x="4361688" y="3447288"/>
+            <a:ext cx="2651760" cy="2679192"/>
+          </a:xfrm>
+          <a:prstGeom prst="rect">
+            <a:avLst/>
+          </a:prstGeom>
+        </p:spPr>
+      </p:pic>
+      <p:cxnSp>
+        <p:nvCxnSpPr>
+          <p:cNvPr id="21" name="Straight Connector 15">
+            <a:extLst>
+              <a:ext uri="{FF2B5EF4-FFF2-40B4-BE49-F238E27FC236}">
+                <a16:creationId xmlns:a16="http://schemas.microsoft.com/office/drawing/2014/main" id="{11A9DAB5-E11B-41CA-85F3-20711F79027B}"/>
+              </a:ext>
+              <a:ext uri="{C183D7F6-B498-43B3-948B-1728B52AA6E4}">
+                <adec:decorative xmlns:adec="http://schemas.microsoft.com/office/drawing/2017/decorative" val="1"/>
+              </a:ext>
+            </a:extLst>
+          </p:cNvPr>
+          <p:cNvCxnSpPr>
+            <a:cxnSpLocks noGrp="1" noRot="1" noChangeAspect="1" noMove="1" noResize="1" noEditPoints="1" noAdjustHandles="1" noChangeArrowheads="1" noChangeShapeType="1"/>
+          </p:cNvCxnSpPr>
+          <p:nvPr>
+            <p:extLst>
+              <p:ext uri="{386F3935-93C4-4BCD-93E2-E3B085C9AB24}">
+                <p16:designElem xmlns:p16="http://schemas.microsoft.com/office/powerpoint/2015/main" val="1"/>
+              </p:ext>
+            </p:extLst>
+          </p:nvPr>
+        </p:nvCxnSpPr>
+        <p:spPr>
+          <a:xfrm>
+            <a:off x="7451084" y="1417320"/>
+            <a:ext cx="0" cy="4023360"/>
+          </a:xfrm>
+          <a:prstGeom prst="line">
+            <a:avLst/>
+          </a:prstGeom>
+          <a:ln w="15875">
+            <a:solidFill>
+              <a:schemeClr val="tx1"/>
+            </a:solidFill>
+          </a:ln>
+        </p:spPr>
+        <p:style>
+          <a:lnRef idx="1">
+            <a:schemeClr val="accent1"/>
+          </a:lnRef>
+          <a:fillRef idx="0">
+            <a:schemeClr val="accent1"/>
+          </a:fillRef>
+          <a:effectRef idx="0">
+            <a:schemeClr val="accent1"/>
+          </a:effectRef>
+          <a:fontRef idx="minor">
+            <a:schemeClr val="tx1"/>
+          </a:fontRef>
+        </p:style>
+      </p:cxnSp>
       <p:sp>
         <p:nvSpPr>
-          <p:cNvPr id="3" name="Subtitle 2">
-            <a:extLst>
-              <a:ext uri="{FF2B5EF4-FFF2-40B4-BE49-F238E27FC236}">
-                <a16:creationId xmlns:a16="http://schemas.microsoft.com/office/drawing/2014/main" id="{7B30039D-4B5D-4D18-AF22-62B749DB8776}"/>
-              </a:ext>
-            </a:extLst>
-          </p:cNvPr>
-          <p:cNvSpPr>
-            <a:spLocks noGrp="1"/>
-          </p:cNvSpPr>
-          <p:nvPr>
-            <p:ph type="subTitle" idx="1"/>
-          </p:nvPr>
+          <p:cNvPr id="5" name="TextBox 4">
+            <a:extLst>
+              <a:ext uri="{FF2B5EF4-FFF2-40B4-BE49-F238E27FC236}">
+                <a16:creationId xmlns:a16="http://schemas.microsoft.com/office/drawing/2014/main" id="{6F1F57E8-75A6-48A3-B46C-BB0AB930AC8F}"/>
+              </a:ext>
+            </a:extLst>
+          </p:cNvPr>
+          <p:cNvSpPr txBox="1"/>
+          <p:nvPr/>
         </p:nvSpPr>
-        <p:spPr/>
+        <p:spPr>
+          <a:xfrm>
+            <a:off x="7888099" y="2368296"/>
+            <a:ext cx="3721608" cy="3502152"/>
+          </a:xfrm>
+          <a:prstGeom prst="rect">
+            <a:avLst/>
+          </a:prstGeom>
+        </p:spPr>
         <p:txBody>
-          <a:bodyPr/>
+          <a:bodyPr vert="horz" lIns="91440" tIns="45720" rIns="91440" bIns="45720" rtlCol="0">
+            <a:normAutofit/>
+          </a:bodyPr>
           <a:lstStyle/>
           <a:p>
-            <a:endParaRPr lang="en-IL"/>
+            <a:pPr indent="-228600">
+              <a:lnSpc>
+                <a:spcPct val="90000"/>
+              </a:lnSpc>
+              <a:spcAft>
+                <a:spcPts val="600"/>
+              </a:spcAft>
+              <a:buFont typeface="Arial" panose="020B0604020202020204" pitchFamily="34" charset="0"/>
+              <a:buChar char="•"/>
+            </a:pPr>
+            <a:r>
+              <a:rPr lang="en-US" sz="900"/>
+              <a:t>Background :	</a:t>
+            </a:r>
+          </a:p>
+          <a:p>
+            <a:pPr lvl="1" indent="-228600">
+              <a:lnSpc>
+                <a:spcPct val="90000"/>
+              </a:lnSpc>
+              <a:spcAft>
+                <a:spcPts val="600"/>
+              </a:spcAft>
+              <a:buFont typeface="Arial" panose="020B0604020202020204" pitchFamily="34" charset="0"/>
+              <a:buChar char="•"/>
+            </a:pPr>
+            <a:r>
+              <a:rPr lang="en-US" sz="900" b="0" i="0">
+                <a:effectLst/>
+              </a:rPr>
+              <a:t>React was created by Jordan Walke in 2011 and Open sourced it in May 2013</a:t>
+            </a:r>
+          </a:p>
+          <a:p>
+            <a:pPr lvl="1" indent="-228600">
+              <a:lnSpc>
+                <a:spcPct val="90000"/>
+              </a:lnSpc>
+              <a:spcAft>
+                <a:spcPts val="600"/>
+              </a:spcAft>
+              <a:buFont typeface="Arial" panose="020B0604020202020204" pitchFamily="34" charset="0"/>
+              <a:buChar char="•"/>
+            </a:pPr>
+            <a:r>
+              <a:rPr lang="en-US" sz="900" b="0" i="0">
+                <a:effectLst/>
+              </a:rPr>
+              <a:t>Facebook and Instagram released React 16.0 on September 2017</a:t>
+            </a:r>
+          </a:p>
+          <a:p>
+            <a:pPr lvl="1" indent="-228600">
+              <a:lnSpc>
+                <a:spcPct val="90000"/>
+              </a:lnSpc>
+              <a:spcAft>
+                <a:spcPts val="600"/>
+              </a:spcAft>
+              <a:buFont typeface="Arial" panose="020B0604020202020204" pitchFamily="34" charset="0"/>
+              <a:buChar char="•"/>
+            </a:pPr>
+            <a:r>
+              <a:rPr lang="en-US" sz="900" b="0" i="0">
+                <a:effectLst/>
+              </a:rPr>
+              <a:t>The latest version React Fiber was released with React 16 in September 2017. React Fiber is an ongoing implementation of Reac'ts Core Algorithm.</a:t>
+            </a:r>
+          </a:p>
+          <a:p>
+            <a:pPr lvl="1" indent="-228600">
+              <a:lnSpc>
+                <a:spcPct val="90000"/>
+              </a:lnSpc>
+              <a:spcAft>
+                <a:spcPts val="600"/>
+              </a:spcAft>
+              <a:buFont typeface="Arial" panose="020B0604020202020204" pitchFamily="34" charset="0"/>
+              <a:buChar char="•"/>
+            </a:pPr>
+            <a:endParaRPr lang="en-US" sz="900"/>
+          </a:p>
+          <a:p>
+            <a:pPr indent="-228600">
+              <a:lnSpc>
+                <a:spcPct val="90000"/>
+              </a:lnSpc>
+              <a:spcAft>
+                <a:spcPts val="600"/>
+              </a:spcAft>
+              <a:buFont typeface="Arial" panose="020B0604020202020204" pitchFamily="34" charset="0"/>
+              <a:buChar char="•"/>
+            </a:pPr>
+            <a:r>
+              <a:rPr lang="en-US" sz="900" b="0" i="0">
+                <a:effectLst/>
+              </a:rPr>
+              <a:t>AngularJS was released in 2010 by Google.</a:t>
+            </a:r>
+          </a:p>
+          <a:p>
+            <a:pPr indent="-228600">
+              <a:lnSpc>
+                <a:spcPct val="90000"/>
+              </a:lnSpc>
+              <a:spcAft>
+                <a:spcPts val="600"/>
+              </a:spcAft>
+              <a:buFont typeface="Arial" panose="020B0604020202020204" pitchFamily="34" charset="0"/>
+              <a:buChar char="•"/>
+            </a:pPr>
+            <a:r>
+              <a:rPr lang="en-US" sz="900" b="0" i="0">
+                <a:effectLst/>
+              </a:rPr>
+              <a:t>2.0 version which also called Angular 2 or just Angular was released in September 2016</a:t>
+            </a:r>
+          </a:p>
+          <a:p>
+            <a:pPr indent="-228600">
+              <a:lnSpc>
+                <a:spcPct val="90000"/>
+              </a:lnSpc>
+              <a:spcAft>
+                <a:spcPts val="600"/>
+              </a:spcAft>
+              <a:buFont typeface="Arial" panose="020B0604020202020204" pitchFamily="34" charset="0"/>
+              <a:buChar char="•"/>
+            </a:pPr>
+            <a:r>
+              <a:rPr lang="en-US" sz="900" b="0" i="0">
+                <a:effectLst/>
+              </a:rPr>
+              <a:t>4.0 version was released in March 2017</a:t>
+            </a:r>
+          </a:p>
+          <a:p>
+            <a:pPr indent="-228600">
+              <a:lnSpc>
+                <a:spcPct val="90000"/>
+              </a:lnSpc>
+              <a:spcAft>
+                <a:spcPts val="600"/>
+              </a:spcAft>
+              <a:buFont typeface="Arial" panose="020B0604020202020204" pitchFamily="34" charset="0"/>
+              <a:buChar char="•"/>
+            </a:pPr>
+            <a:r>
+              <a:rPr lang="en-US" sz="900" b="0" i="0">
+                <a:effectLst/>
+              </a:rPr>
+              <a:t>5.0 version was released in Nov 2017</a:t>
+            </a:r>
+          </a:p>
+          <a:p>
+            <a:pPr indent="-228600">
+              <a:lnSpc>
+                <a:spcPct val="90000"/>
+              </a:lnSpc>
+              <a:spcAft>
+                <a:spcPts val="600"/>
+              </a:spcAft>
+              <a:buFont typeface="Arial" panose="020B0604020202020204" pitchFamily="34" charset="0"/>
+              <a:buChar char="•"/>
+            </a:pPr>
+            <a:r>
+              <a:rPr lang="en-US" sz="900"/>
+              <a:t>Today there is </a:t>
+            </a:r>
+            <a:endParaRPr lang="en-US" sz="900" b="0" i="0">
+              <a:effectLst/>
+            </a:endParaRPr>
+          </a:p>
+          <a:p>
+            <a:pPr indent="-228600">
+              <a:lnSpc>
+                <a:spcPct val="90000"/>
+              </a:lnSpc>
+              <a:spcAft>
+                <a:spcPts val="600"/>
+              </a:spcAft>
+              <a:buFont typeface="Arial" panose="020B0604020202020204" pitchFamily="34" charset="0"/>
+              <a:buChar char="•"/>
+            </a:pPr>
+            <a:endParaRPr lang="en-US" sz="900"/>
+          </a:p>
+          <a:p>
+            <a:pPr indent="-228600">
+              <a:lnSpc>
+                <a:spcPct val="90000"/>
+              </a:lnSpc>
+              <a:spcAft>
+                <a:spcPts val="600"/>
+              </a:spcAft>
+              <a:buFont typeface="Arial" panose="020B0604020202020204" pitchFamily="34" charset="0"/>
+              <a:buChar char="•"/>
+            </a:pPr>
+            <a:endParaRPr lang="en-US" sz="900"/>
+          </a:p>
+          <a:p>
+            <a:pPr indent="-228600">
+              <a:lnSpc>
+                <a:spcPct val="90000"/>
+              </a:lnSpc>
+              <a:spcAft>
+                <a:spcPts val="600"/>
+              </a:spcAft>
+              <a:buFont typeface="Arial" panose="020B0604020202020204" pitchFamily="34" charset="0"/>
+              <a:buChar char="•"/>
+            </a:pPr>
+            <a:r>
+              <a:rPr lang="en-US" sz="900" b="0" i="0">
+                <a:effectLst/>
+              </a:rPr>
+              <a:t>Mvc : Model-View-Controller </a:t>
+            </a:r>
+            <a:r>
+              <a:rPr lang="en-US" sz="900"/>
+              <a:t> </a:t>
+            </a:r>
+          </a:p>
+          <a:p>
+            <a:pPr indent="-228600">
+              <a:lnSpc>
+                <a:spcPct val="90000"/>
+              </a:lnSpc>
+              <a:spcAft>
+                <a:spcPts val="600"/>
+              </a:spcAft>
+              <a:buFont typeface="Arial" panose="020B0604020202020204" pitchFamily="34" charset="0"/>
+              <a:buChar char="•"/>
+            </a:pPr>
+            <a:endParaRPr lang="en-US" sz="900"/>
+          </a:p>
+          <a:p>
+            <a:pPr indent="-228600">
+              <a:lnSpc>
+                <a:spcPct val="90000"/>
+              </a:lnSpc>
+              <a:spcAft>
+                <a:spcPts val="600"/>
+              </a:spcAft>
+              <a:buFont typeface="Arial" panose="020B0604020202020204" pitchFamily="34" charset="0"/>
+              <a:buChar char="•"/>
+            </a:pPr>
+            <a:endParaRPr lang="en-US" sz="900"/>
           </a:p>
         </p:txBody>
       </p:sp>
@@ -4215,12 +4784,12 @@
     </p:extLst>
   </p:cSld>
   <p:clrMapOvr>
-    <a:masterClrMapping/>
+    <a:overrideClrMapping bg1="dk1" tx1="lt1" bg2="dk2" tx2="lt2" accent1="accent1" accent2="accent2" accent3="accent3" accent4="accent4" accent5="accent5" accent6="accent6" hlink="hlink" folHlink="folHlink"/>
   </p:clrMapOvr>
 </p:sld>
 </file>
 
-<file path=ppt/slides/slide2.xml><?xml version="1.0" encoding="utf-8"?>
+<file path=ppt/slides/slide10.xml><?xml version="1.0" encoding="utf-8"?>
 <p:sld xmlns:a="http://schemas.openxmlformats.org/drawingml/2006/main" xmlns:r="http://schemas.openxmlformats.org/officeDocument/2006/relationships" xmlns:p="http://schemas.openxmlformats.org/presentationml/2006/main">
   <p:cSld>
     <p:spTree>
@@ -4943,7 +5512,7 @@
 </p:sld>
 </file>
 
-<file path=ppt/slides/slide3.xml><?xml version="1.0" encoding="utf-8"?>
+<file path=ppt/slides/slide11.xml><?xml version="1.0" encoding="utf-8"?>
 <p:sld xmlns:a="http://schemas.openxmlformats.org/drawingml/2006/main" xmlns:r="http://schemas.openxmlformats.org/officeDocument/2006/relationships" xmlns:p="http://schemas.openxmlformats.org/presentationml/2006/main">
   <p:cSld>
     <p:spTree>
@@ -5194,6 +5763,2904 @@
     <p:extLst>
       <p:ext uri="{BB962C8B-B14F-4D97-AF65-F5344CB8AC3E}">
         <p14:creationId xmlns:p14="http://schemas.microsoft.com/office/powerpoint/2010/main" val="2318313946"/>
+      </p:ext>
+    </p:extLst>
+  </p:cSld>
+  <p:clrMapOvr>
+    <a:masterClrMapping/>
+  </p:clrMapOvr>
+</p:sld>
+</file>
+
+<file path=ppt/slides/slide2.xml><?xml version="1.0" encoding="utf-8"?>
+<p:sld xmlns:a="http://schemas.openxmlformats.org/drawingml/2006/main" xmlns:r="http://schemas.openxmlformats.org/officeDocument/2006/relationships" xmlns:p="http://schemas.openxmlformats.org/presentationml/2006/main">
+  <p:cSld>
+    <p:spTree>
+      <p:nvGrpSpPr>
+        <p:cNvPr id="1" name=""/>
+        <p:cNvGrpSpPr/>
+        <p:nvPr/>
+      </p:nvGrpSpPr>
+      <p:grpSpPr>
+        <a:xfrm>
+          <a:off x="0" y="0"/>
+          <a:ext cx="0" cy="0"/>
+          <a:chOff x="0" y="0"/>
+          <a:chExt cx="0" cy="0"/>
+        </a:xfrm>
+      </p:grpSpPr>
+      <p:pic>
+        <p:nvPicPr>
+          <p:cNvPr id="4" name="Picture 3">
+            <a:extLst>
+              <a:ext uri="{FF2B5EF4-FFF2-40B4-BE49-F238E27FC236}">
+                <a16:creationId xmlns:a16="http://schemas.microsoft.com/office/drawing/2014/main" id="{DC5FBCDC-331B-45E0-A37C-543DE29A613D}"/>
+              </a:ext>
+            </a:extLst>
+          </p:cNvPr>
+          <p:cNvPicPr>
+            <a:picLocks noChangeAspect="1"/>
+          </p:cNvPicPr>
+          <p:nvPr/>
+        </p:nvPicPr>
+        <p:blipFill rotWithShape="1">
+          <a:blip r:embed="rId2">
+            <a:extLst>
+              <a:ext uri="{BEBA8EAE-BF5A-486C-A8C5-ECC9F3942E4B}">
+                <a14:imgProps xmlns:a14="http://schemas.microsoft.com/office/drawing/2010/main">
+                  <a14:imgLayer r:embed="rId3">
+                    <a14:imgEffect>
+                      <a14:backgroundRemoval t="20231" b="90139" l="8516" r="92344">
+                        <a14:foregroundMark x1="28698" y1="20833" x2="15000" y2="22917"/>
+                        <a14:foregroundMark x1="15000" y1="22917" x2="7292" y2="30880"/>
+                        <a14:foregroundMark x1="7292" y1="30880" x2="6849" y2="34368"/>
+                        <a14:foregroundMark x1="6359" y1="75694" x2="6406" y2="81944"/>
+                        <a14:foregroundMark x1="6237" y1="59407" x2="6250" y2="61161"/>
+                        <a14:foregroundMark x1="6406" y1="81944" x2="10859" y2="88194"/>
+                        <a14:foregroundMark x1="10859" y1="88194" x2="26224" y2="92269"/>
+                        <a14:foregroundMark x1="26224" y1="92269" x2="30104" y2="90370"/>
+                        <a14:foregroundMark x1="30104" y1="90370" x2="34323" y2="82963"/>
+                        <a14:foregroundMark x1="34323" y1="82963" x2="36016" y2="75926"/>
+                        <a14:foregroundMark x1="36016" y1="75926" x2="36589" y2="59907"/>
+                        <a14:foregroundMark x1="36589" y1="59907" x2="33073" y2="26620"/>
+                        <a14:foregroundMark x1="33073" y1="26620" x2="29714" y2="21343"/>
+                        <a14:foregroundMark x1="29714" y1="21343" x2="28438" y2="20694"/>
+                        <a14:foregroundMark x1="51016" y1="28241" x2="46380" y2="26065"/>
+                        <a14:foregroundMark x1="46380" y1="26065" x2="41354" y2="33380"/>
+                        <a14:foregroundMark x1="41354" y1="33380" x2="39375" y2="42037"/>
+                        <a14:foregroundMark x1="39375" y1="42037" x2="38411" y2="69352"/>
+                        <a14:foregroundMark x1="38411" y1="69352" x2="39948" y2="78194"/>
+                        <a14:foregroundMark x1="39948" y1="78194" x2="44115" y2="85324"/>
+                        <a14:foregroundMark x1="44115" y1="85324" x2="50833" y2="86435"/>
+                        <a14:foregroundMark x1="50833" y1="86435" x2="57995" y2="79120"/>
+                        <a14:foregroundMark x1="57995" y1="79120" x2="63359" y2="48935"/>
+                        <a14:foregroundMark x1="63359" y1="48935" x2="62474" y2="36991"/>
+                        <a14:foregroundMark x1="62474" y1="36991" x2="54375" y2="26019"/>
+                        <a14:foregroundMark x1="54375" y1="26019" x2="48828" y2="22778"/>
+                        <a14:foregroundMark x1="80938" y1="30139" x2="75833" y2="30787"/>
+                        <a14:foregroundMark x1="75833" y1="30787" x2="72474" y2="37778"/>
+                        <a14:foregroundMark x1="72474" y1="37778" x2="68750" y2="70787"/>
+                        <a14:foregroundMark x1="68750" y1="70787" x2="71302" y2="77963"/>
+                        <a14:foregroundMark x1="71302" y1="77963" x2="80990" y2="81435"/>
+                        <a14:foregroundMark x1="80990" y1="81435" x2="85651" y2="80278"/>
+                        <a14:foregroundMark x1="85651" y1="80278" x2="88021" y2="69306"/>
+                        <a14:foregroundMark x1="88021" y1="69306" x2="87969" y2="35093"/>
+                        <a14:foregroundMark x1="87969" y1="35093" x2="81354" y2="26528"/>
+                        <a14:foregroundMark x1="81354" y1="26528" x2="76797" y2="25231"/>
+                        <a14:foregroundMark x1="25469" y1="26250" x2="15651" y2="26296"/>
+                        <a14:foregroundMark x1="15651" y1="26296" x2="11823" y2="36343"/>
+                        <a14:foregroundMark x1="11823" y1="36343" x2="13073" y2="66528"/>
+                        <a14:foregroundMark x1="13073" y1="66528" x2="17474" y2="81481"/>
+                        <a14:foregroundMark x1="17474" y1="81481" x2="20911" y2="87130"/>
+                        <a14:foregroundMark x1="20911" y1="87130" x2="24870" y2="89537"/>
+                        <a14:foregroundMark x1="24870" y1="89537" x2="29297" y2="84398"/>
+                        <a14:foregroundMark x1="29297" y1="84398" x2="35208" y2="57037"/>
+                        <a14:foregroundMark x1="35208" y1="57037" x2="35911" y2="45972"/>
+                        <a14:foregroundMark x1="35911" y1="45972" x2="30911" y2="29398"/>
+                        <a14:foregroundMark x1="30911" y1="29398" x2="24844" y2="26852"/>
+                        <a14:foregroundMark x1="11927" y1="30324" x2="8672" y2="35741"/>
+                        <a14:foregroundMark x1="8672" y1="35741" x2="7801" y2="39260"/>
+                        <a14:foregroundMark x1="8222" y1="75493" x2="8333" y2="78102"/>
+                        <a14:foregroundMark x1="7459" y1="57493" x2="7608" y2="61015"/>
+                        <a14:foregroundMark x1="8333" y1="78102" x2="11745" y2="82917"/>
+                        <a14:foregroundMark x1="11745" y1="82917" x2="15729" y2="76065"/>
+                        <a14:foregroundMark x1="15729" y1="76065" x2="22266" y2="44954"/>
+                        <a14:foregroundMark x1="22266" y1="44954" x2="21615" y2="37917"/>
+                        <a14:foregroundMark x1="21615" y1="37917" x2="19271" y2="35139"/>
+                        <a14:foregroundMark x1="9740" y1="31343" x2="7655" y2="47022"/>
+                        <a14:foregroundMark x1="6603" y1="75668" x2="6589" y2="79028"/>
+                        <a14:foregroundMark x1="6671" y1="59433" x2="6664" y2="61117"/>
+                        <a14:foregroundMark x1="6589" y1="79028" x2="8333" y2="87130"/>
+                        <a14:foregroundMark x1="8333" y1="87130" x2="11380" y2="81574"/>
+                        <a14:foregroundMark x1="11380" y1="81574" x2="14271" y2="36481"/>
+                        <a14:foregroundMark x1="14271" y1="36481" x2="12812" y2="33148"/>
+                        <a14:foregroundMark x1="10000" y1="28981" x2="10469" y2="38102"/>
+                        <a14:foregroundMark x1="10469" y1="38102" x2="12240" y2="46204"/>
+                        <a14:foregroundMark x1="12240" y1="46204" x2="11615" y2="79769"/>
+                        <a14:foregroundMark x1="11615" y1="79769" x2="7630" y2="75972"/>
+                        <a14:foregroundMark x1="6770" y1="61105" x2="6673" y2="59433"/>
+                        <a14:foregroundMark x1="7630" y1="75972" x2="7606" y2="75560"/>
+                        <a14:foregroundMark x1="7686" y1="45352" x2="8516" y2="35231"/>
+                        <a14:foregroundMark x1="8516" y1="35231" x2="10599" y2="30324"/>
+                        <a14:foregroundMark x1="17005" y1="30787" x2="20286" y2="26343"/>
+                        <a14:foregroundMark x1="20286" y1="26343" x2="24245" y2="30787"/>
+                        <a14:foregroundMark x1="24245" y1="30787" x2="25078" y2="38935"/>
+                        <a14:foregroundMark x1="25078" y1="38935" x2="21146" y2="40417"/>
+                        <a14:foregroundMark x1="21146" y1="40417" x2="18073" y2="33519"/>
+                        <a14:foregroundMark x1="18073" y1="33519" x2="18021" y2="27778"/>
+                        <a14:foregroundMark x1="52214" y1="23241" x2="48021" y2="23796"/>
+                        <a14:foregroundMark x1="48021" y1="23796" x2="44609" y2="27639"/>
+                        <a14:foregroundMark x1="44609" y1="27639" x2="42734" y2="37176"/>
+                        <a14:foregroundMark x1="42734" y1="37176" x2="45495" y2="43981"/>
+                        <a14:foregroundMark x1="45495" y1="43981" x2="51172" y2="44537"/>
+                        <a14:foregroundMark x1="51172" y1="44537" x2="55286" y2="39676"/>
+                        <a14:foregroundMark x1="55286" y1="39676" x2="57552" y2="32639"/>
+                        <a14:foregroundMark x1="57552" y1="32639" x2="55677" y2="25370"/>
+                        <a14:foregroundMark x1="55677" y1="25370" x2="52604" y2="23750"/>
+                        <a14:foregroundMark x1="52708" y1="25509" x2="47057" y2="25139"/>
+                        <a14:foregroundMark x1="47057" y1="25139" x2="43906" y2="31944"/>
+                        <a14:foregroundMark x1="43906" y1="31944" x2="44714" y2="39537"/>
+                        <a14:foregroundMark x1="44714" y1="39537" x2="48516" y2="42361"/>
+                        <a14:foregroundMark x1="48516" y1="42361" x2="52891" y2="40926"/>
+                        <a14:foregroundMark x1="52891" y1="40926" x2="55677" y2="34769"/>
+                        <a14:foregroundMark x1="55677" y1="34769" x2="54193" y2="27361"/>
+                        <a14:foregroundMark x1="54193" y1="27361" x2="52552" y2="25972"/>
+                        <a14:foregroundMark x1="54401" y1="32130" x2="54193" y2="34630"/>
+                        <a14:foregroundMark x1="46563" y1="31250" x2="46979" y2="34074"/>
+                        <a14:foregroundMark x1="47188" y1="38056" x2="48411" y2="40880"/>
+                        <a14:foregroundMark x1="37188" y1="77037" x2="38359" y2="85231"/>
+                        <a14:foregroundMark x1="38359" y1="85231" x2="43073" y2="88750"/>
+                        <a14:foregroundMark x1="43073" y1="88750" x2="51953" y2="90787"/>
+                        <a14:foregroundMark x1="51953" y1="90787" x2="56198" y2="90231"/>
+                        <a14:foregroundMark x1="56198" y1="90231" x2="60286" y2="85972"/>
+                        <a14:foregroundMark x1="60286" y1="85972" x2="62760" y2="71435"/>
+                        <a14:foregroundMark x1="62760" y1="71435" x2="62240" y2="60093"/>
+                        <a14:foregroundMark x1="67526" y1="27593" x2="66380" y2="80556"/>
+                        <a14:foregroundMark x1="66380" y1="80556" x2="69063" y2="86806"/>
+                        <a14:foregroundMark x1="69063" y1="86806" x2="82448" y2="90185"/>
+                        <a14:foregroundMark x1="82448" y1="90185" x2="84063" y2="89259"/>
+                        <a14:foregroundMark x1="78854" y1="23056" x2="83438" y2="21759"/>
+                        <a14:foregroundMark x1="83438" y1="21759" x2="87370" y2="26111"/>
+                        <a14:foregroundMark x1="87370" y1="26111" x2="87865" y2="79907"/>
+                        <a14:foregroundMark x1="87865" y1="79907" x2="87240" y2="86620"/>
+                        <a14:foregroundMark x1="86589" y1="24861" x2="90495" y2="29815"/>
+                        <a14:foregroundMark x1="90495" y1="29815" x2="91016" y2="78565"/>
+                        <a14:foregroundMark x1="91016" y1="78565" x2="89401" y2="86065"/>
+                        <a14:foregroundMark x1="89401" y1="86065" x2="85182" y2="88611"/>
+                        <a14:foregroundMark x1="91901" y1="29074" x2="90260" y2="83843"/>
+                        <a14:foregroundMark x1="90260" y1="83843" x2="92344" y2="77500"/>
+                        <a14:foregroundMark x1="92344" y1="77500" x2="91432" y2="70694"/>
+                        <a14:foregroundMark x1="71146" y1="21019" x2="75391" y2="20231"/>
+                        <a14:foregroundMark x1="75391" y1="20231" x2="82422" y2="20926"/>
+                        <a14:backgroundMark x1="6563" y1="34352" x2="6094" y2="59398"/>
+                        <a14:backgroundMark x1="6719" y1="61111" x2="7214" y2="75602"/>
+                      </a14:backgroundRemoval>
+                    </a14:imgEffect>
+                  </a14:imgLayer>
+                </a14:imgProps>
+              </a:ext>
+            </a:extLst>
+          </a:blip>
+          <a:srcRect l="9004" t="23258" r="66949" b="12146"/>
+          <a:stretch/>
+        </p:blipFill>
+        <p:spPr>
+          <a:xfrm>
+            <a:off x="1524000" y="1333500"/>
+            <a:ext cx="2882900" cy="4356100"/>
+          </a:xfrm>
+          <a:prstGeom prst="roundRect">
+            <a:avLst>
+              <a:gd name="adj" fmla="val 6755"/>
+            </a:avLst>
+          </a:prstGeom>
+          <a:ln w="28575">
+            <a:solidFill>
+              <a:srgbClr val="7030A0"/>
+            </a:solidFill>
+          </a:ln>
+        </p:spPr>
+      </p:pic>
+      <p:pic>
+        <p:nvPicPr>
+          <p:cNvPr id="8" name="Picture 7">
+            <a:extLst>
+              <a:ext uri="{FF2B5EF4-FFF2-40B4-BE49-F238E27FC236}">
+                <a16:creationId xmlns:a16="http://schemas.microsoft.com/office/drawing/2014/main" id="{A4DF5891-DD50-42E6-A384-589AEB4938DE}"/>
+              </a:ext>
+            </a:extLst>
+          </p:cNvPr>
+          <p:cNvPicPr>
+            <a:picLocks noChangeAspect="1"/>
+          </p:cNvPicPr>
+          <p:nvPr/>
+        </p:nvPicPr>
+        <p:blipFill rotWithShape="1">
+          <a:blip r:embed="rId2">
+            <a:extLst>
+              <a:ext uri="{BEBA8EAE-BF5A-486C-A8C5-ECC9F3942E4B}">
+                <a14:imgProps xmlns:a14="http://schemas.microsoft.com/office/drawing/2010/main">
+                  <a14:imgLayer r:embed="rId3">
+                    <a14:imgEffect>
+                      <a14:backgroundRemoval t="20231" b="90139" l="8516" r="92344">
+                        <a14:foregroundMark x1="28698" y1="20833" x2="15000" y2="22917"/>
+                        <a14:foregroundMark x1="15000" y1="22917" x2="7292" y2="30880"/>
+                        <a14:foregroundMark x1="7292" y1="30880" x2="6849" y2="34368"/>
+                        <a14:foregroundMark x1="6359" y1="75694" x2="6406" y2="81944"/>
+                        <a14:foregroundMark x1="6237" y1="59407" x2="6250" y2="61161"/>
+                        <a14:foregroundMark x1="6406" y1="81944" x2="10859" y2="88194"/>
+                        <a14:foregroundMark x1="10859" y1="88194" x2="26224" y2="92269"/>
+                        <a14:foregroundMark x1="26224" y1="92269" x2="30104" y2="90370"/>
+                        <a14:foregroundMark x1="30104" y1="90370" x2="34323" y2="82963"/>
+                        <a14:foregroundMark x1="34323" y1="82963" x2="36016" y2="75926"/>
+                        <a14:foregroundMark x1="36016" y1="75926" x2="36589" y2="59907"/>
+                        <a14:foregroundMark x1="36589" y1="59907" x2="33073" y2="26620"/>
+                        <a14:foregroundMark x1="33073" y1="26620" x2="29714" y2="21343"/>
+                        <a14:foregroundMark x1="29714" y1="21343" x2="28438" y2="20694"/>
+                        <a14:foregroundMark x1="51016" y1="28241" x2="46380" y2="26065"/>
+                        <a14:foregroundMark x1="46380" y1="26065" x2="41354" y2="33380"/>
+                        <a14:foregroundMark x1="41354" y1="33380" x2="39375" y2="42037"/>
+                        <a14:foregroundMark x1="39375" y1="42037" x2="38411" y2="69352"/>
+                        <a14:foregroundMark x1="38411" y1="69352" x2="39948" y2="78194"/>
+                        <a14:foregroundMark x1="39948" y1="78194" x2="44115" y2="85324"/>
+                        <a14:foregroundMark x1="44115" y1="85324" x2="50833" y2="86435"/>
+                        <a14:foregroundMark x1="50833" y1="86435" x2="57995" y2="79120"/>
+                        <a14:foregroundMark x1="57995" y1="79120" x2="63359" y2="48935"/>
+                        <a14:foregroundMark x1="63359" y1="48935" x2="62474" y2="36991"/>
+                        <a14:foregroundMark x1="62474" y1="36991" x2="54375" y2="26019"/>
+                        <a14:foregroundMark x1="54375" y1="26019" x2="48828" y2="22778"/>
+                        <a14:foregroundMark x1="80938" y1="30139" x2="75833" y2="30787"/>
+                        <a14:foregroundMark x1="75833" y1="30787" x2="72474" y2="37778"/>
+                        <a14:foregroundMark x1="72474" y1="37778" x2="68750" y2="70787"/>
+                        <a14:foregroundMark x1="68750" y1="70787" x2="71302" y2="77963"/>
+                        <a14:foregroundMark x1="71302" y1="77963" x2="80990" y2="81435"/>
+                        <a14:foregroundMark x1="80990" y1="81435" x2="85651" y2="80278"/>
+                        <a14:foregroundMark x1="85651" y1="80278" x2="88021" y2="69306"/>
+                        <a14:foregroundMark x1="88021" y1="69306" x2="87969" y2="35093"/>
+                        <a14:foregroundMark x1="87969" y1="35093" x2="81354" y2="26528"/>
+                        <a14:foregroundMark x1="81354" y1="26528" x2="76797" y2="25231"/>
+                        <a14:foregroundMark x1="25469" y1="26250" x2="15651" y2="26296"/>
+                        <a14:foregroundMark x1="15651" y1="26296" x2="11823" y2="36343"/>
+                        <a14:foregroundMark x1="11823" y1="36343" x2="13073" y2="66528"/>
+                        <a14:foregroundMark x1="13073" y1="66528" x2="17474" y2="81481"/>
+                        <a14:foregroundMark x1="17474" y1="81481" x2="20911" y2="87130"/>
+                        <a14:foregroundMark x1="20911" y1="87130" x2="24870" y2="89537"/>
+                        <a14:foregroundMark x1="24870" y1="89537" x2="29297" y2="84398"/>
+                        <a14:foregroundMark x1="29297" y1="84398" x2="35208" y2="57037"/>
+                        <a14:foregroundMark x1="35208" y1="57037" x2="35911" y2="45972"/>
+                        <a14:foregroundMark x1="35911" y1="45972" x2="30911" y2="29398"/>
+                        <a14:foregroundMark x1="30911" y1="29398" x2="24844" y2="26852"/>
+                        <a14:foregroundMark x1="11927" y1="30324" x2="8672" y2="35741"/>
+                        <a14:foregroundMark x1="8672" y1="35741" x2="7801" y2="39260"/>
+                        <a14:foregroundMark x1="8222" y1="75493" x2="8333" y2="78102"/>
+                        <a14:foregroundMark x1="7459" y1="57493" x2="7608" y2="61015"/>
+                        <a14:foregroundMark x1="8333" y1="78102" x2="11745" y2="82917"/>
+                        <a14:foregroundMark x1="11745" y1="82917" x2="15729" y2="76065"/>
+                        <a14:foregroundMark x1="15729" y1="76065" x2="22266" y2="44954"/>
+                        <a14:foregroundMark x1="22266" y1="44954" x2="21615" y2="37917"/>
+                        <a14:foregroundMark x1="21615" y1="37917" x2="19271" y2="35139"/>
+                        <a14:foregroundMark x1="9740" y1="31343" x2="7655" y2="47022"/>
+                        <a14:foregroundMark x1="6603" y1="75668" x2="6589" y2="79028"/>
+                        <a14:foregroundMark x1="6671" y1="59433" x2="6664" y2="61117"/>
+                        <a14:foregroundMark x1="6589" y1="79028" x2="8333" y2="87130"/>
+                        <a14:foregroundMark x1="8333" y1="87130" x2="11380" y2="81574"/>
+                        <a14:foregroundMark x1="11380" y1="81574" x2="14271" y2="36481"/>
+                        <a14:foregroundMark x1="14271" y1="36481" x2="12812" y2="33148"/>
+                        <a14:foregroundMark x1="10000" y1="28981" x2="10469" y2="38102"/>
+                        <a14:foregroundMark x1="10469" y1="38102" x2="12240" y2="46204"/>
+                        <a14:foregroundMark x1="12240" y1="46204" x2="11615" y2="79769"/>
+                        <a14:foregroundMark x1="11615" y1="79769" x2="7630" y2="75972"/>
+                        <a14:foregroundMark x1="6770" y1="61105" x2="6673" y2="59433"/>
+                        <a14:foregroundMark x1="7630" y1="75972" x2="7606" y2="75560"/>
+                        <a14:foregroundMark x1="7686" y1="45352" x2="8516" y2="35231"/>
+                        <a14:foregroundMark x1="8516" y1="35231" x2="10599" y2="30324"/>
+                        <a14:foregroundMark x1="17005" y1="30787" x2="20286" y2="26343"/>
+                        <a14:foregroundMark x1="20286" y1="26343" x2="24245" y2="30787"/>
+                        <a14:foregroundMark x1="24245" y1="30787" x2="25078" y2="38935"/>
+                        <a14:foregroundMark x1="25078" y1="38935" x2="21146" y2="40417"/>
+                        <a14:foregroundMark x1="21146" y1="40417" x2="18073" y2="33519"/>
+                        <a14:foregroundMark x1="18073" y1="33519" x2="18021" y2="27778"/>
+                        <a14:foregroundMark x1="52214" y1="23241" x2="48021" y2="23796"/>
+                        <a14:foregroundMark x1="48021" y1="23796" x2="44609" y2="27639"/>
+                        <a14:foregroundMark x1="44609" y1="27639" x2="42734" y2="37176"/>
+                        <a14:foregroundMark x1="42734" y1="37176" x2="45495" y2="43981"/>
+                        <a14:foregroundMark x1="45495" y1="43981" x2="51172" y2="44537"/>
+                        <a14:foregroundMark x1="51172" y1="44537" x2="55286" y2="39676"/>
+                        <a14:foregroundMark x1="55286" y1="39676" x2="57552" y2="32639"/>
+                        <a14:foregroundMark x1="57552" y1="32639" x2="55677" y2="25370"/>
+                        <a14:foregroundMark x1="55677" y1="25370" x2="52604" y2="23750"/>
+                        <a14:foregroundMark x1="52708" y1="25509" x2="47057" y2="25139"/>
+                        <a14:foregroundMark x1="47057" y1="25139" x2="43906" y2="31944"/>
+                        <a14:foregroundMark x1="43906" y1="31944" x2="44714" y2="39537"/>
+                        <a14:foregroundMark x1="44714" y1="39537" x2="48516" y2="42361"/>
+                        <a14:foregroundMark x1="48516" y1="42361" x2="52891" y2="40926"/>
+                        <a14:foregroundMark x1="52891" y1="40926" x2="55677" y2="34769"/>
+                        <a14:foregroundMark x1="55677" y1="34769" x2="54193" y2="27361"/>
+                        <a14:foregroundMark x1="54193" y1="27361" x2="52552" y2="25972"/>
+                        <a14:foregroundMark x1="54401" y1="32130" x2="54193" y2="34630"/>
+                        <a14:foregroundMark x1="46563" y1="31250" x2="46979" y2="34074"/>
+                        <a14:foregroundMark x1="47188" y1="38056" x2="48411" y2="40880"/>
+                        <a14:foregroundMark x1="37188" y1="77037" x2="38359" y2="85231"/>
+                        <a14:foregroundMark x1="38359" y1="85231" x2="43073" y2="88750"/>
+                        <a14:foregroundMark x1="43073" y1="88750" x2="51953" y2="90787"/>
+                        <a14:foregroundMark x1="51953" y1="90787" x2="56198" y2="90231"/>
+                        <a14:foregroundMark x1="56198" y1="90231" x2="60286" y2="85972"/>
+                        <a14:foregroundMark x1="60286" y1="85972" x2="62760" y2="71435"/>
+                        <a14:foregroundMark x1="62760" y1="71435" x2="62240" y2="60093"/>
+                        <a14:foregroundMark x1="67526" y1="27593" x2="66380" y2="80556"/>
+                        <a14:foregroundMark x1="66380" y1="80556" x2="69063" y2="86806"/>
+                        <a14:foregroundMark x1="69063" y1="86806" x2="82448" y2="90185"/>
+                        <a14:foregroundMark x1="82448" y1="90185" x2="84063" y2="89259"/>
+                        <a14:foregroundMark x1="78854" y1="23056" x2="83438" y2="21759"/>
+                        <a14:foregroundMark x1="83438" y1="21759" x2="87370" y2="26111"/>
+                        <a14:foregroundMark x1="87370" y1="26111" x2="87865" y2="79907"/>
+                        <a14:foregroundMark x1="87865" y1="79907" x2="87240" y2="86620"/>
+                        <a14:foregroundMark x1="86589" y1="24861" x2="90495" y2="29815"/>
+                        <a14:foregroundMark x1="90495" y1="29815" x2="91016" y2="78565"/>
+                        <a14:foregroundMark x1="91016" y1="78565" x2="89401" y2="86065"/>
+                        <a14:foregroundMark x1="89401" y1="86065" x2="85182" y2="88611"/>
+                        <a14:foregroundMark x1="91901" y1="29074" x2="90260" y2="83843"/>
+                        <a14:foregroundMark x1="90260" y1="83843" x2="92344" y2="77500"/>
+                        <a14:foregroundMark x1="92344" y1="77500" x2="91432" y2="70694"/>
+                        <a14:foregroundMark x1="71146" y1="21019" x2="75391" y2="20231"/>
+                        <a14:foregroundMark x1="75391" y1="20231" x2="82422" y2="20926"/>
+                        <a14:backgroundMark x1="6563" y1="34352" x2="6094" y2="59398"/>
+                        <a14:backgroundMark x1="6719" y1="61111" x2="7214" y2="75602"/>
+                      </a14:backgroundRemoval>
+                    </a14:imgEffect>
+                  </a14:imgLayer>
+                </a14:imgProps>
+              </a:ext>
+            </a:extLst>
+          </a:blip>
+          <a:srcRect l="38083" t="23539" r="37870" b="11864"/>
+          <a:stretch/>
+        </p:blipFill>
+        <p:spPr>
+          <a:xfrm>
+            <a:off x="4835525" y="1333500"/>
+            <a:ext cx="2882900" cy="4356100"/>
+          </a:xfrm>
+          <a:prstGeom prst="roundRect">
+            <a:avLst>
+              <a:gd name="adj" fmla="val 6755"/>
+            </a:avLst>
+          </a:prstGeom>
+          <a:ln w="28575">
+            <a:solidFill>
+              <a:srgbClr val="7030A0"/>
+            </a:solidFill>
+          </a:ln>
+        </p:spPr>
+      </p:pic>
+      <p:pic>
+        <p:nvPicPr>
+          <p:cNvPr id="10" name="Picture 9">
+            <a:extLst>
+              <a:ext uri="{FF2B5EF4-FFF2-40B4-BE49-F238E27FC236}">
+                <a16:creationId xmlns:a16="http://schemas.microsoft.com/office/drawing/2014/main" id="{81FAA973-19CB-4EC0-9C7F-046F0B7384AE}"/>
+              </a:ext>
+            </a:extLst>
+          </p:cNvPr>
+          <p:cNvPicPr>
+            <a:picLocks noChangeAspect="1"/>
+          </p:cNvPicPr>
+          <p:nvPr/>
+        </p:nvPicPr>
+        <p:blipFill rotWithShape="1">
+          <a:blip r:embed="rId2">
+            <a:extLst>
+              <a:ext uri="{BEBA8EAE-BF5A-486C-A8C5-ECC9F3942E4B}">
+                <a14:imgProps xmlns:a14="http://schemas.microsoft.com/office/drawing/2010/main">
+                  <a14:imgLayer r:embed="rId3">
+                    <a14:imgEffect>
+                      <a14:backgroundRemoval t="20231" b="90139" l="8516" r="92344">
+                        <a14:foregroundMark x1="28698" y1="20833" x2="15000" y2="22917"/>
+                        <a14:foregroundMark x1="15000" y1="22917" x2="7292" y2="30880"/>
+                        <a14:foregroundMark x1="7292" y1="30880" x2="6849" y2="34368"/>
+                        <a14:foregroundMark x1="6359" y1="75694" x2="6406" y2="81944"/>
+                        <a14:foregroundMark x1="6237" y1="59407" x2="6250" y2="61161"/>
+                        <a14:foregroundMark x1="6406" y1="81944" x2="10859" y2="88194"/>
+                        <a14:foregroundMark x1="10859" y1="88194" x2="26224" y2="92269"/>
+                        <a14:foregroundMark x1="26224" y1="92269" x2="30104" y2="90370"/>
+                        <a14:foregroundMark x1="30104" y1="90370" x2="34323" y2="82963"/>
+                        <a14:foregroundMark x1="34323" y1="82963" x2="36016" y2="75926"/>
+                        <a14:foregroundMark x1="36016" y1="75926" x2="36589" y2="59907"/>
+                        <a14:foregroundMark x1="36589" y1="59907" x2="33073" y2="26620"/>
+                        <a14:foregroundMark x1="33073" y1="26620" x2="29714" y2="21343"/>
+                        <a14:foregroundMark x1="29714" y1="21343" x2="28438" y2="20694"/>
+                        <a14:foregroundMark x1="51016" y1="28241" x2="46380" y2="26065"/>
+                        <a14:foregroundMark x1="46380" y1="26065" x2="41354" y2="33380"/>
+                        <a14:foregroundMark x1="41354" y1="33380" x2="39375" y2="42037"/>
+                        <a14:foregroundMark x1="39375" y1="42037" x2="38411" y2="69352"/>
+                        <a14:foregroundMark x1="38411" y1="69352" x2="39948" y2="78194"/>
+                        <a14:foregroundMark x1="39948" y1="78194" x2="44115" y2="85324"/>
+                        <a14:foregroundMark x1="44115" y1="85324" x2="50833" y2="86435"/>
+                        <a14:foregroundMark x1="50833" y1="86435" x2="57995" y2="79120"/>
+                        <a14:foregroundMark x1="57995" y1="79120" x2="63359" y2="48935"/>
+                        <a14:foregroundMark x1="63359" y1="48935" x2="62474" y2="36991"/>
+                        <a14:foregroundMark x1="62474" y1="36991" x2="54375" y2="26019"/>
+                        <a14:foregroundMark x1="54375" y1="26019" x2="48828" y2="22778"/>
+                        <a14:foregroundMark x1="80938" y1="30139" x2="75833" y2="30787"/>
+                        <a14:foregroundMark x1="75833" y1="30787" x2="72474" y2="37778"/>
+                        <a14:foregroundMark x1="72474" y1="37778" x2="68750" y2="70787"/>
+                        <a14:foregroundMark x1="68750" y1="70787" x2="71302" y2="77963"/>
+                        <a14:foregroundMark x1="71302" y1="77963" x2="80990" y2="81435"/>
+                        <a14:foregroundMark x1="80990" y1="81435" x2="85651" y2="80278"/>
+                        <a14:foregroundMark x1="85651" y1="80278" x2="88021" y2="69306"/>
+                        <a14:foregroundMark x1="88021" y1="69306" x2="87969" y2="35093"/>
+                        <a14:foregroundMark x1="87969" y1="35093" x2="81354" y2="26528"/>
+                        <a14:foregroundMark x1="81354" y1="26528" x2="76797" y2="25231"/>
+                        <a14:foregroundMark x1="25469" y1="26250" x2="15651" y2="26296"/>
+                        <a14:foregroundMark x1="15651" y1="26296" x2="11823" y2="36343"/>
+                        <a14:foregroundMark x1="11823" y1="36343" x2="13073" y2="66528"/>
+                        <a14:foregroundMark x1="13073" y1="66528" x2="17474" y2="81481"/>
+                        <a14:foregroundMark x1="17474" y1="81481" x2="20911" y2="87130"/>
+                        <a14:foregroundMark x1="20911" y1="87130" x2="24870" y2="89537"/>
+                        <a14:foregroundMark x1="24870" y1="89537" x2="29297" y2="84398"/>
+                        <a14:foregroundMark x1="29297" y1="84398" x2="35208" y2="57037"/>
+                        <a14:foregroundMark x1="35208" y1="57037" x2="35911" y2="45972"/>
+                        <a14:foregroundMark x1="35911" y1="45972" x2="30911" y2="29398"/>
+                        <a14:foregroundMark x1="30911" y1="29398" x2="24844" y2="26852"/>
+                        <a14:foregroundMark x1="11927" y1="30324" x2="8672" y2="35741"/>
+                        <a14:foregroundMark x1="8672" y1="35741" x2="7801" y2="39260"/>
+                        <a14:foregroundMark x1="8222" y1="75493" x2="8333" y2="78102"/>
+                        <a14:foregroundMark x1="7459" y1="57493" x2="7608" y2="61015"/>
+                        <a14:foregroundMark x1="8333" y1="78102" x2="11745" y2="82917"/>
+                        <a14:foregroundMark x1="11745" y1="82917" x2="15729" y2="76065"/>
+                        <a14:foregroundMark x1="15729" y1="76065" x2="22266" y2="44954"/>
+                        <a14:foregroundMark x1="22266" y1="44954" x2="21615" y2="37917"/>
+                        <a14:foregroundMark x1="21615" y1="37917" x2="19271" y2="35139"/>
+                        <a14:foregroundMark x1="9740" y1="31343" x2="7655" y2="47022"/>
+                        <a14:foregroundMark x1="6603" y1="75668" x2="6589" y2="79028"/>
+                        <a14:foregroundMark x1="6671" y1="59433" x2="6664" y2="61117"/>
+                        <a14:foregroundMark x1="6589" y1="79028" x2="8333" y2="87130"/>
+                        <a14:foregroundMark x1="8333" y1="87130" x2="11380" y2="81574"/>
+                        <a14:foregroundMark x1="11380" y1="81574" x2="14271" y2="36481"/>
+                        <a14:foregroundMark x1="14271" y1="36481" x2="12812" y2="33148"/>
+                        <a14:foregroundMark x1="10000" y1="28981" x2="10469" y2="38102"/>
+                        <a14:foregroundMark x1="10469" y1="38102" x2="12240" y2="46204"/>
+                        <a14:foregroundMark x1="12240" y1="46204" x2="11615" y2="79769"/>
+                        <a14:foregroundMark x1="11615" y1="79769" x2="7630" y2="75972"/>
+                        <a14:foregroundMark x1="6770" y1="61105" x2="6673" y2="59433"/>
+                        <a14:foregroundMark x1="7630" y1="75972" x2="7606" y2="75560"/>
+                        <a14:foregroundMark x1="7686" y1="45352" x2="8516" y2="35231"/>
+                        <a14:foregroundMark x1="8516" y1="35231" x2="10599" y2="30324"/>
+                        <a14:foregroundMark x1="17005" y1="30787" x2="20286" y2="26343"/>
+                        <a14:foregroundMark x1="20286" y1="26343" x2="24245" y2="30787"/>
+                        <a14:foregroundMark x1="24245" y1="30787" x2="25078" y2="38935"/>
+                        <a14:foregroundMark x1="25078" y1="38935" x2="21146" y2="40417"/>
+                        <a14:foregroundMark x1="21146" y1="40417" x2="18073" y2="33519"/>
+                        <a14:foregroundMark x1="18073" y1="33519" x2="18021" y2="27778"/>
+                        <a14:foregroundMark x1="52214" y1="23241" x2="48021" y2="23796"/>
+                        <a14:foregroundMark x1="48021" y1="23796" x2="44609" y2="27639"/>
+                        <a14:foregroundMark x1="44609" y1="27639" x2="42734" y2="37176"/>
+                        <a14:foregroundMark x1="42734" y1="37176" x2="45495" y2="43981"/>
+                        <a14:foregroundMark x1="45495" y1="43981" x2="51172" y2="44537"/>
+                        <a14:foregroundMark x1="51172" y1="44537" x2="55286" y2="39676"/>
+                        <a14:foregroundMark x1="55286" y1="39676" x2="57552" y2="32639"/>
+                        <a14:foregroundMark x1="57552" y1="32639" x2="55677" y2="25370"/>
+                        <a14:foregroundMark x1="55677" y1="25370" x2="52604" y2="23750"/>
+                        <a14:foregroundMark x1="52708" y1="25509" x2="47057" y2="25139"/>
+                        <a14:foregroundMark x1="47057" y1="25139" x2="43906" y2="31944"/>
+                        <a14:foregroundMark x1="43906" y1="31944" x2="44714" y2="39537"/>
+                        <a14:foregroundMark x1="44714" y1="39537" x2="48516" y2="42361"/>
+                        <a14:foregroundMark x1="48516" y1="42361" x2="52891" y2="40926"/>
+                        <a14:foregroundMark x1="52891" y1="40926" x2="55677" y2="34769"/>
+                        <a14:foregroundMark x1="55677" y1="34769" x2="54193" y2="27361"/>
+                        <a14:foregroundMark x1="54193" y1="27361" x2="52552" y2="25972"/>
+                        <a14:foregroundMark x1="54401" y1="32130" x2="54193" y2="34630"/>
+                        <a14:foregroundMark x1="46563" y1="31250" x2="46979" y2="34074"/>
+                        <a14:foregroundMark x1="47188" y1="38056" x2="48411" y2="40880"/>
+                        <a14:foregroundMark x1="37188" y1="77037" x2="38359" y2="85231"/>
+                        <a14:foregroundMark x1="38359" y1="85231" x2="43073" y2="88750"/>
+                        <a14:foregroundMark x1="43073" y1="88750" x2="51953" y2="90787"/>
+                        <a14:foregroundMark x1="51953" y1="90787" x2="56198" y2="90231"/>
+                        <a14:foregroundMark x1="56198" y1="90231" x2="60286" y2="85972"/>
+                        <a14:foregroundMark x1="60286" y1="85972" x2="62760" y2="71435"/>
+                        <a14:foregroundMark x1="62760" y1="71435" x2="62240" y2="60093"/>
+                        <a14:foregroundMark x1="67526" y1="27593" x2="66380" y2="80556"/>
+                        <a14:foregroundMark x1="66380" y1="80556" x2="69063" y2="86806"/>
+                        <a14:foregroundMark x1="69063" y1="86806" x2="82448" y2="90185"/>
+                        <a14:foregroundMark x1="82448" y1="90185" x2="84063" y2="89259"/>
+                        <a14:foregroundMark x1="78854" y1="23056" x2="83438" y2="21759"/>
+                        <a14:foregroundMark x1="83438" y1="21759" x2="87370" y2="26111"/>
+                        <a14:foregroundMark x1="87370" y1="26111" x2="87865" y2="79907"/>
+                        <a14:foregroundMark x1="87865" y1="79907" x2="87240" y2="86620"/>
+                        <a14:foregroundMark x1="86589" y1="24861" x2="90495" y2="29815"/>
+                        <a14:foregroundMark x1="90495" y1="29815" x2="91016" y2="78565"/>
+                        <a14:foregroundMark x1="91016" y1="78565" x2="89401" y2="86065"/>
+                        <a14:foregroundMark x1="89401" y1="86065" x2="85182" y2="88611"/>
+                        <a14:foregroundMark x1="91901" y1="29074" x2="90260" y2="83843"/>
+                        <a14:foregroundMark x1="90260" y1="83843" x2="92344" y2="77500"/>
+                        <a14:foregroundMark x1="92344" y1="77500" x2="91432" y2="70694"/>
+                        <a14:foregroundMark x1="71146" y1="21019" x2="75391" y2="20231"/>
+                        <a14:foregroundMark x1="75391" y1="20231" x2="82422" y2="20926"/>
+                        <a14:backgroundMark x1="6563" y1="34352" x2="6094" y2="59398"/>
+                        <a14:backgroundMark x1="6719" y1="61111" x2="7214" y2="75602"/>
+                      </a14:backgroundRemoval>
+                    </a14:imgEffect>
+                  </a14:imgLayer>
+                </a14:imgProps>
+              </a:ext>
+            </a:extLst>
+          </a:blip>
+          <a:srcRect l="66738" t="23541" r="9215" b="11862"/>
+          <a:stretch/>
+        </p:blipFill>
+        <p:spPr>
+          <a:xfrm>
+            <a:off x="8147050" y="1333500"/>
+            <a:ext cx="2882900" cy="4356100"/>
+          </a:xfrm>
+          <a:prstGeom prst="roundRect">
+            <a:avLst>
+              <a:gd name="adj" fmla="val 6755"/>
+            </a:avLst>
+          </a:prstGeom>
+          <a:ln w="28575">
+            <a:solidFill>
+              <a:srgbClr val="7030A0"/>
+            </a:solidFill>
+          </a:ln>
+        </p:spPr>
+      </p:pic>
+      <p:sp>
+        <p:nvSpPr>
+          <p:cNvPr id="11" name="Title 1">
+            <a:extLst>
+              <a:ext uri="{FF2B5EF4-FFF2-40B4-BE49-F238E27FC236}">
+                <a16:creationId xmlns:a16="http://schemas.microsoft.com/office/drawing/2014/main" id="{6F245BB7-74FB-48DF-8FEE-DE2C0B8EF16C}"/>
+              </a:ext>
+            </a:extLst>
+          </p:cNvPr>
+          <p:cNvSpPr>
+            <a:spLocks noGrp="1"/>
+          </p:cNvSpPr>
+          <p:nvPr>
+            <p:ph type="title"/>
+          </p:nvPr>
+        </p:nvSpPr>
+        <p:spPr>
+          <a:xfrm>
+            <a:off x="431800" y="368300"/>
+            <a:ext cx="10515600" cy="890588"/>
+          </a:xfrm>
+        </p:spPr>
+        <p:txBody>
+          <a:bodyPr/>
+          <a:lstStyle/>
+          <a:p>
+            <a:r>
+              <a:rPr lang="en-US" dirty="0"/>
+              <a:t>Philosophies</a:t>
+            </a:r>
+            <a:endParaRPr lang="LID4096" dirty="0"/>
+          </a:p>
+        </p:txBody>
+      </p:sp>
+    </p:spTree>
+    <p:extLst>
+      <p:ext uri="{BB962C8B-B14F-4D97-AF65-F5344CB8AC3E}">
+        <p14:creationId xmlns:p14="http://schemas.microsoft.com/office/powerpoint/2010/main" val="4253463944"/>
+      </p:ext>
+    </p:extLst>
+  </p:cSld>
+  <p:clrMapOvr>
+    <a:masterClrMapping/>
+  </p:clrMapOvr>
+</p:sld>
+</file>
+
+<file path=ppt/slides/slide3.xml><?xml version="1.0" encoding="utf-8"?>
+<p:sld xmlns:a="http://schemas.openxmlformats.org/drawingml/2006/main" xmlns:r="http://schemas.openxmlformats.org/officeDocument/2006/relationships" xmlns:p="http://schemas.openxmlformats.org/presentationml/2006/main">
+  <p:cSld>
+    <p:spTree>
+      <p:nvGrpSpPr>
+        <p:cNvPr id="1" name=""/>
+        <p:cNvGrpSpPr/>
+        <p:nvPr/>
+      </p:nvGrpSpPr>
+      <p:grpSpPr>
+        <a:xfrm>
+          <a:off x="0" y="0"/>
+          <a:ext cx="0" cy="0"/>
+          <a:chOff x="0" y="0"/>
+          <a:chExt cx="0" cy="0"/>
+        </a:xfrm>
+      </p:grpSpPr>
+      <p:sp>
+        <p:nvSpPr>
+          <p:cNvPr id="2" name="Title 1">
+            <a:extLst>
+              <a:ext uri="{FF2B5EF4-FFF2-40B4-BE49-F238E27FC236}">
+                <a16:creationId xmlns:a16="http://schemas.microsoft.com/office/drawing/2014/main" id="{7EE561C7-D57D-4C92-8039-0D88B0D922B3}"/>
+              </a:ext>
+            </a:extLst>
+          </p:cNvPr>
+          <p:cNvSpPr>
+            <a:spLocks noGrp="1"/>
+          </p:cNvSpPr>
+          <p:nvPr>
+            <p:ph type="title"/>
+          </p:nvPr>
+        </p:nvSpPr>
+        <p:spPr/>
+        <p:txBody>
+          <a:bodyPr/>
+          <a:lstStyle/>
+          <a:p>
+            <a:endParaRPr lang="LID4096"/>
+          </a:p>
+        </p:txBody>
+      </p:sp>
+      <p:graphicFrame>
+        <p:nvGraphicFramePr>
+          <p:cNvPr id="5" name="Table 6">
+            <a:extLst>
+              <a:ext uri="{FF2B5EF4-FFF2-40B4-BE49-F238E27FC236}">
+                <a16:creationId xmlns:a16="http://schemas.microsoft.com/office/drawing/2014/main" id="{5F4CBA15-7D7C-41CC-A9BF-B35BE78D6E0D}"/>
+              </a:ext>
+            </a:extLst>
+          </p:cNvPr>
+          <p:cNvGraphicFramePr>
+            <a:graphicFrameLocks noGrp="1"/>
+          </p:cNvGraphicFramePr>
+          <p:nvPr>
+            <p:ph idx="1"/>
+            <p:extLst>
+              <p:ext uri="{D42A27DB-BD31-4B8C-83A1-F6EECF244321}">
+                <p14:modId xmlns:p14="http://schemas.microsoft.com/office/powerpoint/2010/main" val="3917260577"/>
+              </p:ext>
+            </p:extLst>
+          </p:nvPr>
+        </p:nvGraphicFramePr>
+        <p:xfrm>
+          <a:off x="838200" y="1825625"/>
+          <a:ext cx="10515599" cy="2484120"/>
+        </p:xfrm>
+        <a:graphic>
+          <a:graphicData uri="http://schemas.openxmlformats.org/drawingml/2006/table">
+            <a:tbl>
+              <a:tblPr firstRow="1" bandRow="1">
+                <a:tableStyleId>{5C22544A-7EE6-4342-B048-85BDC9FD1C3A}</a:tableStyleId>
+              </a:tblPr>
+              <a:tblGrid>
+                <a:gridCol w="3499385">
+                  <a:extLst>
+                    <a:ext uri="{9D8B030D-6E8A-4147-A177-3AD203B41FA5}">
+                      <a16:colId xmlns:a16="http://schemas.microsoft.com/office/drawing/2014/main" val="2887558202"/>
+                    </a:ext>
+                  </a:extLst>
+                </a:gridCol>
+                <a:gridCol w="3508466">
+                  <a:extLst>
+                    <a:ext uri="{9D8B030D-6E8A-4147-A177-3AD203B41FA5}">
+                      <a16:colId xmlns:a16="http://schemas.microsoft.com/office/drawing/2014/main" val="2787931544"/>
+                    </a:ext>
+                  </a:extLst>
+                </a:gridCol>
+                <a:gridCol w="3507748">
+                  <a:extLst>
+                    <a:ext uri="{9D8B030D-6E8A-4147-A177-3AD203B41FA5}">
+                      <a16:colId xmlns:a16="http://schemas.microsoft.com/office/drawing/2014/main" val="3658222964"/>
+                    </a:ext>
+                  </a:extLst>
+                </a:gridCol>
+              </a:tblGrid>
+              <a:tr h="0">
+                <a:tc>
+                  <a:txBody>
+                    <a:bodyPr/>
+                    <a:lstStyle/>
+                    <a:p>
+                      <a:endParaRPr lang="LID4096" dirty="0"/>
+                    </a:p>
+                  </a:txBody>
+                  <a:tcPr/>
+                </a:tc>
+                <a:tc>
+                  <a:txBody>
+                    <a:bodyPr/>
+                    <a:lstStyle/>
+                    <a:p>
+                      <a:r>
+                        <a:rPr lang="en-US" dirty="0"/>
+                        <a:t>Angular</a:t>
+                      </a:r>
+                      <a:endParaRPr lang="LID4096" dirty="0"/>
+                    </a:p>
+                  </a:txBody>
+                  <a:tcPr/>
+                </a:tc>
+                <a:tc>
+                  <a:txBody>
+                    <a:bodyPr/>
+                    <a:lstStyle/>
+                    <a:p>
+                      <a:r>
+                        <a:rPr lang="en-US" dirty="0"/>
+                        <a:t>React</a:t>
+                      </a:r>
+                      <a:endParaRPr lang="LID4096" dirty="0"/>
+                    </a:p>
+                  </a:txBody>
+                  <a:tcPr/>
+                </a:tc>
+                <a:extLst>
+                  <a:ext uri="{0D108BD9-81ED-4DB2-BD59-A6C34878D82A}">
+                    <a16:rowId xmlns:a16="http://schemas.microsoft.com/office/drawing/2014/main" val="277972031"/>
+                  </a:ext>
+                </a:extLst>
+              </a:tr>
+              <a:tr h="370840">
+                <a:tc>
+                  <a:txBody>
+                    <a:bodyPr/>
+                    <a:lstStyle/>
+                    <a:p>
+                      <a:r>
+                        <a:rPr lang="en-US" dirty="0"/>
+                        <a:t>Code management</a:t>
+                      </a:r>
+                      <a:endParaRPr lang="LID4096" dirty="0"/>
+                    </a:p>
+                  </a:txBody>
+                  <a:tcPr/>
+                </a:tc>
+                <a:tc>
+                  <a:txBody>
+                    <a:bodyPr/>
+                    <a:lstStyle/>
+                    <a:p>
+                      <a:endParaRPr lang="LID4096" dirty="0"/>
+                    </a:p>
+                  </a:txBody>
+                  <a:tcPr/>
+                </a:tc>
+                <a:tc>
+                  <a:txBody>
+                    <a:bodyPr/>
+                    <a:lstStyle/>
+                    <a:p>
+                      <a:endParaRPr lang="LID4096" dirty="0"/>
+                    </a:p>
+                  </a:txBody>
+                  <a:tcPr/>
+                </a:tc>
+                <a:extLst>
+                  <a:ext uri="{0D108BD9-81ED-4DB2-BD59-A6C34878D82A}">
+                    <a16:rowId xmlns:a16="http://schemas.microsoft.com/office/drawing/2014/main" val="692296417"/>
+                  </a:ext>
+                </a:extLst>
+              </a:tr>
+              <a:tr h="370840">
+                <a:tc>
+                  <a:txBody>
+                    <a:bodyPr/>
+                    <a:lstStyle/>
+                    <a:p>
+                      <a:r>
+                        <a:rPr lang="en-US" dirty="0" err="1"/>
+                        <a:t>Dependancy</a:t>
+                      </a:r>
+                      <a:r>
+                        <a:rPr lang="en-US" dirty="0"/>
+                        <a:t> injection</a:t>
+                      </a:r>
+                      <a:endParaRPr lang="LID4096" dirty="0"/>
+                    </a:p>
+                  </a:txBody>
+                  <a:tcPr/>
+                </a:tc>
+                <a:tc>
+                  <a:txBody>
+                    <a:bodyPr/>
+                    <a:lstStyle/>
+                    <a:p>
+                      <a:endParaRPr lang="LID4096" dirty="0"/>
+                    </a:p>
+                  </a:txBody>
+                  <a:tcPr/>
+                </a:tc>
+                <a:tc>
+                  <a:txBody>
+                    <a:bodyPr/>
+                    <a:lstStyle/>
+                    <a:p>
+                      <a:endParaRPr lang="LID4096" dirty="0"/>
+                    </a:p>
+                  </a:txBody>
+                  <a:tcPr/>
+                </a:tc>
+                <a:extLst>
+                  <a:ext uri="{0D108BD9-81ED-4DB2-BD59-A6C34878D82A}">
+                    <a16:rowId xmlns:a16="http://schemas.microsoft.com/office/drawing/2014/main" val="294558613"/>
+                  </a:ext>
+                </a:extLst>
+              </a:tr>
+              <a:tr h="370840">
+                <a:tc>
+                  <a:txBody>
+                    <a:bodyPr/>
+                    <a:lstStyle/>
+                    <a:p>
+                      <a:r>
+                        <a:rPr lang="en-US" dirty="0" err="1"/>
+                        <a:t>Mvc</a:t>
+                      </a:r>
+                      <a:r>
+                        <a:rPr lang="en-US" dirty="0"/>
+                        <a:t> pattern compliancy</a:t>
+                      </a:r>
+                      <a:endParaRPr lang="LID4096" dirty="0"/>
+                    </a:p>
+                  </a:txBody>
+                  <a:tcPr/>
+                </a:tc>
+                <a:tc>
+                  <a:txBody>
+                    <a:bodyPr/>
+                    <a:lstStyle/>
+                    <a:p>
+                      <a:r>
+                        <a:rPr lang="en-US" sz="1800" b="0" i="0" kern="1200" dirty="0">
+                          <a:solidFill>
+                            <a:schemeClr val="dk1"/>
+                          </a:solidFill>
+                          <a:effectLst/>
+                          <a:latin typeface="+mn-lt"/>
+                          <a:ea typeface="+mn-ea"/>
+                          <a:cs typeface="+mn-cs"/>
+                        </a:rPr>
+                        <a:t>Angular JS is based on MVC (Model View Controller)</a:t>
+                      </a:r>
+                      <a:endParaRPr lang="LID4096" dirty="0"/>
+                    </a:p>
+                  </a:txBody>
+                  <a:tcPr/>
+                </a:tc>
+                <a:tc>
+                  <a:txBody>
+                    <a:bodyPr/>
+                    <a:lstStyle/>
+                    <a:p>
+                      <a:r>
+                        <a:rPr lang="en-US" sz="1800" b="0" i="0" kern="1200" dirty="0">
+                          <a:solidFill>
+                            <a:schemeClr val="dk1"/>
+                          </a:solidFill>
+                          <a:effectLst/>
+                          <a:latin typeface="+mn-lt"/>
+                          <a:ea typeface="+mn-ea"/>
+                          <a:cs typeface="+mn-cs"/>
+                        </a:rPr>
+                        <a:t>whereas React is based on Virtual DOM.</a:t>
+                      </a:r>
+                      <a:endParaRPr lang="LID4096" dirty="0"/>
+                    </a:p>
+                  </a:txBody>
+                  <a:tcPr/>
+                </a:tc>
+                <a:extLst>
+                  <a:ext uri="{0D108BD9-81ED-4DB2-BD59-A6C34878D82A}">
+                    <a16:rowId xmlns:a16="http://schemas.microsoft.com/office/drawing/2014/main" val="3446091883"/>
+                  </a:ext>
+                </a:extLst>
+              </a:tr>
+              <a:tr h="370840">
+                <a:tc>
+                  <a:txBody>
+                    <a:bodyPr/>
+                    <a:lstStyle/>
+                    <a:p>
+                      <a:r>
+                        <a:rPr lang="en-US" dirty="0" err="1"/>
+                        <a:t>Enterprice</a:t>
+                      </a:r>
+                      <a:r>
+                        <a:rPr lang="en-US" dirty="0"/>
+                        <a:t> </a:t>
+                      </a:r>
+                      <a:r>
+                        <a:rPr lang="en-US" dirty="0" err="1"/>
+                        <a:t>solusions</a:t>
+                      </a:r>
+                      <a:endParaRPr lang="LID4096" dirty="0"/>
+                    </a:p>
+                  </a:txBody>
+                  <a:tcPr/>
+                </a:tc>
+                <a:tc>
+                  <a:txBody>
+                    <a:bodyPr/>
+                    <a:lstStyle/>
+                    <a:p>
+                      <a:endParaRPr lang="LID4096" dirty="0"/>
+                    </a:p>
+                  </a:txBody>
+                  <a:tcPr/>
+                </a:tc>
+                <a:tc>
+                  <a:txBody>
+                    <a:bodyPr/>
+                    <a:lstStyle/>
+                    <a:p>
+                      <a:endParaRPr lang="LID4096" dirty="0"/>
+                    </a:p>
+                  </a:txBody>
+                  <a:tcPr/>
+                </a:tc>
+                <a:extLst>
+                  <a:ext uri="{0D108BD9-81ED-4DB2-BD59-A6C34878D82A}">
+                    <a16:rowId xmlns:a16="http://schemas.microsoft.com/office/drawing/2014/main" val="684941433"/>
+                  </a:ext>
+                </a:extLst>
+              </a:tr>
+              <a:tr h="182763">
+                <a:tc>
+                  <a:txBody>
+                    <a:bodyPr/>
+                    <a:lstStyle/>
+                    <a:p>
+                      <a:r>
+                        <a:rPr lang="en-US" dirty="0"/>
+                        <a:t>Mainstream</a:t>
+                      </a:r>
+                      <a:endParaRPr lang="LID4096" dirty="0"/>
+                    </a:p>
+                  </a:txBody>
+                  <a:tcPr/>
+                </a:tc>
+                <a:tc>
+                  <a:txBody>
+                    <a:bodyPr/>
+                    <a:lstStyle/>
+                    <a:p>
+                      <a:endParaRPr lang="LID4096" dirty="0"/>
+                    </a:p>
+                  </a:txBody>
+                  <a:tcPr/>
+                </a:tc>
+                <a:tc>
+                  <a:txBody>
+                    <a:bodyPr/>
+                    <a:lstStyle/>
+                    <a:p>
+                      <a:endParaRPr lang="LID4096" dirty="0"/>
+                    </a:p>
+                  </a:txBody>
+                  <a:tcPr/>
+                </a:tc>
+                <a:extLst>
+                  <a:ext uri="{0D108BD9-81ED-4DB2-BD59-A6C34878D82A}">
+                    <a16:rowId xmlns:a16="http://schemas.microsoft.com/office/drawing/2014/main" val="660892178"/>
+                  </a:ext>
+                </a:extLst>
+              </a:tr>
+            </a:tbl>
+          </a:graphicData>
+        </a:graphic>
+      </p:graphicFrame>
+    </p:spTree>
+    <p:extLst>
+      <p:ext uri="{BB962C8B-B14F-4D97-AF65-F5344CB8AC3E}">
+        <p14:creationId xmlns:p14="http://schemas.microsoft.com/office/powerpoint/2010/main" val="1059379449"/>
+      </p:ext>
+    </p:extLst>
+  </p:cSld>
+  <p:clrMapOvr>
+    <a:masterClrMapping/>
+  </p:clrMapOvr>
+</p:sld>
+</file>
+
+<file path=ppt/slides/slide4.xml><?xml version="1.0" encoding="utf-8"?>
+<p:sld xmlns:a="http://schemas.openxmlformats.org/drawingml/2006/main" xmlns:r="http://schemas.openxmlformats.org/officeDocument/2006/relationships" xmlns:p="http://schemas.openxmlformats.org/presentationml/2006/main">
+  <p:cSld>
+    <p:bg>
+      <p:bgPr>
+        <a:gradFill rotWithShape="1">
+          <a:gsLst>
+            <a:gs pos="0">
+              <a:schemeClr val="bg1">
+                <a:tint val="90000"/>
+                <a:lumMod val="110000"/>
+              </a:schemeClr>
+            </a:gs>
+            <a:gs pos="100000">
+              <a:schemeClr val="bg1">
+                <a:shade val="64000"/>
+                <a:lumMod val="88000"/>
+              </a:schemeClr>
+            </a:gs>
+          </a:gsLst>
+          <a:lin ang="5400000" scaled="0"/>
+        </a:gradFill>
+        <a:effectLst/>
+      </p:bgPr>
+    </p:bg>
+    <p:spTree>
+      <p:nvGrpSpPr>
+        <p:cNvPr id="1" name=""/>
+        <p:cNvGrpSpPr/>
+        <p:nvPr/>
+      </p:nvGrpSpPr>
+      <p:grpSpPr>
+        <a:xfrm>
+          <a:off x="0" y="0"/>
+          <a:ext cx="0" cy="0"/>
+          <a:chOff x="0" y="0"/>
+          <a:chExt cx="0" cy="0"/>
+        </a:xfrm>
+      </p:grpSpPr>
+      <p:sp>
+        <p:nvSpPr>
+          <p:cNvPr id="2" name="Title 1">
+            <a:extLst>
+              <a:ext uri="{FF2B5EF4-FFF2-40B4-BE49-F238E27FC236}">
+                <a16:creationId xmlns:a16="http://schemas.microsoft.com/office/drawing/2014/main" id="{9EB90523-84C9-457E-B6FE-43DBFC64A2D3}"/>
+              </a:ext>
+            </a:extLst>
+          </p:cNvPr>
+          <p:cNvSpPr>
+            <a:spLocks noGrp="1"/>
+          </p:cNvSpPr>
+          <p:nvPr>
+            <p:ph type="title"/>
+          </p:nvPr>
+        </p:nvSpPr>
+        <p:spPr>
+          <a:xfrm>
+            <a:off x="822335" y="336885"/>
+            <a:ext cx="10364451" cy="1074100"/>
+          </a:xfrm>
+        </p:spPr>
+        <p:txBody>
+          <a:bodyPr>
+            <a:normAutofit/>
+          </a:bodyPr>
+          <a:lstStyle/>
+          <a:p>
+            <a:r>
+              <a:rPr lang="en-US" dirty="0"/>
+              <a:t>React VS Angular VS vue.js</a:t>
+            </a:r>
+            <a:endParaRPr lang="LID4096" dirty="0"/>
+          </a:p>
+        </p:txBody>
+      </p:sp>
+      <p:graphicFrame>
+        <p:nvGraphicFramePr>
+          <p:cNvPr id="16" name="Table 4">
+            <a:extLst>
+              <a:ext uri="{FF2B5EF4-FFF2-40B4-BE49-F238E27FC236}">
+                <a16:creationId xmlns:a16="http://schemas.microsoft.com/office/drawing/2014/main" id="{5FD502B3-C4DA-4B41-AFA8-D21390AE9CC4}"/>
+              </a:ext>
+            </a:extLst>
+          </p:cNvPr>
+          <p:cNvGraphicFramePr>
+            <a:graphicFrameLocks noGrp="1"/>
+          </p:cNvGraphicFramePr>
+          <p:nvPr>
+            <p:ph idx="1"/>
+            <p:extLst>
+              <p:ext uri="{D42A27DB-BD31-4B8C-83A1-F6EECF244321}">
+                <p14:modId xmlns:p14="http://schemas.microsoft.com/office/powerpoint/2010/main" val="3768149328"/>
+              </p:ext>
+            </p:extLst>
+          </p:nvPr>
+        </p:nvGraphicFramePr>
+        <p:xfrm>
+          <a:off x="1595038" y="1256097"/>
+          <a:ext cx="9411450" cy="4576813"/>
+        </p:xfrm>
+        <a:graphic>
+          <a:graphicData uri="http://schemas.openxmlformats.org/drawingml/2006/table">
+            <a:tbl>
+              <a:tblPr firstRow="1" bandRow="1">
+                <a:tableStyleId>{5C22544A-7EE6-4342-B048-85BDC9FD1C3A}</a:tableStyleId>
+              </a:tblPr>
+              <a:tblGrid>
+                <a:gridCol w="809743">
+                  <a:extLst>
+                    <a:ext uri="{9D8B030D-6E8A-4147-A177-3AD203B41FA5}">
+                      <a16:colId xmlns:a16="http://schemas.microsoft.com/office/drawing/2014/main" val="2998491468"/>
+                    </a:ext>
+                  </a:extLst>
+                </a:gridCol>
+                <a:gridCol w="1715076">
+                  <a:extLst>
+                    <a:ext uri="{9D8B030D-6E8A-4147-A177-3AD203B41FA5}">
+                      <a16:colId xmlns:a16="http://schemas.microsoft.com/office/drawing/2014/main" val="3849906133"/>
+                    </a:ext>
+                  </a:extLst>
+                </a:gridCol>
+                <a:gridCol w="3429548">
+                  <a:extLst>
+                    <a:ext uri="{9D8B030D-6E8A-4147-A177-3AD203B41FA5}">
+                      <a16:colId xmlns:a16="http://schemas.microsoft.com/office/drawing/2014/main" val="2565378212"/>
+                    </a:ext>
+                  </a:extLst>
+                </a:gridCol>
+                <a:gridCol w="3187371">
+                  <a:extLst>
+                    <a:ext uri="{9D8B030D-6E8A-4147-A177-3AD203B41FA5}">
+                      <a16:colId xmlns:a16="http://schemas.microsoft.com/office/drawing/2014/main" val="2783454770"/>
+                    </a:ext>
+                  </a:extLst>
+                </a:gridCol>
+                <a:gridCol w="269712">
+                  <a:extLst>
+                    <a:ext uri="{9D8B030D-6E8A-4147-A177-3AD203B41FA5}">
+                      <a16:colId xmlns:a16="http://schemas.microsoft.com/office/drawing/2014/main" val="2411393601"/>
+                    </a:ext>
+                  </a:extLst>
+                </a:gridCol>
+              </a:tblGrid>
+              <a:tr h="218005">
+                <a:tc>
+                  <a:txBody>
+                    <a:bodyPr/>
+                    <a:lstStyle/>
+                    <a:p>
+                      <a:endParaRPr lang="LID4096" sz="700"/>
+                    </a:p>
+                  </a:txBody>
+                  <a:tcPr marL="38064" marR="38064" marT="19032" marB="19032"/>
+                </a:tc>
+                <a:tc>
+                  <a:txBody>
+                    <a:bodyPr/>
+                    <a:lstStyle/>
+                    <a:p>
+                      <a:endParaRPr lang="LID4096" sz="700"/>
+                    </a:p>
+                  </a:txBody>
+                  <a:tcPr marL="38064" marR="38064" marT="19032" marB="19032"/>
+                </a:tc>
+                <a:tc>
+                  <a:txBody>
+                    <a:bodyPr/>
+                    <a:lstStyle/>
+                    <a:p>
+                      <a:endParaRPr lang="LID4096" sz="700"/>
+                    </a:p>
+                  </a:txBody>
+                  <a:tcPr marL="38064" marR="38064" marT="19032" marB="19032"/>
+                </a:tc>
+                <a:tc>
+                  <a:txBody>
+                    <a:bodyPr/>
+                    <a:lstStyle/>
+                    <a:p>
+                      <a:endParaRPr lang="LID4096" sz="700"/>
+                    </a:p>
+                  </a:txBody>
+                  <a:tcPr marL="38064" marR="38064" marT="19032" marB="19032"/>
+                </a:tc>
+                <a:tc>
+                  <a:txBody>
+                    <a:bodyPr/>
+                    <a:lstStyle/>
+                    <a:p>
+                      <a:endParaRPr lang="LID4096" sz="700"/>
+                    </a:p>
+                  </a:txBody>
+                  <a:tcPr marL="38064" marR="38064" marT="19032" marB="19032"/>
+                </a:tc>
+                <a:extLst>
+                  <a:ext uri="{0D108BD9-81ED-4DB2-BD59-A6C34878D82A}">
+                    <a16:rowId xmlns:a16="http://schemas.microsoft.com/office/drawing/2014/main" val="1099739277"/>
+                  </a:ext>
+                </a:extLst>
+              </a:tr>
+              <a:tr h="407907">
+                <a:tc>
+                  <a:txBody>
+                    <a:bodyPr/>
+                    <a:lstStyle/>
+                    <a:p>
+                      <a:pPr marL="0" marR="0" lvl="0" indent="0" algn="l" defTabSz="914400" rtl="0" eaLnBrk="1" fontAlgn="auto" latinLnBrk="0" hangingPunct="1">
+                        <a:lnSpc>
+                          <a:spcPct val="100000"/>
+                        </a:lnSpc>
+                        <a:spcBef>
+                          <a:spcPts val="0"/>
+                        </a:spcBef>
+                        <a:spcAft>
+                          <a:spcPts val="0"/>
+                        </a:spcAft>
+                        <a:buClrTx/>
+                        <a:buSzTx/>
+                        <a:buFontTx/>
+                        <a:buNone/>
+                        <a:tabLst/>
+                        <a:defRPr/>
+                      </a:pPr>
+                      <a:r>
+                        <a:rPr lang="en-US" sz="700"/>
+                        <a:t>overview-</a:t>
+                      </a:r>
+                    </a:p>
+                    <a:p>
+                      <a:endParaRPr lang="LID4096" sz="700"/>
+                    </a:p>
+                  </a:txBody>
+                  <a:tcPr marL="38064" marR="38064" marT="19032" marB="19032"/>
+                </a:tc>
+                <a:tc>
+                  <a:txBody>
+                    <a:bodyPr/>
+                    <a:lstStyle/>
+                    <a:p>
+                      <a:pPr marL="0" marR="0" lvl="0" indent="0" algn="l" defTabSz="914400" rtl="0" eaLnBrk="1" fontAlgn="auto" latinLnBrk="0" hangingPunct="1">
+                        <a:lnSpc>
+                          <a:spcPct val="100000"/>
+                        </a:lnSpc>
+                        <a:spcBef>
+                          <a:spcPts val="0"/>
+                        </a:spcBef>
+                        <a:spcAft>
+                          <a:spcPts val="0"/>
+                        </a:spcAft>
+                        <a:buClrTx/>
+                        <a:buSzTx/>
+                        <a:buFontTx/>
+                        <a:buNone/>
+                        <a:tabLst/>
+                        <a:defRPr/>
+                      </a:pPr>
+                      <a:r>
+                        <a:rPr lang="en-US" sz="700"/>
+                        <a:t>angular- google</a:t>
+                      </a:r>
+                    </a:p>
+                    <a:p>
+                      <a:endParaRPr lang="LID4096" sz="700"/>
+                    </a:p>
+                  </a:txBody>
+                  <a:tcPr marL="38064" marR="38064" marT="19032" marB="19032"/>
+                </a:tc>
+                <a:tc>
+                  <a:txBody>
+                    <a:bodyPr/>
+                    <a:lstStyle/>
+                    <a:p>
+                      <a:pPr marL="0" marR="0" lvl="0" indent="0" algn="l" defTabSz="914400" rtl="0" eaLnBrk="1" fontAlgn="auto" latinLnBrk="0" hangingPunct="1">
+                        <a:lnSpc>
+                          <a:spcPct val="100000"/>
+                        </a:lnSpc>
+                        <a:spcBef>
+                          <a:spcPts val="0"/>
+                        </a:spcBef>
+                        <a:spcAft>
+                          <a:spcPts val="0"/>
+                        </a:spcAft>
+                        <a:buClrTx/>
+                        <a:buSzTx/>
+                        <a:buFontTx/>
+                        <a:buNone/>
+                        <a:tabLst/>
+                        <a:defRPr/>
+                      </a:pPr>
+                      <a:r>
+                        <a:rPr lang="en-US" sz="700"/>
+                        <a:t>react- </a:t>
+                      </a:r>
+                      <a:r>
+                        <a:rPr lang="en-US" sz="700" err="1"/>
+                        <a:t>facebook</a:t>
+                      </a:r>
+                      <a:endParaRPr lang="en-US" sz="700"/>
+                    </a:p>
+                    <a:p>
+                      <a:endParaRPr lang="LID4096" sz="700"/>
+                    </a:p>
+                  </a:txBody>
+                  <a:tcPr marL="38064" marR="38064" marT="19032" marB="19032"/>
+                </a:tc>
+                <a:tc>
+                  <a:txBody>
+                    <a:bodyPr/>
+                    <a:lstStyle/>
+                    <a:p>
+                      <a:pPr marL="0" marR="0" lvl="0" indent="0" algn="l" defTabSz="914400" rtl="0" eaLnBrk="1" fontAlgn="auto" latinLnBrk="0" hangingPunct="1">
+                        <a:lnSpc>
+                          <a:spcPct val="100000"/>
+                        </a:lnSpc>
+                        <a:spcBef>
+                          <a:spcPts val="0"/>
+                        </a:spcBef>
+                        <a:spcAft>
+                          <a:spcPts val="0"/>
+                        </a:spcAft>
+                        <a:buClrTx/>
+                        <a:buSzTx/>
+                        <a:buFontTx/>
+                        <a:buNone/>
+                        <a:tabLst/>
+                        <a:defRPr/>
+                      </a:pPr>
+                      <a:r>
+                        <a:rPr lang="en-US" sz="700" err="1"/>
+                        <a:t>veu</a:t>
+                      </a:r>
+                      <a:r>
+                        <a:rPr lang="en-US" sz="700"/>
+                        <a:t>- standalone, team of collaborates</a:t>
+                      </a:r>
+                    </a:p>
+                    <a:p>
+                      <a:pPr marL="0" marR="0" lvl="0" indent="0" algn="l" defTabSz="914400" rtl="0" eaLnBrk="1" fontAlgn="auto" latinLnBrk="0" hangingPunct="1">
+                        <a:lnSpc>
+                          <a:spcPct val="100000"/>
+                        </a:lnSpc>
+                        <a:spcBef>
+                          <a:spcPts val="0"/>
+                        </a:spcBef>
+                        <a:spcAft>
+                          <a:spcPts val="0"/>
+                        </a:spcAft>
+                        <a:buClrTx/>
+                        <a:buSzTx/>
+                        <a:buFontTx/>
+                        <a:buNone/>
+                        <a:tabLst/>
+                        <a:defRPr/>
+                      </a:pPr>
+                      <a:r>
+                        <a:rPr lang="en-US" sz="700"/>
+                        <a:t>veu.js.org- huge team</a:t>
+                      </a:r>
+                    </a:p>
+                  </a:txBody>
+                  <a:tcPr marL="38064" marR="38064" marT="19032" marB="19032"/>
+                </a:tc>
+                <a:tc>
+                  <a:txBody>
+                    <a:bodyPr/>
+                    <a:lstStyle/>
+                    <a:p>
+                      <a:endParaRPr lang="LID4096" sz="700"/>
+                    </a:p>
+                  </a:txBody>
+                  <a:tcPr marL="38064" marR="38064" marT="19032" marB="19032"/>
+                </a:tc>
+                <a:extLst>
+                  <a:ext uri="{0D108BD9-81ED-4DB2-BD59-A6C34878D82A}">
+                    <a16:rowId xmlns:a16="http://schemas.microsoft.com/office/drawing/2014/main" val="3561321399"/>
+                  </a:ext>
+                </a:extLst>
+              </a:tr>
+              <a:tr h="1346951">
+                <a:tc>
+                  <a:txBody>
+                    <a:bodyPr/>
+                    <a:lstStyle/>
+                    <a:p>
+                      <a:r>
+                        <a:rPr lang="en-US" sz="700" dirty="0"/>
+                        <a:t>philosophies-</a:t>
+                      </a:r>
+                      <a:endParaRPr lang="LID4096" sz="700" dirty="0"/>
+                    </a:p>
+                  </a:txBody>
+                  <a:tcPr marL="38064" marR="38064" marT="19032" marB="19032"/>
+                </a:tc>
+                <a:tc>
+                  <a:txBody>
+                    <a:bodyPr/>
+                    <a:lstStyle/>
+                    <a:p>
+                      <a:r>
+                        <a:rPr lang="en-US" sz="700"/>
+                        <a:t>* </a:t>
+                      </a:r>
+                      <a:r>
+                        <a:rPr lang="en-US" sz="700" err="1"/>
+                        <a:t>featurs</a:t>
+                      </a:r>
+                      <a:r>
+                        <a:rPr lang="en-US" sz="700"/>
+                        <a:t>-rich one stop shop,</a:t>
+                      </a:r>
+                    </a:p>
+                    <a:p>
+                      <a:r>
+                        <a:rPr lang="en-US" sz="700"/>
+                        <a:t>platform </a:t>
+                      </a:r>
+                    </a:p>
+                    <a:p>
+                      <a:r>
+                        <a:rPr lang="en-US" sz="700"/>
+                        <a:t>has tools like cli for managing and creating projects, easy to get support</a:t>
+                      </a:r>
+                    </a:p>
+                    <a:p>
+                      <a:r>
+                        <a:rPr lang="en-US" sz="700"/>
+                        <a:t>(almost )</a:t>
+                      </a:r>
+                      <a:r>
+                        <a:rPr lang="en-US" sz="700" err="1"/>
+                        <a:t>everithing</a:t>
+                      </a:r>
+                      <a:r>
+                        <a:rPr lang="en-US" sz="700"/>
+                        <a:t> has a solution </a:t>
+                      </a:r>
+                    </a:p>
+                    <a:p>
+                      <a:endParaRPr lang="LID4096" sz="700"/>
+                    </a:p>
+                  </a:txBody>
+                  <a:tcPr marL="38064" marR="38064" marT="19032" marB="19032"/>
+                </a:tc>
+                <a:tc>
+                  <a:txBody>
+                    <a:bodyPr/>
+                    <a:lstStyle/>
+                    <a:p>
+                      <a:r>
+                        <a:rPr lang="en-US" sz="700"/>
+                        <a:t>react- minimalistic and focused on UI-</a:t>
+                      </a:r>
+                      <a:r>
+                        <a:rPr lang="en-US" sz="700" err="1"/>
+                        <a:t>bulding</a:t>
+                      </a:r>
+                      <a:endParaRPr lang="en-US" sz="700"/>
+                    </a:p>
+                    <a:p>
+                      <a:r>
+                        <a:rPr lang="en-US" sz="700" err="1"/>
+                        <a:t>librarty</a:t>
+                      </a:r>
+                      <a:endParaRPr lang="en-US" sz="700"/>
+                    </a:p>
+                    <a:p>
+                      <a:r>
+                        <a:rPr lang="en-US" sz="700"/>
+                        <a:t>less </a:t>
+                      </a:r>
+                      <a:r>
+                        <a:rPr lang="en-US" sz="700" err="1"/>
+                        <a:t>featurs</a:t>
+                      </a:r>
+                      <a:r>
+                        <a:rPr lang="en-US" sz="700"/>
+                        <a:t>  </a:t>
+                      </a:r>
+                    </a:p>
+                    <a:p>
+                      <a:r>
+                        <a:rPr lang="en-US" sz="700"/>
+                        <a:t>routers and more </a:t>
+                      </a:r>
+                      <a:r>
+                        <a:rPr lang="en-US" sz="700" err="1"/>
+                        <a:t>managment</a:t>
+                      </a:r>
+                      <a:r>
+                        <a:rPr lang="en-US" sz="700"/>
+                        <a:t> solutions you need to </a:t>
+                      </a:r>
+                      <a:r>
+                        <a:rPr lang="en-US" sz="700" err="1"/>
+                        <a:t>ise</a:t>
+                      </a:r>
+                      <a:r>
+                        <a:rPr lang="en-US" sz="700"/>
+                        <a:t> the community manage packages to add this </a:t>
+                      </a:r>
+                      <a:r>
+                        <a:rPr lang="en-US" sz="700" err="1"/>
+                        <a:t>featurs</a:t>
+                      </a:r>
+                      <a:r>
+                        <a:rPr lang="en-US" sz="700"/>
+                        <a:t>.</a:t>
+                      </a:r>
+                    </a:p>
+                    <a:p>
+                      <a:r>
+                        <a:rPr lang="en-US" sz="700"/>
+                        <a:t>the community is very wide and active so you probably find the solution -but you have to search it.</a:t>
+                      </a:r>
+                    </a:p>
+                    <a:p>
+                      <a:endParaRPr lang="LID4096" sz="700"/>
+                    </a:p>
+                  </a:txBody>
+                  <a:tcPr marL="38064" marR="38064" marT="19032" marB="19032"/>
+                </a:tc>
+                <a:tc>
+                  <a:txBody>
+                    <a:bodyPr/>
+                    <a:lstStyle/>
+                    <a:p>
+                      <a:r>
+                        <a:rPr lang="en-US" sz="700" dirty="0" err="1"/>
+                        <a:t>veu</a:t>
+                      </a:r>
+                      <a:r>
+                        <a:rPr lang="en-US" sz="700" dirty="0"/>
+                        <a:t>-</a:t>
+                      </a:r>
+                    </a:p>
+                    <a:p>
+                      <a:r>
+                        <a:rPr lang="en-US" sz="700" dirty="0"/>
+                        <a:t>between angular and react (more </a:t>
+                      </a:r>
+                      <a:r>
+                        <a:rPr lang="en-US" sz="700" dirty="0" err="1"/>
+                        <a:t>likr</a:t>
+                      </a:r>
+                      <a:r>
+                        <a:rPr lang="en-US" sz="700" dirty="0"/>
+                        <a:t> react)</a:t>
+                      </a:r>
+                    </a:p>
+                    <a:p>
+                      <a:r>
+                        <a:rPr lang="en-US" sz="700" dirty="0"/>
+                        <a:t>it is a framework</a:t>
+                      </a:r>
+                    </a:p>
+                    <a:p>
+                      <a:r>
+                        <a:rPr lang="en-US" sz="700" dirty="0" err="1"/>
+                        <a:t>focuse</a:t>
+                      </a:r>
+                      <a:r>
+                        <a:rPr lang="en-US" sz="700" dirty="0"/>
+                        <a:t> on core </a:t>
+                      </a:r>
+                      <a:r>
+                        <a:rPr lang="en-US" sz="700" dirty="0" err="1"/>
+                        <a:t>featurs</a:t>
+                      </a:r>
+                      <a:r>
+                        <a:rPr lang="en-US" sz="700" dirty="0"/>
+                        <a:t> that you need for writing a code like-  </a:t>
+                      </a:r>
+                      <a:r>
+                        <a:rPr lang="en-US" sz="700" dirty="0" err="1"/>
+                        <a:t>routher</a:t>
+                      </a:r>
+                      <a:r>
+                        <a:rPr lang="en-US" sz="700" dirty="0"/>
+                        <a:t>, built-in-state management solution.</a:t>
+                      </a:r>
+                    </a:p>
+                    <a:p>
+                      <a:r>
+                        <a:rPr lang="en-US" sz="700" dirty="0"/>
+                        <a:t>form validation is a feature that manage in the community and not build in to </a:t>
+                      </a:r>
+                      <a:r>
+                        <a:rPr lang="en-US" sz="700" dirty="0" err="1"/>
+                        <a:t>veu</a:t>
+                      </a:r>
+                      <a:endParaRPr lang="en-US" sz="700" dirty="0"/>
+                    </a:p>
+                    <a:p>
+                      <a:r>
+                        <a:rPr lang="en-US" sz="700" dirty="0" err="1"/>
+                        <a:t>Offets</a:t>
+                      </a:r>
+                      <a:r>
+                        <a:rPr lang="en-US" sz="700" dirty="0"/>
+                        <a:t> cli and more features then react</a:t>
+                      </a:r>
+                    </a:p>
+                    <a:p>
+                      <a:endParaRPr lang="en-US" sz="700" dirty="0"/>
+                    </a:p>
+                    <a:p>
+                      <a:endParaRPr lang="LID4096" sz="700" dirty="0"/>
+                    </a:p>
+                  </a:txBody>
+                  <a:tcPr marL="38064" marR="38064" marT="19032" marB="19032"/>
+                </a:tc>
+                <a:tc>
+                  <a:txBody>
+                    <a:bodyPr/>
+                    <a:lstStyle/>
+                    <a:p>
+                      <a:endParaRPr lang="LID4096" sz="700" dirty="0"/>
+                    </a:p>
+                  </a:txBody>
+                  <a:tcPr marL="38064" marR="38064" marT="19032" marB="19032"/>
+                </a:tc>
+                <a:extLst>
+                  <a:ext uri="{0D108BD9-81ED-4DB2-BD59-A6C34878D82A}">
+                    <a16:rowId xmlns:a16="http://schemas.microsoft.com/office/drawing/2014/main" val="995120689"/>
+                  </a:ext>
+                </a:extLst>
+              </a:tr>
+              <a:tr h="407907">
+                <a:tc>
+                  <a:txBody>
+                    <a:bodyPr/>
+                    <a:lstStyle/>
+                    <a:p>
+                      <a:pPr marL="0" marR="0" lvl="0" indent="0" algn="l" defTabSz="914400" rtl="0" eaLnBrk="1" fontAlgn="auto" latinLnBrk="0" hangingPunct="1">
+                        <a:lnSpc>
+                          <a:spcPct val="100000"/>
+                        </a:lnSpc>
+                        <a:spcBef>
+                          <a:spcPts val="0"/>
+                        </a:spcBef>
+                        <a:spcAft>
+                          <a:spcPts val="0"/>
+                        </a:spcAft>
+                        <a:buClrTx/>
+                        <a:buSzTx/>
+                        <a:buFontTx/>
+                        <a:buNone/>
+                        <a:tabLst/>
+                        <a:defRPr/>
+                      </a:pPr>
+                      <a:r>
+                        <a:rPr lang="en-US" sz="700"/>
+                        <a:t>*syntax</a:t>
+                      </a:r>
+                    </a:p>
+                    <a:p>
+                      <a:endParaRPr lang="LID4096" sz="700"/>
+                    </a:p>
+                  </a:txBody>
+                  <a:tcPr marL="38064" marR="38064" marT="19032" marB="19032"/>
+                </a:tc>
+                <a:tc>
+                  <a:txBody>
+                    <a:bodyPr/>
+                    <a:lstStyle/>
+                    <a:p>
+                      <a:endParaRPr lang="LID4096" sz="700" dirty="0"/>
+                    </a:p>
+                  </a:txBody>
+                  <a:tcPr marL="38064" marR="38064" marT="19032" marB="19032"/>
+                </a:tc>
+                <a:tc>
+                  <a:txBody>
+                    <a:bodyPr/>
+                    <a:lstStyle/>
+                    <a:p>
+                      <a:endParaRPr lang="LID4096" sz="700"/>
+                    </a:p>
+                  </a:txBody>
+                  <a:tcPr marL="38064" marR="38064" marT="19032" marB="19032"/>
+                </a:tc>
+                <a:tc>
+                  <a:txBody>
+                    <a:bodyPr/>
+                    <a:lstStyle/>
+                    <a:p>
+                      <a:endParaRPr lang="LID4096" sz="700"/>
+                    </a:p>
+                  </a:txBody>
+                  <a:tcPr marL="38064" marR="38064" marT="19032" marB="19032"/>
+                </a:tc>
+                <a:tc>
+                  <a:txBody>
+                    <a:bodyPr/>
+                    <a:lstStyle/>
+                    <a:p>
+                      <a:endParaRPr lang="LID4096" sz="700"/>
+                    </a:p>
+                  </a:txBody>
+                  <a:tcPr marL="38064" marR="38064" marT="19032" marB="19032"/>
+                </a:tc>
+                <a:extLst>
+                  <a:ext uri="{0D108BD9-81ED-4DB2-BD59-A6C34878D82A}">
+                    <a16:rowId xmlns:a16="http://schemas.microsoft.com/office/drawing/2014/main" val="2907229477"/>
+                  </a:ext>
+                </a:extLst>
+              </a:tr>
+              <a:tr h="407907">
+                <a:tc>
+                  <a:txBody>
+                    <a:bodyPr/>
+                    <a:lstStyle/>
+                    <a:p>
+                      <a:pPr marL="0" marR="0" lvl="0" indent="0" algn="l" defTabSz="914400" rtl="0" eaLnBrk="1" fontAlgn="auto" latinLnBrk="0" hangingPunct="1">
+                        <a:lnSpc>
+                          <a:spcPct val="100000"/>
+                        </a:lnSpc>
+                        <a:spcBef>
+                          <a:spcPts val="0"/>
+                        </a:spcBef>
+                        <a:spcAft>
+                          <a:spcPts val="0"/>
+                        </a:spcAft>
+                        <a:buClrTx/>
+                        <a:buSzTx/>
+                        <a:buFontTx/>
+                        <a:buNone/>
+                        <a:tabLst/>
+                        <a:defRPr/>
+                      </a:pPr>
+                      <a:r>
+                        <a:rPr lang="en-US" sz="700"/>
+                        <a:t>writing code- </a:t>
+                      </a:r>
+                    </a:p>
+                    <a:p>
+                      <a:endParaRPr lang="LID4096" sz="700"/>
+                    </a:p>
+                  </a:txBody>
+                  <a:tcPr marL="38064" marR="38064" marT="19032" marB="19032"/>
+                </a:tc>
+                <a:tc>
+                  <a:txBody>
+                    <a:bodyPr/>
+                    <a:lstStyle/>
+                    <a:p>
+                      <a:endParaRPr lang="LID4096" sz="700"/>
+                    </a:p>
+                  </a:txBody>
+                  <a:tcPr marL="38064" marR="38064" marT="19032" marB="19032"/>
+                </a:tc>
+                <a:tc>
+                  <a:txBody>
+                    <a:bodyPr/>
+                    <a:lstStyle/>
+                    <a:p>
+                      <a:endParaRPr lang="LID4096" sz="700"/>
+                    </a:p>
+                  </a:txBody>
+                  <a:tcPr marL="38064" marR="38064" marT="19032" marB="19032"/>
+                </a:tc>
+                <a:tc>
+                  <a:txBody>
+                    <a:bodyPr/>
+                    <a:lstStyle/>
+                    <a:p>
+                      <a:endParaRPr lang="LID4096" sz="700"/>
+                    </a:p>
+                  </a:txBody>
+                  <a:tcPr marL="38064" marR="38064" marT="19032" marB="19032"/>
+                </a:tc>
+                <a:tc>
+                  <a:txBody>
+                    <a:bodyPr/>
+                    <a:lstStyle/>
+                    <a:p>
+                      <a:endParaRPr lang="LID4096" sz="700"/>
+                    </a:p>
+                  </a:txBody>
+                  <a:tcPr marL="38064" marR="38064" marT="19032" marB="19032"/>
+                </a:tc>
+                <a:extLst>
+                  <a:ext uri="{0D108BD9-81ED-4DB2-BD59-A6C34878D82A}">
+                    <a16:rowId xmlns:a16="http://schemas.microsoft.com/office/drawing/2014/main" val="2075690062"/>
+                  </a:ext>
+                </a:extLst>
+              </a:tr>
+              <a:tr h="407907">
+                <a:tc>
+                  <a:txBody>
+                    <a:bodyPr/>
+                    <a:lstStyle/>
+                    <a:p>
+                      <a:pPr marL="0" marR="0" lvl="0" indent="0" algn="l" defTabSz="914400" rtl="0" eaLnBrk="1" fontAlgn="auto" latinLnBrk="0" hangingPunct="1">
+                        <a:lnSpc>
+                          <a:spcPct val="100000"/>
+                        </a:lnSpc>
+                        <a:spcBef>
+                          <a:spcPts val="0"/>
+                        </a:spcBef>
+                        <a:spcAft>
+                          <a:spcPts val="0"/>
+                        </a:spcAft>
+                        <a:buClrTx/>
+                        <a:buSzTx/>
+                        <a:buFontTx/>
+                        <a:buNone/>
+                        <a:tabLst/>
+                        <a:defRPr/>
+                      </a:pPr>
+                      <a:r>
+                        <a:rPr lang="en-US" sz="700"/>
+                        <a:t>*easy of learning </a:t>
+                      </a:r>
+                    </a:p>
+                    <a:p>
+                      <a:endParaRPr lang="LID4096" sz="700"/>
+                    </a:p>
+                  </a:txBody>
+                  <a:tcPr marL="38064" marR="38064" marT="19032" marB="19032"/>
+                </a:tc>
+                <a:tc>
+                  <a:txBody>
+                    <a:bodyPr/>
+                    <a:lstStyle/>
+                    <a:p>
+                      <a:endParaRPr lang="LID4096" sz="700"/>
+                    </a:p>
+                  </a:txBody>
+                  <a:tcPr marL="38064" marR="38064" marT="19032" marB="19032"/>
+                </a:tc>
+                <a:tc>
+                  <a:txBody>
+                    <a:bodyPr/>
+                    <a:lstStyle/>
+                    <a:p>
+                      <a:endParaRPr lang="LID4096" sz="700"/>
+                    </a:p>
+                  </a:txBody>
+                  <a:tcPr marL="38064" marR="38064" marT="19032" marB="19032"/>
+                </a:tc>
+                <a:tc>
+                  <a:txBody>
+                    <a:bodyPr/>
+                    <a:lstStyle/>
+                    <a:p>
+                      <a:endParaRPr lang="LID4096" sz="700"/>
+                    </a:p>
+                  </a:txBody>
+                  <a:tcPr marL="38064" marR="38064" marT="19032" marB="19032"/>
+                </a:tc>
+                <a:tc>
+                  <a:txBody>
+                    <a:bodyPr/>
+                    <a:lstStyle/>
+                    <a:p>
+                      <a:endParaRPr lang="LID4096" sz="700"/>
+                    </a:p>
+                  </a:txBody>
+                  <a:tcPr marL="38064" marR="38064" marT="19032" marB="19032"/>
+                </a:tc>
+                <a:extLst>
+                  <a:ext uri="{0D108BD9-81ED-4DB2-BD59-A6C34878D82A}">
+                    <a16:rowId xmlns:a16="http://schemas.microsoft.com/office/drawing/2014/main" val="4230904335"/>
+                  </a:ext>
+                </a:extLst>
+              </a:tr>
+              <a:tr h="407907">
+                <a:tc>
+                  <a:txBody>
+                    <a:bodyPr/>
+                    <a:lstStyle/>
+                    <a:p>
+                      <a:pPr marL="0" marR="0" lvl="0" indent="0" algn="l" defTabSz="914400" rtl="0" eaLnBrk="1" fontAlgn="auto" latinLnBrk="0" hangingPunct="1">
+                        <a:lnSpc>
+                          <a:spcPct val="100000"/>
+                        </a:lnSpc>
+                        <a:spcBef>
+                          <a:spcPts val="0"/>
+                        </a:spcBef>
+                        <a:spcAft>
+                          <a:spcPts val="0"/>
+                        </a:spcAft>
+                        <a:buClrTx/>
+                        <a:buSzTx/>
+                        <a:buFontTx/>
+                        <a:buNone/>
+                        <a:tabLst/>
+                        <a:defRPr/>
+                      </a:pPr>
+                      <a:r>
+                        <a:rPr lang="en-US" sz="700"/>
+                        <a:t>popularity</a:t>
+                      </a:r>
+                    </a:p>
+                    <a:p>
+                      <a:endParaRPr lang="LID4096" sz="700"/>
+                    </a:p>
+                  </a:txBody>
+                  <a:tcPr marL="38064" marR="38064" marT="19032" marB="19032"/>
+                </a:tc>
+                <a:tc>
+                  <a:txBody>
+                    <a:bodyPr/>
+                    <a:lstStyle/>
+                    <a:p>
+                      <a:endParaRPr lang="LID4096" sz="700"/>
+                    </a:p>
+                  </a:txBody>
+                  <a:tcPr marL="38064" marR="38064" marT="19032" marB="19032"/>
+                </a:tc>
+                <a:tc>
+                  <a:txBody>
+                    <a:bodyPr/>
+                    <a:lstStyle/>
+                    <a:p>
+                      <a:endParaRPr lang="LID4096" sz="700" dirty="0"/>
+                    </a:p>
+                  </a:txBody>
+                  <a:tcPr marL="38064" marR="38064" marT="19032" marB="19032"/>
+                </a:tc>
+                <a:tc>
+                  <a:txBody>
+                    <a:bodyPr/>
+                    <a:lstStyle/>
+                    <a:p>
+                      <a:endParaRPr lang="LID4096" sz="700"/>
+                    </a:p>
+                  </a:txBody>
+                  <a:tcPr marL="38064" marR="38064" marT="19032" marB="19032"/>
+                </a:tc>
+                <a:tc>
+                  <a:txBody>
+                    <a:bodyPr/>
+                    <a:lstStyle/>
+                    <a:p>
+                      <a:endParaRPr lang="LID4096" sz="700"/>
+                    </a:p>
+                  </a:txBody>
+                  <a:tcPr marL="38064" marR="38064" marT="19032" marB="19032"/>
+                </a:tc>
+                <a:extLst>
+                  <a:ext uri="{0D108BD9-81ED-4DB2-BD59-A6C34878D82A}">
+                    <a16:rowId xmlns:a16="http://schemas.microsoft.com/office/drawing/2014/main" val="1475537363"/>
+                  </a:ext>
+                </a:extLst>
+              </a:tr>
+              <a:tr h="407907">
+                <a:tc>
+                  <a:txBody>
+                    <a:bodyPr/>
+                    <a:lstStyle/>
+                    <a:p>
+                      <a:pPr marL="0" marR="0" lvl="0" indent="0" algn="l" defTabSz="914400" rtl="0" eaLnBrk="1" fontAlgn="auto" latinLnBrk="0" hangingPunct="1">
+                        <a:lnSpc>
+                          <a:spcPct val="100000"/>
+                        </a:lnSpc>
+                        <a:spcBef>
+                          <a:spcPts val="0"/>
+                        </a:spcBef>
+                        <a:spcAft>
+                          <a:spcPts val="0"/>
+                        </a:spcAft>
+                        <a:buClrTx/>
+                        <a:buSzTx/>
+                        <a:buFontTx/>
+                        <a:buNone/>
+                        <a:tabLst/>
+                        <a:defRPr/>
+                      </a:pPr>
+                      <a:r>
+                        <a:rPr lang="en-US" sz="700"/>
+                        <a:t>*evolution</a:t>
+                      </a:r>
+                    </a:p>
+                    <a:p>
+                      <a:endParaRPr lang="LID4096" sz="700"/>
+                    </a:p>
+                  </a:txBody>
+                  <a:tcPr marL="38064" marR="38064" marT="19032" marB="19032"/>
+                </a:tc>
+                <a:tc>
+                  <a:txBody>
+                    <a:bodyPr/>
+                    <a:lstStyle/>
+                    <a:p>
+                      <a:endParaRPr lang="LID4096" sz="700"/>
+                    </a:p>
+                  </a:txBody>
+                  <a:tcPr marL="38064" marR="38064" marT="19032" marB="19032"/>
+                </a:tc>
+                <a:tc>
+                  <a:txBody>
+                    <a:bodyPr/>
+                    <a:lstStyle/>
+                    <a:p>
+                      <a:endParaRPr lang="LID4096" sz="700"/>
+                    </a:p>
+                  </a:txBody>
+                  <a:tcPr marL="38064" marR="38064" marT="19032" marB="19032"/>
+                </a:tc>
+                <a:tc>
+                  <a:txBody>
+                    <a:bodyPr/>
+                    <a:lstStyle/>
+                    <a:p>
+                      <a:endParaRPr lang="LID4096" sz="700"/>
+                    </a:p>
+                  </a:txBody>
+                  <a:tcPr marL="38064" marR="38064" marT="19032" marB="19032"/>
+                </a:tc>
+                <a:tc>
+                  <a:txBody>
+                    <a:bodyPr/>
+                    <a:lstStyle/>
+                    <a:p>
+                      <a:endParaRPr lang="LID4096" sz="700"/>
+                    </a:p>
+                  </a:txBody>
+                  <a:tcPr marL="38064" marR="38064" marT="19032" marB="19032"/>
+                </a:tc>
+                <a:extLst>
+                  <a:ext uri="{0D108BD9-81ED-4DB2-BD59-A6C34878D82A}">
+                    <a16:rowId xmlns:a16="http://schemas.microsoft.com/office/drawing/2014/main" val="3579978087"/>
+                  </a:ext>
+                </a:extLst>
+              </a:tr>
+              <a:tr h="564415">
+                <a:tc>
+                  <a:txBody>
+                    <a:bodyPr/>
+                    <a:lstStyle/>
+                    <a:p>
+                      <a:pPr marL="0" indent="0">
+                        <a:buNone/>
+                      </a:pPr>
+                      <a:endParaRPr lang="en-US" sz="700"/>
+                    </a:p>
+                    <a:p>
+                      <a:r>
+                        <a:rPr lang="en-US" sz="700"/>
+                        <a:t>*performance</a:t>
+                      </a:r>
+                    </a:p>
+                    <a:p>
+                      <a:endParaRPr lang="LID4096" sz="700"/>
+                    </a:p>
+                  </a:txBody>
+                  <a:tcPr marL="38064" marR="38064" marT="19032" marB="19032"/>
+                </a:tc>
+                <a:tc>
+                  <a:txBody>
+                    <a:bodyPr/>
+                    <a:lstStyle/>
+                    <a:p>
+                      <a:endParaRPr lang="LID4096" sz="700"/>
+                    </a:p>
+                  </a:txBody>
+                  <a:tcPr marL="38064" marR="38064" marT="19032" marB="19032"/>
+                </a:tc>
+                <a:tc>
+                  <a:txBody>
+                    <a:bodyPr/>
+                    <a:lstStyle/>
+                    <a:p>
+                      <a:endParaRPr lang="LID4096" sz="700"/>
+                    </a:p>
+                  </a:txBody>
+                  <a:tcPr marL="38064" marR="38064" marT="19032" marB="19032"/>
+                </a:tc>
+                <a:tc>
+                  <a:txBody>
+                    <a:bodyPr/>
+                    <a:lstStyle/>
+                    <a:p>
+                      <a:endParaRPr lang="LID4096" sz="700" dirty="0"/>
+                    </a:p>
+                  </a:txBody>
+                  <a:tcPr marL="38064" marR="38064" marT="19032" marB="19032"/>
+                </a:tc>
+                <a:tc>
+                  <a:txBody>
+                    <a:bodyPr/>
+                    <a:lstStyle/>
+                    <a:p>
+                      <a:endParaRPr lang="LID4096" sz="700" dirty="0"/>
+                    </a:p>
+                  </a:txBody>
+                  <a:tcPr marL="38064" marR="38064" marT="19032" marB="19032"/>
+                </a:tc>
+                <a:extLst>
+                  <a:ext uri="{0D108BD9-81ED-4DB2-BD59-A6C34878D82A}">
+                    <a16:rowId xmlns:a16="http://schemas.microsoft.com/office/drawing/2014/main" val="2674555812"/>
+                  </a:ext>
+                </a:extLst>
+              </a:tr>
+            </a:tbl>
+          </a:graphicData>
+        </a:graphic>
+      </p:graphicFrame>
+    </p:spTree>
+    <p:extLst>
+      <p:ext uri="{BB962C8B-B14F-4D97-AF65-F5344CB8AC3E}">
+        <p14:creationId xmlns:p14="http://schemas.microsoft.com/office/powerpoint/2010/main" val="2677886166"/>
+      </p:ext>
+    </p:extLst>
+  </p:cSld>
+  <p:clrMapOvr>
+    <a:masterClrMapping/>
+  </p:clrMapOvr>
+</p:sld>
+</file>
+
+<file path=ppt/slides/slide5.xml><?xml version="1.0" encoding="utf-8"?>
+<p:sld xmlns:a="http://schemas.openxmlformats.org/drawingml/2006/main" xmlns:r="http://schemas.openxmlformats.org/officeDocument/2006/relationships" xmlns:p="http://schemas.openxmlformats.org/presentationml/2006/main">
+  <p:cSld>
+    <p:spTree>
+      <p:nvGrpSpPr>
+        <p:cNvPr id="1" name=""/>
+        <p:cNvGrpSpPr/>
+        <p:nvPr/>
+      </p:nvGrpSpPr>
+      <p:grpSpPr>
+        <a:xfrm>
+          <a:off x="0" y="0"/>
+          <a:ext cx="0" cy="0"/>
+          <a:chOff x="0" y="0"/>
+          <a:chExt cx="0" cy="0"/>
+        </a:xfrm>
+      </p:grpSpPr>
+      <p:sp>
+        <p:nvSpPr>
+          <p:cNvPr id="2" name="Title 1">
+            <a:extLst>
+              <a:ext uri="{FF2B5EF4-FFF2-40B4-BE49-F238E27FC236}">
+                <a16:creationId xmlns:a16="http://schemas.microsoft.com/office/drawing/2014/main" id="{167D77DC-906B-4088-A63D-A5B6689B9C98}"/>
+              </a:ext>
+            </a:extLst>
+          </p:cNvPr>
+          <p:cNvSpPr>
+            <a:spLocks noGrp="1"/>
+          </p:cNvSpPr>
+          <p:nvPr>
+            <p:ph type="title"/>
+          </p:nvPr>
+        </p:nvSpPr>
+        <p:spPr/>
+        <p:txBody>
+          <a:bodyPr/>
+          <a:lstStyle/>
+          <a:p>
+            <a:endParaRPr lang="LID4096" dirty="0"/>
+          </a:p>
+        </p:txBody>
+      </p:sp>
+      <p:sp>
+        <p:nvSpPr>
+          <p:cNvPr id="13" name="Content Placeholder 12">
+            <a:extLst>
+              <a:ext uri="{FF2B5EF4-FFF2-40B4-BE49-F238E27FC236}">
+                <a16:creationId xmlns:a16="http://schemas.microsoft.com/office/drawing/2014/main" id="{A89F9A37-CFBE-491E-8399-275C1BF4DEA3}"/>
+              </a:ext>
+            </a:extLst>
+          </p:cNvPr>
+          <p:cNvSpPr>
+            <a:spLocks noGrp="1"/>
+          </p:cNvSpPr>
+          <p:nvPr>
+            <p:ph idx="1"/>
+          </p:nvPr>
+        </p:nvSpPr>
+        <p:spPr/>
+        <p:txBody>
+          <a:bodyPr/>
+          <a:lstStyle/>
+          <a:p>
+            <a:pPr marL="0" indent="0">
+              <a:buNone/>
+            </a:pPr>
+            <a:endParaRPr lang="LID4096" dirty="0"/>
+          </a:p>
+        </p:txBody>
+      </p:sp>
+      <p:pic>
+        <p:nvPicPr>
+          <p:cNvPr id="14" name="Picture 13">
+            <a:extLst>
+              <a:ext uri="{FF2B5EF4-FFF2-40B4-BE49-F238E27FC236}">
+                <a16:creationId xmlns:a16="http://schemas.microsoft.com/office/drawing/2014/main" id="{FACAC656-9D63-4983-873B-C5D5EDB8E1D4}"/>
+              </a:ext>
+            </a:extLst>
+          </p:cNvPr>
+          <p:cNvPicPr>
+            <a:picLocks noChangeAspect="1"/>
+          </p:cNvPicPr>
+          <p:nvPr/>
+        </p:nvPicPr>
+        <p:blipFill rotWithShape="1">
+          <a:blip r:embed="rId2"/>
+          <a:srcRect l="32353" t="40602" r="27882" b="20475"/>
+          <a:stretch/>
+        </p:blipFill>
+        <p:spPr>
+          <a:xfrm>
+            <a:off x="2735847" y="1952056"/>
+            <a:ext cx="6541556" cy="3601721"/>
+          </a:xfrm>
+          <a:prstGeom prst="rect">
+            <a:avLst/>
+          </a:prstGeom>
+        </p:spPr>
+      </p:pic>
+    </p:spTree>
+    <p:extLst>
+      <p:ext uri="{BB962C8B-B14F-4D97-AF65-F5344CB8AC3E}">
+        <p14:creationId xmlns:p14="http://schemas.microsoft.com/office/powerpoint/2010/main" val="1901044212"/>
+      </p:ext>
+    </p:extLst>
+  </p:cSld>
+  <p:clrMapOvr>
+    <a:masterClrMapping/>
+  </p:clrMapOvr>
+</p:sld>
+</file>
+
+<file path=ppt/slides/slide6.xml><?xml version="1.0" encoding="utf-8"?>
+<p:sld xmlns:a="http://schemas.openxmlformats.org/drawingml/2006/main" xmlns:r="http://schemas.openxmlformats.org/officeDocument/2006/relationships" xmlns:p="http://schemas.openxmlformats.org/presentationml/2006/main">
+  <p:cSld>
+    <p:spTree>
+      <p:nvGrpSpPr>
+        <p:cNvPr id="1" name=""/>
+        <p:cNvGrpSpPr/>
+        <p:nvPr/>
+      </p:nvGrpSpPr>
+      <p:grpSpPr>
+        <a:xfrm>
+          <a:off x="0" y="0"/>
+          <a:ext cx="0" cy="0"/>
+          <a:chOff x="0" y="0"/>
+          <a:chExt cx="0" cy="0"/>
+        </a:xfrm>
+      </p:grpSpPr>
+      <p:sp>
+        <p:nvSpPr>
+          <p:cNvPr id="2" name="Title 1">
+            <a:extLst>
+              <a:ext uri="{FF2B5EF4-FFF2-40B4-BE49-F238E27FC236}">
+                <a16:creationId xmlns:a16="http://schemas.microsoft.com/office/drawing/2014/main" id="{92B8A729-AF79-45D2-8E0A-B424339D3459}"/>
+              </a:ext>
+            </a:extLst>
+          </p:cNvPr>
+          <p:cNvSpPr>
+            <a:spLocks noGrp="1"/>
+          </p:cNvSpPr>
+          <p:nvPr>
+            <p:ph type="title"/>
+          </p:nvPr>
+        </p:nvSpPr>
+        <p:spPr/>
+        <p:txBody>
+          <a:bodyPr/>
+          <a:lstStyle/>
+          <a:p>
+            <a:endParaRPr lang="LID4096" dirty="0"/>
+          </a:p>
+        </p:txBody>
+      </p:sp>
+      <p:sp>
+        <p:nvSpPr>
+          <p:cNvPr id="3" name="Content Placeholder 2">
+            <a:extLst>
+              <a:ext uri="{FF2B5EF4-FFF2-40B4-BE49-F238E27FC236}">
+                <a16:creationId xmlns:a16="http://schemas.microsoft.com/office/drawing/2014/main" id="{7BDBD07A-037E-43A4-8B23-FE7A1C9955C8}"/>
+              </a:ext>
+            </a:extLst>
+          </p:cNvPr>
+          <p:cNvSpPr>
+            <a:spLocks noGrp="1"/>
+          </p:cNvSpPr>
+          <p:nvPr>
+            <p:ph idx="1"/>
+          </p:nvPr>
+        </p:nvSpPr>
+        <p:spPr/>
+        <p:txBody>
+          <a:bodyPr>
+            <a:normAutofit/>
+          </a:bodyPr>
+          <a:lstStyle/>
+          <a:p>
+            <a:r>
+              <a:rPr lang="en-US" sz="2800" dirty="0"/>
+              <a:t>do </a:t>
+            </a:r>
+            <a:r>
+              <a:rPr lang="en-US" sz="2800" dirty="0" err="1"/>
+              <a:t>i</a:t>
+            </a:r>
+            <a:r>
+              <a:rPr lang="en-US" sz="2800" dirty="0"/>
+              <a:t> need/want to learn more then one ?</a:t>
+            </a:r>
+            <a:endParaRPr lang="LID4096" sz="2800" dirty="0"/>
+          </a:p>
+        </p:txBody>
+      </p:sp>
+    </p:spTree>
+    <p:extLst>
+      <p:ext uri="{BB962C8B-B14F-4D97-AF65-F5344CB8AC3E}">
+        <p14:creationId xmlns:p14="http://schemas.microsoft.com/office/powerpoint/2010/main" val="3420683395"/>
+      </p:ext>
+    </p:extLst>
+  </p:cSld>
+  <p:clrMapOvr>
+    <a:masterClrMapping/>
+  </p:clrMapOvr>
+</p:sld>
+</file>
+
+<file path=ppt/slides/slide7.xml><?xml version="1.0" encoding="utf-8"?>
+<p:sld xmlns:a="http://schemas.openxmlformats.org/drawingml/2006/main" xmlns:r="http://schemas.openxmlformats.org/officeDocument/2006/relationships" xmlns:p="http://schemas.openxmlformats.org/presentationml/2006/main">
+  <p:cSld>
+    <p:spTree>
+      <p:nvGrpSpPr>
+        <p:cNvPr id="1" name=""/>
+        <p:cNvGrpSpPr/>
+        <p:nvPr/>
+      </p:nvGrpSpPr>
+      <p:grpSpPr>
+        <a:xfrm>
+          <a:off x="0" y="0"/>
+          <a:ext cx="0" cy="0"/>
+          <a:chOff x="0" y="0"/>
+          <a:chExt cx="0" cy="0"/>
+        </a:xfrm>
+      </p:grpSpPr>
+      <p:sp>
+        <p:nvSpPr>
+          <p:cNvPr id="2" name="Title 1">
+            <a:extLst>
+              <a:ext uri="{FF2B5EF4-FFF2-40B4-BE49-F238E27FC236}">
+                <a16:creationId xmlns:a16="http://schemas.microsoft.com/office/drawing/2014/main" id="{4AAC5AB5-9321-4DFF-B205-2554CD4A29FE}"/>
+              </a:ext>
+            </a:extLst>
+          </p:cNvPr>
+          <p:cNvSpPr>
+            <a:spLocks noGrp="1"/>
+          </p:cNvSpPr>
+          <p:nvPr>
+            <p:ph type="title"/>
+          </p:nvPr>
+        </p:nvSpPr>
+        <p:spPr/>
+        <p:txBody>
+          <a:bodyPr>
+            <a:normAutofit fontScale="90000"/>
+          </a:bodyPr>
+          <a:lstStyle/>
+          <a:p>
+            <a:r>
+              <a:rPr lang="en-US" dirty="0"/>
+              <a:t>Angular</a:t>
+            </a:r>
+            <a:r>
+              <a:rPr lang="he-IL" dirty="0"/>
+              <a:t>- </a:t>
+            </a:r>
+            <a:r>
+              <a:rPr lang="en-US" dirty="0"/>
+              <a:t> </a:t>
+            </a:r>
+            <a:br>
+              <a:rPr lang="en-US" dirty="0"/>
+            </a:br>
+            <a:br>
+              <a:rPr lang="en-US" dirty="0"/>
+            </a:br>
+            <a:endParaRPr lang="LID4096" dirty="0"/>
+          </a:p>
+        </p:txBody>
+      </p:sp>
+      <p:sp>
+        <p:nvSpPr>
+          <p:cNvPr id="3" name="Content Placeholder 2">
+            <a:extLst>
+              <a:ext uri="{FF2B5EF4-FFF2-40B4-BE49-F238E27FC236}">
+                <a16:creationId xmlns:a16="http://schemas.microsoft.com/office/drawing/2014/main" id="{C3133856-4561-494E-AAFE-424917C13153}"/>
+              </a:ext>
+            </a:extLst>
+          </p:cNvPr>
+          <p:cNvSpPr>
+            <a:spLocks noGrp="1"/>
+          </p:cNvSpPr>
+          <p:nvPr>
+            <p:ph idx="1"/>
+          </p:nvPr>
+        </p:nvSpPr>
+        <p:spPr/>
+        <p:txBody>
+          <a:bodyPr>
+            <a:normAutofit fontScale="92500" lnSpcReduction="20000"/>
+          </a:bodyPr>
+          <a:lstStyle/>
+          <a:p>
+            <a:r>
+              <a:rPr lang="en-US" dirty="0"/>
+              <a:t>Developed by google- </a:t>
+            </a:r>
+            <a:r>
+              <a:rPr lang="en-US" b="0" i="0" dirty="0">
+                <a:solidFill>
+                  <a:srgbClr val="222222"/>
+                </a:solidFill>
+                <a:effectLst/>
+                <a:latin typeface="Source Sans Pro" panose="020B0503030403020204" pitchFamily="34" charset="0"/>
+              </a:rPr>
+              <a:t>Large community support</a:t>
+            </a:r>
+            <a:endParaRPr lang="en-US" dirty="0"/>
+          </a:p>
+          <a:p>
+            <a:r>
+              <a:rPr lang="en-US" dirty="0"/>
+              <a:t>Written In </a:t>
+            </a:r>
+            <a:r>
+              <a:rPr lang="en-US" b="0" i="0" dirty="0">
+                <a:solidFill>
+                  <a:srgbClr val="222222"/>
+                </a:solidFill>
+                <a:effectLst/>
+                <a:latin typeface="Source Sans Pro" panose="020B0503030403020204" pitchFamily="34" charset="0"/>
+              </a:rPr>
+              <a:t>Typescript, offers efficiency </a:t>
+            </a:r>
+            <a:r>
+              <a:rPr lang="en-US" dirty="0"/>
+              <a:t>Structural framework</a:t>
+            </a:r>
+          </a:p>
+          <a:p>
+            <a:r>
+              <a:rPr lang="en-US" b="0" i="0" dirty="0">
+                <a:solidFill>
+                  <a:srgbClr val="222222"/>
+                </a:solidFill>
+                <a:effectLst/>
+                <a:latin typeface="Source Sans Pro" panose="020B0503030403020204" pitchFamily="34" charset="0"/>
+              </a:rPr>
+              <a:t>Built-in support for AJAX, HTTP, and Observables</a:t>
+            </a:r>
+          </a:p>
+          <a:p>
+            <a:r>
+              <a:rPr lang="en-US" b="0" i="0" dirty="0">
+                <a:solidFill>
+                  <a:srgbClr val="222222"/>
+                </a:solidFill>
+                <a:effectLst/>
+                <a:latin typeface="Source Sans Pro" panose="020B0503030403020204" pitchFamily="34" charset="0"/>
+              </a:rPr>
+              <a:t>Consistent with technology</a:t>
+            </a:r>
+          </a:p>
+          <a:p>
+            <a:pPr algn="l">
+              <a:buFont typeface="Arial" panose="020B0604020202020204" pitchFamily="34" charset="0"/>
+              <a:buChar char="•"/>
+            </a:pPr>
+            <a:r>
+              <a:rPr lang="en-US" b="0" i="0" dirty="0">
+                <a:solidFill>
+                  <a:srgbClr val="222222"/>
+                </a:solidFill>
+                <a:effectLst/>
+                <a:latin typeface="Source Sans Pro" panose="020B0503030403020204" pitchFamily="34" charset="0"/>
+              </a:rPr>
+              <a:t>Cleaner and crisp Coding</a:t>
+            </a:r>
+          </a:p>
+          <a:p>
+            <a:pPr algn="l">
+              <a:buFont typeface="Arial" panose="020B0604020202020204" pitchFamily="34" charset="0"/>
+              <a:buChar char="•"/>
+            </a:pPr>
+            <a:r>
+              <a:rPr lang="en-US" b="0" i="0" dirty="0">
+                <a:solidFill>
+                  <a:srgbClr val="222222"/>
+                </a:solidFill>
+                <a:effectLst/>
+                <a:latin typeface="Source Sans Pro" panose="020B0503030403020204" pitchFamily="34" charset="0"/>
+              </a:rPr>
+              <a:t>Enhanced support for error handling</a:t>
+            </a:r>
+          </a:p>
+          <a:p>
+            <a:r>
+              <a:rPr lang="en-US" b="0" i="0" dirty="0">
+                <a:solidFill>
+                  <a:srgbClr val="222222"/>
+                </a:solidFill>
+                <a:effectLst/>
+                <a:latin typeface="Source Sans Pro" panose="020B0503030403020204" pitchFamily="34" charset="0"/>
+              </a:rPr>
+              <a:t>Seamless updates using Angular CLI</a:t>
+            </a:r>
+          </a:p>
+          <a:p>
+            <a:r>
+              <a:rPr lang="en-US" b="0" i="0" dirty="0">
+                <a:solidFill>
+                  <a:srgbClr val="222222"/>
+                </a:solidFill>
+                <a:effectLst/>
+                <a:latin typeface="Source Sans Pro" panose="020B0503030403020204" pitchFamily="34" charset="0"/>
+              </a:rPr>
+              <a:t>Forms and validation</a:t>
+            </a:r>
+          </a:p>
+          <a:p>
+            <a:r>
+              <a:rPr lang="en-US" b="0" i="0" dirty="0">
+                <a:solidFill>
+                  <a:srgbClr val="222222"/>
+                </a:solidFill>
+                <a:effectLst/>
+                <a:latin typeface="Source Sans Pro" panose="020B0503030403020204" pitchFamily="34" charset="0"/>
+              </a:rPr>
+              <a:t>Shadow DOM / local CSS</a:t>
+            </a:r>
+          </a:p>
+          <a:p>
+            <a:r>
+              <a:rPr lang="en-US" b="0" i="0" dirty="0">
+                <a:solidFill>
+                  <a:srgbClr val="222222"/>
+                </a:solidFill>
+                <a:effectLst/>
+                <a:latin typeface="Source Sans Pro" panose="020B0503030403020204" pitchFamily="34" charset="0"/>
+              </a:rPr>
+              <a:t>UI and Business Logic Separation</a:t>
+            </a:r>
+            <a:endParaRPr lang="LID4096" dirty="0"/>
+          </a:p>
+        </p:txBody>
+      </p:sp>
+    </p:spTree>
+    <p:extLst>
+      <p:ext uri="{BB962C8B-B14F-4D97-AF65-F5344CB8AC3E}">
+        <p14:creationId xmlns:p14="http://schemas.microsoft.com/office/powerpoint/2010/main" val="2069121290"/>
+      </p:ext>
+    </p:extLst>
+  </p:cSld>
+  <p:clrMapOvr>
+    <a:masterClrMapping/>
+  </p:clrMapOvr>
+</p:sld>
+</file>
+
+<file path=ppt/slides/slide8.xml><?xml version="1.0" encoding="utf-8"?>
+<p:sld xmlns:a="http://schemas.openxmlformats.org/drawingml/2006/main" xmlns:r="http://schemas.openxmlformats.org/officeDocument/2006/relationships" xmlns:p="http://schemas.openxmlformats.org/presentationml/2006/main">
+  <p:cSld>
+    <p:spTree>
+      <p:nvGrpSpPr>
+        <p:cNvPr id="1" name=""/>
+        <p:cNvGrpSpPr/>
+        <p:nvPr/>
+      </p:nvGrpSpPr>
+      <p:grpSpPr>
+        <a:xfrm>
+          <a:off x="0" y="0"/>
+          <a:ext cx="0" cy="0"/>
+          <a:chOff x="0" y="0"/>
+          <a:chExt cx="0" cy="0"/>
+        </a:xfrm>
+      </p:grpSpPr>
+      <p:sp>
+        <p:nvSpPr>
+          <p:cNvPr id="2" name="Title 1">
+            <a:extLst>
+              <a:ext uri="{FF2B5EF4-FFF2-40B4-BE49-F238E27FC236}">
+                <a16:creationId xmlns:a16="http://schemas.microsoft.com/office/drawing/2014/main" id="{35CEC455-1DE3-4171-A254-8197AAD84349}"/>
+              </a:ext>
+            </a:extLst>
+          </p:cNvPr>
+          <p:cNvSpPr>
+            <a:spLocks noGrp="1"/>
+          </p:cNvSpPr>
+          <p:nvPr>
+            <p:ph type="title"/>
+          </p:nvPr>
+        </p:nvSpPr>
+        <p:spPr/>
+        <p:txBody>
+          <a:bodyPr/>
+          <a:lstStyle/>
+          <a:p>
+            <a:br>
+              <a:rPr lang="en-US" dirty="0"/>
+            </a:br>
+            <a:r>
+              <a:rPr lang="en-US" dirty="0"/>
+              <a:t>react</a:t>
+            </a:r>
+            <a:endParaRPr lang="LID4096" dirty="0"/>
+          </a:p>
+        </p:txBody>
+      </p:sp>
+      <p:sp>
+        <p:nvSpPr>
+          <p:cNvPr id="3" name="Content Placeholder 2">
+            <a:extLst>
+              <a:ext uri="{FF2B5EF4-FFF2-40B4-BE49-F238E27FC236}">
+                <a16:creationId xmlns:a16="http://schemas.microsoft.com/office/drawing/2014/main" id="{E3E9F565-3454-47EA-A83E-77C8C651CB9D}"/>
+              </a:ext>
+            </a:extLst>
+          </p:cNvPr>
+          <p:cNvSpPr>
+            <a:spLocks noGrp="1"/>
+          </p:cNvSpPr>
+          <p:nvPr>
+            <p:ph idx="1"/>
+          </p:nvPr>
+        </p:nvSpPr>
+        <p:spPr/>
+        <p:txBody>
+          <a:bodyPr>
+            <a:normAutofit lnSpcReduction="10000"/>
+          </a:bodyPr>
+          <a:lstStyle/>
+          <a:p>
+            <a:r>
+              <a:rPr lang="en-US" dirty="0"/>
+              <a:t>developed  by Facebook-</a:t>
+            </a:r>
+            <a:r>
+              <a:rPr lang="en-US" b="0" i="0" dirty="0">
+                <a:solidFill>
+                  <a:srgbClr val="222222"/>
+                </a:solidFill>
+                <a:effectLst/>
+                <a:latin typeface="Source Sans Pro" panose="020B0503030403020204" pitchFamily="34" charset="0"/>
+              </a:rPr>
+              <a:t> Fully supported by Facebook</a:t>
+            </a:r>
+            <a:endParaRPr lang="en-US" dirty="0"/>
+          </a:p>
+          <a:p>
+            <a:r>
+              <a:rPr lang="en-US" dirty="0" err="1"/>
+              <a:t>javaScript</a:t>
+            </a:r>
+            <a:r>
+              <a:rPr lang="en-US" dirty="0"/>
+              <a:t> library </a:t>
+            </a:r>
+          </a:p>
+          <a:p>
+            <a:r>
+              <a:rPr lang="en-US" b="0" i="0" dirty="0">
+                <a:solidFill>
+                  <a:srgbClr val="222222"/>
+                </a:solidFill>
+                <a:effectLst/>
+                <a:latin typeface="Source Sans Pro" panose="020B0503030403020204" pitchFamily="34" charset="0"/>
+              </a:rPr>
+              <a:t>Allows you to use 3rd party libraries</a:t>
+            </a:r>
+            <a:endParaRPr lang="en-US" dirty="0"/>
+          </a:p>
+          <a:p>
+            <a:r>
+              <a:rPr lang="en-US" b="0" i="0" dirty="0">
+                <a:solidFill>
+                  <a:srgbClr val="222222"/>
+                </a:solidFill>
+                <a:effectLst/>
+                <a:latin typeface="Source Sans Pro" panose="020B0503030403020204" pitchFamily="34" charset="0"/>
+              </a:rPr>
+              <a:t>Time-Saving </a:t>
+            </a:r>
+          </a:p>
+          <a:p>
+            <a:r>
+              <a:rPr lang="en-US" b="0" i="0" dirty="0">
+                <a:solidFill>
+                  <a:srgbClr val="222222"/>
+                </a:solidFill>
+                <a:effectLst/>
+                <a:latin typeface="Source Sans Pro" panose="020B0503030403020204" pitchFamily="34" charset="0"/>
+              </a:rPr>
+              <a:t>Simplicity and Composable</a:t>
+            </a:r>
+          </a:p>
+          <a:p>
+            <a:r>
+              <a:rPr lang="en-US" b="0" i="0" dirty="0">
+                <a:solidFill>
+                  <a:srgbClr val="222222"/>
+                </a:solidFill>
+                <a:effectLst/>
+                <a:latin typeface="Source Sans Pro" panose="020B0503030403020204" pitchFamily="34" charset="0"/>
+              </a:rPr>
+              <a:t>Better user experience and very fast performance.</a:t>
+            </a:r>
+            <a:endParaRPr lang="en-US" dirty="0">
+              <a:solidFill>
+                <a:srgbClr val="222222"/>
+              </a:solidFill>
+              <a:latin typeface="Source Sans Pro" panose="020B0503030403020204" pitchFamily="34" charset="0"/>
+            </a:endParaRPr>
+          </a:p>
+          <a:p>
+            <a:r>
+              <a:rPr lang="en-US" b="0" i="0" dirty="0">
+                <a:solidFill>
+                  <a:srgbClr val="222222"/>
+                </a:solidFill>
+                <a:effectLst/>
+                <a:latin typeface="Source Sans Pro" panose="020B0503030403020204" pitchFamily="34" charset="0"/>
+              </a:rPr>
+              <a:t>Faster Development</a:t>
+            </a:r>
+          </a:p>
+          <a:p>
+            <a:r>
+              <a:rPr lang="en-US" b="0" i="0" dirty="0">
+                <a:solidFill>
+                  <a:srgbClr val="222222"/>
+                </a:solidFill>
+                <a:effectLst/>
+                <a:latin typeface="Source Sans Pro" panose="020B0503030403020204" pitchFamily="34" charset="0"/>
+              </a:rPr>
+              <a:t>Code Stability with One-directional data binding</a:t>
+            </a:r>
+          </a:p>
+          <a:p>
+            <a:r>
+              <a:rPr lang="en-US" b="0" i="0" dirty="0">
+                <a:solidFill>
+                  <a:srgbClr val="222222"/>
+                </a:solidFill>
+                <a:effectLst/>
+                <a:latin typeface="Source Sans Pro" panose="020B0503030403020204" pitchFamily="34" charset="0"/>
+              </a:rPr>
+              <a:t>React Component</a:t>
+            </a:r>
+          </a:p>
+        </p:txBody>
+      </p:sp>
+    </p:spTree>
+    <p:extLst>
+      <p:ext uri="{BB962C8B-B14F-4D97-AF65-F5344CB8AC3E}">
+        <p14:creationId xmlns:p14="http://schemas.microsoft.com/office/powerpoint/2010/main" val="198395431"/>
+      </p:ext>
+    </p:extLst>
+  </p:cSld>
+  <p:clrMapOvr>
+    <a:masterClrMapping/>
+  </p:clrMapOvr>
+</p:sld>
+</file>
+
+<file path=ppt/slides/slide9.xml><?xml version="1.0" encoding="utf-8"?>
+<p:sld xmlns:a="http://schemas.openxmlformats.org/drawingml/2006/main" xmlns:r="http://schemas.openxmlformats.org/officeDocument/2006/relationships" xmlns:p="http://schemas.openxmlformats.org/presentationml/2006/main">
+  <p:cSld>
+    <p:spTree>
+      <p:nvGrpSpPr>
+        <p:cNvPr id="1" name=""/>
+        <p:cNvGrpSpPr/>
+        <p:nvPr/>
+      </p:nvGrpSpPr>
+      <p:grpSpPr>
+        <a:xfrm>
+          <a:off x="0" y="0"/>
+          <a:ext cx="0" cy="0"/>
+          <a:chOff x="0" y="0"/>
+          <a:chExt cx="0" cy="0"/>
+        </a:xfrm>
+      </p:grpSpPr>
+      <p:sp>
+        <p:nvSpPr>
+          <p:cNvPr id="2" name="Title 1">
+            <a:extLst>
+              <a:ext uri="{FF2B5EF4-FFF2-40B4-BE49-F238E27FC236}">
+                <a16:creationId xmlns:a16="http://schemas.microsoft.com/office/drawing/2014/main" id="{6452067B-6FBE-47BC-8D50-BE3A8DEBF5E8}"/>
+              </a:ext>
+            </a:extLst>
+          </p:cNvPr>
+          <p:cNvSpPr>
+            <a:spLocks noGrp="1"/>
+          </p:cNvSpPr>
+          <p:nvPr>
+            <p:ph type="title"/>
+          </p:nvPr>
+        </p:nvSpPr>
+        <p:spPr/>
+        <p:txBody>
+          <a:bodyPr/>
+          <a:lstStyle/>
+          <a:p>
+            <a:r>
+              <a:rPr lang="en-US" dirty="0"/>
+              <a:t>reference</a:t>
+            </a:r>
+            <a:endParaRPr lang="LID4096" dirty="0"/>
+          </a:p>
+        </p:txBody>
+      </p:sp>
+      <p:sp>
+        <p:nvSpPr>
+          <p:cNvPr id="3" name="Content Placeholder 2">
+            <a:extLst>
+              <a:ext uri="{FF2B5EF4-FFF2-40B4-BE49-F238E27FC236}">
+                <a16:creationId xmlns:a16="http://schemas.microsoft.com/office/drawing/2014/main" id="{21C3755C-7A7F-4073-8A55-39CFCA3E195E}"/>
+              </a:ext>
+            </a:extLst>
+          </p:cNvPr>
+          <p:cNvSpPr>
+            <a:spLocks noGrp="1"/>
+          </p:cNvSpPr>
+          <p:nvPr>
+            <p:ph idx="1"/>
+          </p:nvPr>
+        </p:nvSpPr>
+        <p:spPr/>
+        <p:txBody>
+          <a:bodyPr/>
+          <a:lstStyle/>
+          <a:p>
+            <a:r>
+              <a:rPr lang="en-US" b="0" i="0" dirty="0">
+                <a:solidFill>
+                  <a:srgbClr val="030303"/>
+                </a:solidFill>
+                <a:effectLst/>
+                <a:latin typeface="Roboto"/>
+                <a:hlinkClick r:id="rId2"/>
+              </a:rPr>
+              <a:t>Angular vs React vs Vue</a:t>
+            </a:r>
+            <a:r>
+              <a:rPr lang="en-US" b="0" i="0" dirty="0">
+                <a:solidFill>
+                  <a:srgbClr val="030303"/>
+                </a:solidFill>
+                <a:effectLst/>
+                <a:latin typeface="Roboto"/>
+              </a:rPr>
+              <a:t>. </a:t>
+            </a:r>
+            <a:r>
+              <a:rPr lang="en-US" b="0" i="0" dirty="0">
+                <a:solidFill>
+                  <a:srgbClr val="030303"/>
+                </a:solidFill>
+                <a:effectLst/>
+                <a:latin typeface="Roboto"/>
+                <a:hlinkClick r:id="rId3"/>
+              </a:rPr>
+              <a:t>–</a:t>
+            </a:r>
+            <a:r>
+              <a:rPr lang="en-US" b="0" i="0" dirty="0">
+                <a:solidFill>
+                  <a:srgbClr val="030303"/>
+                </a:solidFill>
+                <a:effectLst/>
+                <a:latin typeface="Roboto"/>
+              </a:rPr>
+              <a:t> </a:t>
+            </a:r>
+            <a:r>
+              <a:rPr lang="en-US" dirty="0" err="1">
+                <a:effectLst/>
+                <a:hlinkClick r:id="rId3"/>
+              </a:rPr>
+              <a:t>Academind</a:t>
+            </a:r>
+            <a:br>
+              <a:rPr lang="en-US" dirty="0">
+                <a:effectLst/>
+              </a:rPr>
+            </a:br>
+            <a:endParaRPr lang="en-US" dirty="0">
+              <a:effectLst/>
+            </a:endParaRPr>
+          </a:p>
+          <a:p>
+            <a:r>
+              <a:rPr lang="en-US" b="0" i="0" dirty="0">
+                <a:effectLst/>
+                <a:latin typeface="Roboto"/>
+                <a:hlinkClick r:id="rId4"/>
+              </a:rPr>
+              <a:t>https://pro.academind.com</a:t>
+            </a:r>
+            <a:endParaRPr lang="LID4096" dirty="0"/>
+          </a:p>
+        </p:txBody>
+      </p:sp>
+    </p:spTree>
+    <p:extLst>
+      <p:ext uri="{BB962C8B-B14F-4D97-AF65-F5344CB8AC3E}">
+        <p14:creationId xmlns:p14="http://schemas.microsoft.com/office/powerpoint/2010/main" val="2569354062"/>
       </p:ext>
     </p:extLst>
   </p:cSld>

</xml_diff>